<commit_message>
Updates to incorporate some (all?) of Mike's proposed changes, plus diagram modifications to use green and blue instead of just black.  Use cases file slightly updated; .xml files more fully updated (and not pulled into use case document yet).
</commit_message>
<xml_diff>
--- a/sbml-level-3/version-1/comp/HierarchicalModel.pptx
+++ b/sbml-level-3/version-1/comp/HierarchicalModel.pptx
@@ -10,13 +10,13 @@
   <p:sldIdLst>
     <p:sldId id="257" r:id="rId2"/>
   </p:sldIdLst>
-  <p:sldSz cx="3200400" cy="2560638"/>
+  <p:sldSz cx="2378075" cy="2103438"/>
   <p:notesSz cx="6858000" cy="9144000"/>
   <p:defaultTextStyle>
     <a:defPPr>
       <a:defRPr lang="en-US"/>
     </a:defPPr>
-    <a:lvl1pPr marL="0" algn="l" defTabSz="376117" rtl="0" eaLnBrk="1" latinLnBrk="0" hangingPunct="1">
+    <a:lvl1pPr marL="0" algn="l" defTabSz="349638" rtl="0" eaLnBrk="1" latinLnBrk="0" hangingPunct="1">
       <a:defRPr sz="700" kern="1200">
         <a:solidFill>
           <a:schemeClr val="tx1"/>
@@ -26,7 +26,7 @@
         <a:cs typeface="+mn-cs"/>
       </a:defRPr>
     </a:lvl1pPr>
-    <a:lvl2pPr marL="188058" algn="l" defTabSz="376117" rtl="0" eaLnBrk="1" latinLnBrk="0" hangingPunct="1">
+    <a:lvl2pPr marL="174819" algn="l" defTabSz="349638" rtl="0" eaLnBrk="1" latinLnBrk="0" hangingPunct="1">
       <a:defRPr sz="700" kern="1200">
         <a:solidFill>
           <a:schemeClr val="tx1"/>
@@ -36,7 +36,7 @@
         <a:cs typeface="+mn-cs"/>
       </a:defRPr>
     </a:lvl2pPr>
-    <a:lvl3pPr marL="376117" algn="l" defTabSz="376117" rtl="0" eaLnBrk="1" latinLnBrk="0" hangingPunct="1">
+    <a:lvl3pPr marL="349638" algn="l" defTabSz="349638" rtl="0" eaLnBrk="1" latinLnBrk="0" hangingPunct="1">
       <a:defRPr sz="700" kern="1200">
         <a:solidFill>
           <a:schemeClr val="tx1"/>
@@ -46,7 +46,7 @@
         <a:cs typeface="+mn-cs"/>
       </a:defRPr>
     </a:lvl3pPr>
-    <a:lvl4pPr marL="564175" algn="l" defTabSz="376117" rtl="0" eaLnBrk="1" latinLnBrk="0" hangingPunct="1">
+    <a:lvl4pPr marL="524457" algn="l" defTabSz="349638" rtl="0" eaLnBrk="1" latinLnBrk="0" hangingPunct="1">
       <a:defRPr sz="700" kern="1200">
         <a:solidFill>
           <a:schemeClr val="tx1"/>
@@ -56,7 +56,7 @@
         <a:cs typeface="+mn-cs"/>
       </a:defRPr>
     </a:lvl4pPr>
-    <a:lvl5pPr marL="752233" algn="l" defTabSz="376117" rtl="0" eaLnBrk="1" latinLnBrk="0" hangingPunct="1">
+    <a:lvl5pPr marL="699276" algn="l" defTabSz="349638" rtl="0" eaLnBrk="1" latinLnBrk="0" hangingPunct="1">
       <a:defRPr sz="700" kern="1200">
         <a:solidFill>
           <a:schemeClr val="tx1"/>
@@ -66,7 +66,7 @@
         <a:cs typeface="+mn-cs"/>
       </a:defRPr>
     </a:lvl5pPr>
-    <a:lvl6pPr marL="940291" algn="l" defTabSz="376117" rtl="0" eaLnBrk="1" latinLnBrk="0" hangingPunct="1">
+    <a:lvl6pPr marL="874095" algn="l" defTabSz="349638" rtl="0" eaLnBrk="1" latinLnBrk="0" hangingPunct="1">
       <a:defRPr sz="700" kern="1200">
         <a:solidFill>
           <a:schemeClr val="tx1"/>
@@ -76,7 +76,7 @@
         <a:cs typeface="+mn-cs"/>
       </a:defRPr>
     </a:lvl6pPr>
-    <a:lvl7pPr marL="1128349" algn="l" defTabSz="376117" rtl="0" eaLnBrk="1" latinLnBrk="0" hangingPunct="1">
+    <a:lvl7pPr marL="1048913" algn="l" defTabSz="349638" rtl="0" eaLnBrk="1" latinLnBrk="0" hangingPunct="1">
       <a:defRPr sz="700" kern="1200">
         <a:solidFill>
           <a:schemeClr val="tx1"/>
@@ -86,7 +86,7 @@
         <a:cs typeface="+mn-cs"/>
       </a:defRPr>
     </a:lvl7pPr>
-    <a:lvl8pPr marL="1316407" algn="l" defTabSz="376117" rtl="0" eaLnBrk="1" latinLnBrk="0" hangingPunct="1">
+    <a:lvl8pPr marL="1223732" algn="l" defTabSz="349638" rtl="0" eaLnBrk="1" latinLnBrk="0" hangingPunct="1">
       <a:defRPr sz="700" kern="1200">
         <a:solidFill>
           <a:schemeClr val="tx1"/>
@@ -96,7 +96,7 @@
         <a:cs typeface="+mn-cs"/>
       </a:defRPr>
     </a:lvl8pPr>
-    <a:lvl9pPr marL="1504465" algn="l" defTabSz="376117" rtl="0" eaLnBrk="1" latinLnBrk="0" hangingPunct="1">
+    <a:lvl9pPr marL="1398551" algn="l" defTabSz="349638" rtl="0" eaLnBrk="1" latinLnBrk="0" hangingPunct="1">
       <a:defRPr sz="700" kern="1200">
         <a:solidFill>
           <a:schemeClr val="tx1"/>
@@ -192,7 +192,7 @@
           <a:p>
             <a:fld id="{7754A941-C6C2-4027-B1F4-A5E937B2245F}" type="datetimeFigureOut">
               <a:rPr lang="en-US" smtClean="0"/>
-              <a:t>9/15/2010</a:t>
+              <a:t>9/28/2010</a:t>
             </a:fld>
             <a:endParaRPr lang="en-US"/>
           </a:p>
@@ -210,8 +210,8 @@
         </p:nvSpPr>
         <p:spPr>
           <a:xfrm>
-            <a:off x="1285875" y="685800"/>
-            <a:ext cx="4286250" cy="3429000"/>
+            <a:off x="1490663" y="685800"/>
+            <a:ext cx="3876675" cy="3429000"/>
           </a:xfrm>
           <a:prstGeom prst="rect">
             <a:avLst/>
@@ -366,7 +366,7 @@
   </p:cSld>
   <p:clrMap bg1="lt1" tx1="dk1" bg2="lt2" tx2="dk2" accent1="accent1" accent2="accent2" accent3="accent3" accent4="accent4" accent5="accent5" accent6="accent6" hlink="hlink" folHlink="folHlink"/>
   <p:notesStyle>
-    <a:lvl1pPr marL="0" algn="l" defTabSz="376117" rtl="0" eaLnBrk="1" latinLnBrk="0" hangingPunct="1">
+    <a:lvl1pPr marL="0" algn="l" defTabSz="349638" rtl="0" eaLnBrk="1" latinLnBrk="0" hangingPunct="1">
       <a:defRPr sz="500" kern="1200">
         <a:solidFill>
           <a:schemeClr val="tx1"/>
@@ -376,7 +376,7 @@
         <a:cs typeface="+mn-cs"/>
       </a:defRPr>
     </a:lvl1pPr>
-    <a:lvl2pPr marL="188058" algn="l" defTabSz="376117" rtl="0" eaLnBrk="1" latinLnBrk="0" hangingPunct="1">
+    <a:lvl2pPr marL="174819" algn="l" defTabSz="349638" rtl="0" eaLnBrk="1" latinLnBrk="0" hangingPunct="1">
       <a:defRPr sz="500" kern="1200">
         <a:solidFill>
           <a:schemeClr val="tx1"/>
@@ -386,7 +386,7 @@
         <a:cs typeface="+mn-cs"/>
       </a:defRPr>
     </a:lvl2pPr>
-    <a:lvl3pPr marL="376117" algn="l" defTabSz="376117" rtl="0" eaLnBrk="1" latinLnBrk="0" hangingPunct="1">
+    <a:lvl3pPr marL="349638" algn="l" defTabSz="349638" rtl="0" eaLnBrk="1" latinLnBrk="0" hangingPunct="1">
       <a:defRPr sz="500" kern="1200">
         <a:solidFill>
           <a:schemeClr val="tx1"/>
@@ -396,7 +396,7 @@
         <a:cs typeface="+mn-cs"/>
       </a:defRPr>
     </a:lvl3pPr>
-    <a:lvl4pPr marL="564175" algn="l" defTabSz="376117" rtl="0" eaLnBrk="1" latinLnBrk="0" hangingPunct="1">
+    <a:lvl4pPr marL="524457" algn="l" defTabSz="349638" rtl="0" eaLnBrk="1" latinLnBrk="0" hangingPunct="1">
       <a:defRPr sz="500" kern="1200">
         <a:solidFill>
           <a:schemeClr val="tx1"/>
@@ -406,7 +406,7 @@
         <a:cs typeface="+mn-cs"/>
       </a:defRPr>
     </a:lvl4pPr>
-    <a:lvl5pPr marL="752233" algn="l" defTabSz="376117" rtl="0" eaLnBrk="1" latinLnBrk="0" hangingPunct="1">
+    <a:lvl5pPr marL="699276" algn="l" defTabSz="349638" rtl="0" eaLnBrk="1" latinLnBrk="0" hangingPunct="1">
       <a:defRPr sz="500" kern="1200">
         <a:solidFill>
           <a:schemeClr val="tx1"/>
@@ -416,7 +416,7 @@
         <a:cs typeface="+mn-cs"/>
       </a:defRPr>
     </a:lvl5pPr>
-    <a:lvl6pPr marL="940291" algn="l" defTabSz="376117" rtl="0" eaLnBrk="1" latinLnBrk="0" hangingPunct="1">
+    <a:lvl6pPr marL="874095" algn="l" defTabSz="349638" rtl="0" eaLnBrk="1" latinLnBrk="0" hangingPunct="1">
       <a:defRPr sz="500" kern="1200">
         <a:solidFill>
           <a:schemeClr val="tx1"/>
@@ -426,7 +426,7 @@
         <a:cs typeface="+mn-cs"/>
       </a:defRPr>
     </a:lvl6pPr>
-    <a:lvl7pPr marL="1128349" algn="l" defTabSz="376117" rtl="0" eaLnBrk="1" latinLnBrk="0" hangingPunct="1">
+    <a:lvl7pPr marL="1048913" algn="l" defTabSz="349638" rtl="0" eaLnBrk="1" latinLnBrk="0" hangingPunct="1">
       <a:defRPr sz="500" kern="1200">
         <a:solidFill>
           <a:schemeClr val="tx1"/>
@@ -436,7 +436,7 @@
         <a:cs typeface="+mn-cs"/>
       </a:defRPr>
     </a:lvl7pPr>
-    <a:lvl8pPr marL="1316407" algn="l" defTabSz="376117" rtl="0" eaLnBrk="1" latinLnBrk="0" hangingPunct="1">
+    <a:lvl8pPr marL="1223732" algn="l" defTabSz="349638" rtl="0" eaLnBrk="1" latinLnBrk="0" hangingPunct="1">
       <a:defRPr sz="500" kern="1200">
         <a:solidFill>
           <a:schemeClr val="tx1"/>
@@ -446,7 +446,7 @@
         <a:cs typeface="+mn-cs"/>
       </a:defRPr>
     </a:lvl8pPr>
-    <a:lvl9pPr marL="1504465" algn="l" defTabSz="376117" rtl="0" eaLnBrk="1" latinLnBrk="0" hangingPunct="1">
+    <a:lvl9pPr marL="1398551" algn="l" defTabSz="349638" rtl="0" eaLnBrk="1" latinLnBrk="0" hangingPunct="1">
       <a:defRPr sz="500" kern="1200">
         <a:solidFill>
           <a:schemeClr val="tx1"/>
@@ -489,8 +489,8 @@
         </p:nvSpPr>
         <p:spPr>
           <a:xfrm>
-            <a:off x="1285875" y="685800"/>
-            <a:ext cx="4286250" cy="3429000"/>
+            <a:off x="1490663" y="685800"/>
+            <a:ext cx="3876675" cy="3429000"/>
           </a:xfrm>
         </p:spPr>
       </p:sp>
@@ -578,8 +578,8 @@
         </p:nvSpPr>
         <p:spPr>
           <a:xfrm>
-            <a:off x="240030" y="795462"/>
-            <a:ext cx="2720340" cy="548878"/>
+            <a:off x="178358" y="653433"/>
+            <a:ext cx="2021363" cy="450876"/>
           </a:xfrm>
         </p:spPr>
         <p:txBody>
@@ -606,8 +606,8 @@
         </p:nvSpPr>
         <p:spPr>
           <a:xfrm>
-            <a:off x="480060" y="1451028"/>
-            <a:ext cx="2240280" cy="654385"/>
+            <a:off x="356716" y="1191953"/>
+            <a:ext cx="1664653" cy="537545"/>
           </a:xfrm>
         </p:spPr>
         <p:txBody>
@@ -623,7 +623,7 @@
                 </a:solidFill>
               </a:defRPr>
             </a:lvl1pPr>
-            <a:lvl2pPr marL="188058" indent="0" algn="ctr">
+            <a:lvl2pPr marL="174819" indent="0" algn="ctr">
               <a:buNone/>
               <a:defRPr>
                 <a:solidFill>
@@ -633,7 +633,7 @@
                 </a:solidFill>
               </a:defRPr>
             </a:lvl2pPr>
-            <a:lvl3pPr marL="376117" indent="0" algn="ctr">
+            <a:lvl3pPr marL="349638" indent="0" algn="ctr">
               <a:buNone/>
               <a:defRPr>
                 <a:solidFill>
@@ -643,7 +643,7 @@
                 </a:solidFill>
               </a:defRPr>
             </a:lvl3pPr>
-            <a:lvl4pPr marL="564175" indent="0" algn="ctr">
+            <a:lvl4pPr marL="524457" indent="0" algn="ctr">
               <a:buNone/>
               <a:defRPr>
                 <a:solidFill>
@@ -653,7 +653,7 @@
                 </a:solidFill>
               </a:defRPr>
             </a:lvl4pPr>
-            <a:lvl5pPr marL="752233" indent="0" algn="ctr">
+            <a:lvl5pPr marL="699276" indent="0" algn="ctr">
               <a:buNone/>
               <a:defRPr>
                 <a:solidFill>
@@ -663,7 +663,7 @@
                 </a:solidFill>
               </a:defRPr>
             </a:lvl5pPr>
-            <a:lvl6pPr marL="940291" indent="0" algn="ctr">
+            <a:lvl6pPr marL="874095" indent="0" algn="ctr">
               <a:buNone/>
               <a:defRPr>
                 <a:solidFill>
@@ -673,7 +673,7 @@
                 </a:solidFill>
               </a:defRPr>
             </a:lvl6pPr>
-            <a:lvl7pPr marL="1128349" indent="0" algn="ctr">
+            <a:lvl7pPr marL="1048913" indent="0" algn="ctr">
               <a:buNone/>
               <a:defRPr>
                 <a:solidFill>
@@ -683,7 +683,7 @@
                 </a:solidFill>
               </a:defRPr>
             </a:lvl7pPr>
-            <a:lvl8pPr marL="1316407" indent="0" algn="ctr">
+            <a:lvl8pPr marL="1223732" indent="0" algn="ctr">
               <a:buNone/>
               <a:defRPr>
                 <a:solidFill>
@@ -693,7 +693,7 @@
                 </a:solidFill>
               </a:defRPr>
             </a:lvl8pPr>
-            <a:lvl9pPr marL="1504465" indent="0" algn="ctr">
+            <a:lvl9pPr marL="1398551" indent="0" algn="ctr">
               <a:buNone/>
               <a:defRPr>
                 <a:solidFill>
@@ -730,7 +730,7 @@
           <a:p>
             <a:fld id="{F0172217-DC24-48CD-AE89-68C8C8D878B4}" type="datetimeFigureOut">
               <a:rPr lang="en-US" smtClean="0"/>
-              <a:t>9/15/2010</a:t>
+              <a:t>9/28/2010</a:t>
             </a:fld>
             <a:endParaRPr lang="en-US"/>
           </a:p>
@@ -900,7 +900,7 @@
           <a:p>
             <a:fld id="{F0172217-DC24-48CD-AE89-68C8C8D878B4}" type="datetimeFigureOut">
               <a:rPr lang="en-US" smtClean="0"/>
-              <a:t>9/15/2010</a:t>
+              <a:t>9/28/2010</a:t>
             </a:fld>
             <a:endParaRPr lang="en-US"/>
           </a:p>
@@ -990,8 +990,8 @@
         </p:nvSpPr>
         <p:spPr>
           <a:xfrm>
-            <a:off x="2320290" y="102549"/>
-            <a:ext cx="720090" cy="2184842"/>
+            <a:off x="1724106" y="84239"/>
+            <a:ext cx="535067" cy="1794740"/>
           </a:xfrm>
         </p:spPr>
         <p:txBody>
@@ -1018,8 +1018,8 @@
         </p:nvSpPr>
         <p:spPr>
           <a:xfrm>
-            <a:off x="160020" y="102549"/>
-            <a:ext cx="2106930" cy="2184842"/>
+            <a:off x="118905" y="84239"/>
+            <a:ext cx="1565566" cy="1794740"/>
           </a:xfrm>
         </p:spPr>
         <p:txBody>
@@ -1080,7 +1080,7 @@
           <a:p>
             <a:fld id="{F0172217-DC24-48CD-AE89-68C8C8D878B4}" type="datetimeFigureOut">
               <a:rPr lang="en-US" smtClean="0"/>
-              <a:t>9/15/2010</a:t>
+              <a:t>9/28/2010</a:t>
             </a:fld>
             <a:endParaRPr lang="en-US"/>
           </a:p>
@@ -1250,7 +1250,7 @@
           <a:p>
             <a:fld id="{F0172217-DC24-48CD-AE89-68C8C8D878B4}" type="datetimeFigureOut">
               <a:rPr lang="en-US" smtClean="0"/>
-              <a:t>9/15/2010</a:t>
+              <a:t>9/28/2010</a:t>
             </a:fld>
             <a:endParaRPr lang="en-US"/>
           </a:p>
@@ -1340,15 +1340,15 @@
         </p:nvSpPr>
         <p:spPr>
           <a:xfrm>
-            <a:off x="252809" y="1645447"/>
-            <a:ext cx="2720340" cy="508571"/>
+            <a:off x="187853" y="1351658"/>
+            <a:ext cx="2021363" cy="417766"/>
           </a:xfrm>
         </p:spPr>
         <p:txBody>
           <a:bodyPr anchor="t"/>
           <a:lstStyle>
             <a:lvl1pPr algn="l">
-              <a:defRPr sz="1600" b="1" cap="all"/>
+              <a:defRPr sz="1500" b="1" cap="all"/>
             </a:lvl1pPr>
           </a:lstStyle>
           <a:p>
@@ -1372,8 +1372,8 @@
         </p:nvSpPr>
         <p:spPr>
           <a:xfrm>
-            <a:off x="252809" y="1085312"/>
-            <a:ext cx="2720340" cy="560140"/>
+            <a:off x="187853" y="891531"/>
+            <a:ext cx="2021363" cy="460127"/>
           </a:xfrm>
         </p:spPr>
         <p:txBody>
@@ -1381,7 +1381,7 @@
           <a:lstStyle>
             <a:lvl1pPr marL="0" indent="0">
               <a:buNone/>
-              <a:defRPr sz="800">
+              <a:defRPr sz="700">
                 <a:solidFill>
                   <a:schemeClr val="tx1">
                     <a:tint val="75000"/>
@@ -1389,7 +1389,7 @@
                 </a:solidFill>
               </a:defRPr>
             </a:lvl1pPr>
-            <a:lvl2pPr marL="188058" indent="0">
+            <a:lvl2pPr marL="174819" indent="0">
               <a:buNone/>
               <a:defRPr sz="700">
                 <a:solidFill>
@@ -1399,7 +1399,7 @@
                 </a:solidFill>
               </a:defRPr>
             </a:lvl2pPr>
-            <a:lvl3pPr marL="376117" indent="0">
+            <a:lvl3pPr marL="349638" indent="0">
               <a:buNone/>
               <a:defRPr sz="600">
                 <a:solidFill>
@@ -1409,7 +1409,7 @@
                 </a:solidFill>
               </a:defRPr>
             </a:lvl3pPr>
-            <a:lvl4pPr marL="564175" indent="0">
+            <a:lvl4pPr marL="524457" indent="0">
               <a:buNone/>
               <a:defRPr sz="500">
                 <a:solidFill>
@@ -1419,7 +1419,7 @@
                 </a:solidFill>
               </a:defRPr>
             </a:lvl4pPr>
-            <a:lvl5pPr marL="752233" indent="0">
+            <a:lvl5pPr marL="699276" indent="0">
               <a:buNone/>
               <a:defRPr sz="500">
                 <a:solidFill>
@@ -1429,7 +1429,7 @@
                 </a:solidFill>
               </a:defRPr>
             </a:lvl5pPr>
-            <a:lvl6pPr marL="940291" indent="0">
+            <a:lvl6pPr marL="874095" indent="0">
               <a:buNone/>
               <a:defRPr sz="500">
                 <a:solidFill>
@@ -1439,7 +1439,7 @@
                 </a:solidFill>
               </a:defRPr>
             </a:lvl6pPr>
-            <a:lvl7pPr marL="1128349" indent="0">
+            <a:lvl7pPr marL="1048913" indent="0">
               <a:buNone/>
               <a:defRPr sz="500">
                 <a:solidFill>
@@ -1449,7 +1449,7 @@
                 </a:solidFill>
               </a:defRPr>
             </a:lvl7pPr>
-            <a:lvl8pPr marL="1316407" indent="0">
+            <a:lvl8pPr marL="1223732" indent="0">
               <a:buNone/>
               <a:defRPr sz="500">
                 <a:solidFill>
@@ -1459,7 +1459,7 @@
                 </a:solidFill>
               </a:defRPr>
             </a:lvl8pPr>
-            <a:lvl9pPr marL="1504465" indent="0">
+            <a:lvl9pPr marL="1398551" indent="0">
               <a:buNone/>
               <a:defRPr sz="500">
                 <a:solidFill>
@@ -1496,7 +1496,7 @@
           <a:p>
             <a:fld id="{F0172217-DC24-48CD-AE89-68C8C8D878B4}" type="datetimeFigureOut">
               <a:rPr lang="en-US" smtClean="0"/>
-              <a:t>9/15/2010</a:t>
+              <a:t>9/28/2010</a:t>
             </a:fld>
             <a:endParaRPr lang="en-US"/>
           </a:p>
@@ -1609,21 +1609,21 @@
         </p:nvSpPr>
         <p:spPr>
           <a:xfrm>
-            <a:off x="160020" y="597484"/>
-            <a:ext cx="1413510" cy="1689903"/>
+            <a:off x="118904" y="490808"/>
+            <a:ext cx="1050316" cy="1388172"/>
           </a:xfrm>
         </p:spPr>
         <p:txBody>
           <a:bodyPr/>
           <a:lstStyle>
             <a:lvl1pPr>
-              <a:defRPr sz="1200"/>
+              <a:defRPr sz="1100"/>
             </a:lvl1pPr>
             <a:lvl2pPr>
-              <a:defRPr sz="1000"/>
+              <a:defRPr sz="900"/>
             </a:lvl2pPr>
             <a:lvl3pPr>
-              <a:defRPr sz="800"/>
+              <a:defRPr sz="700"/>
             </a:lvl3pPr>
             <a:lvl4pPr>
               <a:defRPr sz="700"/>
@@ -1694,21 +1694,21 @@
         </p:nvSpPr>
         <p:spPr>
           <a:xfrm>
-            <a:off x="1626870" y="597484"/>
-            <a:ext cx="1413510" cy="1689903"/>
+            <a:off x="1208855" y="490808"/>
+            <a:ext cx="1050316" cy="1388172"/>
           </a:xfrm>
         </p:spPr>
         <p:txBody>
           <a:bodyPr/>
           <a:lstStyle>
             <a:lvl1pPr>
-              <a:defRPr sz="1200"/>
+              <a:defRPr sz="1100"/>
             </a:lvl1pPr>
             <a:lvl2pPr>
-              <a:defRPr sz="1000"/>
+              <a:defRPr sz="900"/>
             </a:lvl2pPr>
             <a:lvl3pPr>
-              <a:defRPr sz="800"/>
+              <a:defRPr sz="700"/>
             </a:lvl3pPr>
             <a:lvl4pPr>
               <a:defRPr sz="700"/>
@@ -1784,7 +1784,7 @@
           <a:p>
             <a:fld id="{F0172217-DC24-48CD-AE89-68C8C8D878B4}" type="datetimeFigureOut">
               <a:rPr lang="en-US" smtClean="0"/>
-              <a:t>9/15/2010</a:t>
+              <a:t>9/28/2010</a:t>
             </a:fld>
             <a:endParaRPr lang="en-US"/>
           </a:p>
@@ -1901,8 +1901,8 @@
         </p:nvSpPr>
         <p:spPr>
           <a:xfrm>
-            <a:off x="160026" y="573184"/>
-            <a:ext cx="1414066" cy="238874"/>
+            <a:off x="118912" y="470843"/>
+            <a:ext cx="1050729" cy="196223"/>
           </a:xfrm>
         </p:spPr>
         <p:txBody>
@@ -1910,37 +1910,37 @@
           <a:lstStyle>
             <a:lvl1pPr marL="0" indent="0">
               <a:buNone/>
-              <a:defRPr sz="1000" b="1"/>
+              <a:defRPr sz="900" b="1"/>
             </a:lvl1pPr>
-            <a:lvl2pPr marL="188058" indent="0">
-              <a:buNone/>
-              <a:defRPr sz="800" b="1"/>
+            <a:lvl2pPr marL="174819" indent="0">
+              <a:buNone/>
+              <a:defRPr sz="700" b="1"/>
             </a:lvl2pPr>
-            <a:lvl3pPr marL="376117" indent="0">
+            <a:lvl3pPr marL="349638" indent="0">
               <a:buNone/>
               <a:defRPr sz="700" b="1"/>
             </a:lvl3pPr>
-            <a:lvl4pPr marL="564175" indent="0">
+            <a:lvl4pPr marL="524457" indent="0">
               <a:buNone/>
               <a:defRPr sz="600" b="1"/>
             </a:lvl4pPr>
-            <a:lvl5pPr marL="752233" indent="0">
+            <a:lvl5pPr marL="699276" indent="0">
               <a:buNone/>
               <a:defRPr sz="600" b="1"/>
             </a:lvl5pPr>
-            <a:lvl6pPr marL="940291" indent="0">
+            <a:lvl6pPr marL="874095" indent="0">
               <a:buNone/>
               <a:defRPr sz="600" b="1"/>
             </a:lvl6pPr>
-            <a:lvl7pPr marL="1128349" indent="0">
+            <a:lvl7pPr marL="1048913" indent="0">
               <a:buNone/>
               <a:defRPr sz="600" b="1"/>
             </a:lvl7pPr>
-            <a:lvl8pPr marL="1316407" indent="0">
+            <a:lvl8pPr marL="1223732" indent="0">
               <a:buNone/>
               <a:defRPr sz="600" b="1"/>
             </a:lvl8pPr>
-            <a:lvl9pPr marL="1504465" indent="0">
+            <a:lvl9pPr marL="1398551" indent="0">
               <a:buNone/>
               <a:defRPr sz="600" b="1"/>
             </a:lvl9pPr>
@@ -1966,18 +1966,18 @@
         </p:nvSpPr>
         <p:spPr>
           <a:xfrm>
-            <a:off x="160026" y="812058"/>
-            <a:ext cx="1414066" cy="1475331"/>
+            <a:off x="118912" y="667066"/>
+            <a:ext cx="1050729" cy="1211912"/>
           </a:xfrm>
         </p:spPr>
         <p:txBody>
           <a:bodyPr/>
           <a:lstStyle>
             <a:lvl1pPr>
-              <a:defRPr sz="1000"/>
+              <a:defRPr sz="900"/>
             </a:lvl1pPr>
             <a:lvl2pPr>
-              <a:defRPr sz="800"/>
+              <a:defRPr sz="700"/>
             </a:lvl2pPr>
             <a:lvl3pPr>
               <a:defRPr sz="700"/>
@@ -2051,8 +2051,8 @@
         </p:nvSpPr>
         <p:spPr>
           <a:xfrm>
-            <a:off x="1625764" y="573184"/>
-            <a:ext cx="1414621" cy="238874"/>
+            <a:off x="1208034" y="470843"/>
+            <a:ext cx="1051143" cy="196223"/>
           </a:xfrm>
         </p:spPr>
         <p:txBody>
@@ -2060,37 +2060,37 @@
           <a:lstStyle>
             <a:lvl1pPr marL="0" indent="0">
               <a:buNone/>
-              <a:defRPr sz="1000" b="1"/>
+              <a:defRPr sz="900" b="1"/>
             </a:lvl1pPr>
-            <a:lvl2pPr marL="188058" indent="0">
-              <a:buNone/>
-              <a:defRPr sz="800" b="1"/>
+            <a:lvl2pPr marL="174819" indent="0">
+              <a:buNone/>
+              <a:defRPr sz="700" b="1"/>
             </a:lvl2pPr>
-            <a:lvl3pPr marL="376117" indent="0">
+            <a:lvl3pPr marL="349638" indent="0">
               <a:buNone/>
               <a:defRPr sz="700" b="1"/>
             </a:lvl3pPr>
-            <a:lvl4pPr marL="564175" indent="0">
+            <a:lvl4pPr marL="524457" indent="0">
               <a:buNone/>
               <a:defRPr sz="600" b="1"/>
             </a:lvl4pPr>
-            <a:lvl5pPr marL="752233" indent="0">
+            <a:lvl5pPr marL="699276" indent="0">
               <a:buNone/>
               <a:defRPr sz="600" b="1"/>
             </a:lvl5pPr>
-            <a:lvl6pPr marL="940291" indent="0">
+            <a:lvl6pPr marL="874095" indent="0">
               <a:buNone/>
               <a:defRPr sz="600" b="1"/>
             </a:lvl6pPr>
-            <a:lvl7pPr marL="1128349" indent="0">
+            <a:lvl7pPr marL="1048913" indent="0">
               <a:buNone/>
               <a:defRPr sz="600" b="1"/>
             </a:lvl7pPr>
-            <a:lvl8pPr marL="1316407" indent="0">
+            <a:lvl8pPr marL="1223732" indent="0">
               <a:buNone/>
               <a:defRPr sz="600" b="1"/>
             </a:lvl8pPr>
-            <a:lvl9pPr marL="1504465" indent="0">
+            <a:lvl9pPr marL="1398551" indent="0">
               <a:buNone/>
               <a:defRPr sz="600" b="1"/>
             </a:lvl9pPr>
@@ -2116,18 +2116,18 @@
         </p:nvSpPr>
         <p:spPr>
           <a:xfrm>
-            <a:off x="1625764" y="812058"/>
-            <a:ext cx="1414621" cy="1475331"/>
+            <a:off x="1208034" y="667066"/>
+            <a:ext cx="1051143" cy="1211912"/>
           </a:xfrm>
         </p:spPr>
         <p:txBody>
           <a:bodyPr/>
           <a:lstStyle>
             <a:lvl1pPr>
-              <a:defRPr sz="1000"/>
+              <a:defRPr sz="900"/>
             </a:lvl1pPr>
             <a:lvl2pPr>
-              <a:defRPr sz="800"/>
+              <a:defRPr sz="700"/>
             </a:lvl2pPr>
             <a:lvl3pPr>
               <a:defRPr sz="700"/>
@@ -2206,7 +2206,7 @@
           <a:p>
             <a:fld id="{F0172217-DC24-48CD-AE89-68C8C8D878B4}" type="datetimeFigureOut">
               <a:rPr lang="en-US" smtClean="0"/>
-              <a:t>9/15/2010</a:t>
+              <a:t>9/28/2010</a:t>
             </a:fld>
             <a:endParaRPr lang="en-US"/>
           </a:p>
@@ -2324,7 +2324,7 @@
           <a:p>
             <a:fld id="{F0172217-DC24-48CD-AE89-68C8C8D878B4}" type="datetimeFigureOut">
               <a:rPr lang="en-US" smtClean="0"/>
-              <a:t>9/15/2010</a:t>
+              <a:t>9/28/2010</a:t>
             </a:fld>
             <a:endParaRPr lang="en-US"/>
           </a:p>
@@ -2419,7 +2419,7 @@
           <a:p>
             <a:fld id="{F0172217-DC24-48CD-AE89-68C8C8D878B4}" type="datetimeFigureOut">
               <a:rPr lang="en-US" smtClean="0"/>
-              <a:t>9/15/2010</a:t>
+              <a:t>9/28/2010</a:t>
             </a:fld>
             <a:endParaRPr lang="en-US"/>
           </a:p>
@@ -2509,15 +2509,15 @@
         </p:nvSpPr>
         <p:spPr>
           <a:xfrm>
-            <a:off x="160026" y="101951"/>
-            <a:ext cx="1052909" cy="433886"/>
+            <a:off x="118913" y="83748"/>
+            <a:ext cx="782369" cy="356416"/>
           </a:xfrm>
         </p:spPr>
         <p:txBody>
           <a:bodyPr anchor="b"/>
           <a:lstStyle>
             <a:lvl1pPr algn="l">
-              <a:defRPr sz="800" b="1"/>
+              <a:defRPr sz="700" b="1"/>
             </a:lvl1pPr>
           </a:lstStyle>
           <a:p>
@@ -2541,39 +2541,39 @@
         </p:nvSpPr>
         <p:spPr>
           <a:xfrm>
-            <a:off x="1251272" y="101958"/>
-            <a:ext cx="1789113" cy="2185433"/>
+            <a:off x="929765" y="83758"/>
+            <a:ext cx="1329410" cy="1795226"/>
           </a:xfrm>
         </p:spPr>
         <p:txBody>
           <a:bodyPr/>
           <a:lstStyle>
             <a:lvl1pPr>
-              <a:defRPr sz="1400"/>
+              <a:defRPr sz="1300"/>
             </a:lvl1pPr>
             <a:lvl2pPr>
-              <a:defRPr sz="1200"/>
+              <a:defRPr sz="1100"/>
             </a:lvl2pPr>
             <a:lvl3pPr>
-              <a:defRPr sz="1000"/>
+              <a:defRPr sz="900"/>
             </a:lvl3pPr>
             <a:lvl4pPr>
-              <a:defRPr sz="800"/>
+              <a:defRPr sz="700"/>
             </a:lvl4pPr>
             <a:lvl5pPr>
-              <a:defRPr sz="800"/>
+              <a:defRPr sz="700"/>
             </a:lvl5pPr>
             <a:lvl6pPr>
-              <a:defRPr sz="800"/>
+              <a:defRPr sz="700"/>
             </a:lvl6pPr>
             <a:lvl7pPr>
-              <a:defRPr sz="800"/>
+              <a:defRPr sz="700"/>
             </a:lvl7pPr>
             <a:lvl8pPr>
-              <a:defRPr sz="800"/>
+              <a:defRPr sz="700"/>
             </a:lvl8pPr>
             <a:lvl9pPr>
-              <a:defRPr sz="800"/>
+              <a:defRPr sz="700"/>
             </a:lvl9pPr>
           </a:lstStyle>
           <a:p>
@@ -2626,8 +2626,8 @@
         </p:nvSpPr>
         <p:spPr>
           <a:xfrm>
-            <a:off x="160026" y="535841"/>
-            <a:ext cx="1052909" cy="1751548"/>
+            <a:off x="118913" y="440167"/>
+            <a:ext cx="782369" cy="1438811"/>
           </a:xfrm>
         </p:spPr>
         <p:txBody>
@@ -2637,35 +2637,35 @@
               <a:buNone/>
               <a:defRPr sz="500"/>
             </a:lvl1pPr>
-            <a:lvl2pPr marL="188058" indent="0">
+            <a:lvl2pPr marL="174819" indent="0">
               <a:buNone/>
               <a:defRPr sz="500"/>
             </a:lvl2pPr>
-            <a:lvl3pPr marL="376117" indent="0">
+            <a:lvl3pPr marL="349638" indent="0">
               <a:buNone/>
               <a:defRPr sz="500"/>
             </a:lvl3pPr>
-            <a:lvl4pPr marL="564175" indent="0">
+            <a:lvl4pPr marL="524457" indent="0">
               <a:buNone/>
               <a:defRPr sz="400"/>
             </a:lvl4pPr>
-            <a:lvl5pPr marL="752233" indent="0">
+            <a:lvl5pPr marL="699276" indent="0">
               <a:buNone/>
               <a:defRPr sz="400"/>
             </a:lvl5pPr>
-            <a:lvl6pPr marL="940291" indent="0">
+            <a:lvl6pPr marL="874095" indent="0">
               <a:buNone/>
               <a:defRPr sz="400"/>
             </a:lvl6pPr>
-            <a:lvl7pPr marL="1128349" indent="0">
+            <a:lvl7pPr marL="1048913" indent="0">
               <a:buNone/>
               <a:defRPr sz="400"/>
             </a:lvl7pPr>
-            <a:lvl8pPr marL="1316407" indent="0">
+            <a:lvl8pPr marL="1223732" indent="0">
               <a:buNone/>
               <a:defRPr sz="400"/>
             </a:lvl8pPr>
-            <a:lvl9pPr marL="1504465" indent="0">
+            <a:lvl9pPr marL="1398551" indent="0">
               <a:buNone/>
               <a:defRPr sz="400"/>
             </a:lvl9pPr>
@@ -2696,7 +2696,7 @@
           <a:p>
             <a:fld id="{F0172217-DC24-48CD-AE89-68C8C8D878B4}" type="datetimeFigureOut">
               <a:rPr lang="en-US" smtClean="0"/>
-              <a:t>9/15/2010</a:t>
+              <a:t>9/28/2010</a:t>
             </a:fld>
             <a:endParaRPr lang="en-US"/>
           </a:p>
@@ -2786,15 +2786,15 @@
         </p:nvSpPr>
         <p:spPr>
           <a:xfrm>
-            <a:off x="627301" y="1792451"/>
-            <a:ext cx="1920240" cy="211608"/>
+            <a:off x="466123" y="1472412"/>
+            <a:ext cx="1426845" cy="173825"/>
           </a:xfrm>
         </p:spPr>
         <p:txBody>
           <a:bodyPr anchor="b"/>
           <a:lstStyle>
             <a:lvl1pPr algn="l">
-              <a:defRPr sz="800" b="1"/>
+              <a:defRPr sz="700" b="1"/>
             </a:lvl1pPr>
           </a:lstStyle>
           <a:p>
@@ -2818,8 +2818,8 @@
         </p:nvSpPr>
         <p:spPr>
           <a:xfrm>
-            <a:off x="627301" y="228800"/>
-            <a:ext cx="1920240" cy="1536383"/>
+            <a:off x="466123" y="187952"/>
+            <a:ext cx="1426845" cy="1262063"/>
           </a:xfrm>
         </p:spPr>
         <p:txBody>
@@ -2827,39 +2827,39 @@
           <a:lstStyle>
             <a:lvl1pPr marL="0" indent="0">
               <a:buNone/>
-              <a:defRPr sz="1400"/>
+              <a:defRPr sz="1300"/>
             </a:lvl1pPr>
-            <a:lvl2pPr marL="188058" indent="0">
-              <a:buNone/>
-              <a:defRPr sz="1200"/>
+            <a:lvl2pPr marL="174819" indent="0">
+              <a:buNone/>
+              <a:defRPr sz="1100"/>
             </a:lvl2pPr>
-            <a:lvl3pPr marL="376117" indent="0">
-              <a:buNone/>
-              <a:defRPr sz="1000"/>
+            <a:lvl3pPr marL="349638" indent="0">
+              <a:buNone/>
+              <a:defRPr sz="900"/>
             </a:lvl3pPr>
-            <a:lvl4pPr marL="564175" indent="0">
-              <a:buNone/>
-              <a:defRPr sz="800"/>
+            <a:lvl4pPr marL="524457" indent="0">
+              <a:buNone/>
+              <a:defRPr sz="700"/>
             </a:lvl4pPr>
-            <a:lvl5pPr marL="752233" indent="0">
-              <a:buNone/>
-              <a:defRPr sz="800"/>
+            <a:lvl5pPr marL="699276" indent="0">
+              <a:buNone/>
+              <a:defRPr sz="700"/>
             </a:lvl5pPr>
-            <a:lvl6pPr marL="940291" indent="0">
-              <a:buNone/>
-              <a:defRPr sz="800"/>
+            <a:lvl6pPr marL="874095" indent="0">
+              <a:buNone/>
+              <a:defRPr sz="700"/>
             </a:lvl6pPr>
-            <a:lvl7pPr marL="1128349" indent="0">
-              <a:buNone/>
-              <a:defRPr sz="800"/>
+            <a:lvl7pPr marL="1048913" indent="0">
+              <a:buNone/>
+              <a:defRPr sz="700"/>
             </a:lvl7pPr>
-            <a:lvl8pPr marL="1316407" indent="0">
-              <a:buNone/>
-              <a:defRPr sz="800"/>
+            <a:lvl8pPr marL="1223732" indent="0">
+              <a:buNone/>
+              <a:defRPr sz="700"/>
             </a:lvl8pPr>
-            <a:lvl9pPr marL="1504465" indent="0">
-              <a:buNone/>
-              <a:defRPr sz="800"/>
+            <a:lvl9pPr marL="1398551" indent="0">
+              <a:buNone/>
+              <a:defRPr sz="700"/>
             </a:lvl9pPr>
           </a:lstStyle>
           <a:p>
@@ -2879,8 +2879,8 @@
         </p:nvSpPr>
         <p:spPr>
           <a:xfrm>
-            <a:off x="627301" y="2004060"/>
-            <a:ext cx="1920240" cy="300519"/>
+            <a:off x="466123" y="1646242"/>
+            <a:ext cx="1426845" cy="246861"/>
           </a:xfrm>
         </p:spPr>
         <p:txBody>
@@ -2890,35 +2890,35 @@
               <a:buNone/>
               <a:defRPr sz="500"/>
             </a:lvl1pPr>
-            <a:lvl2pPr marL="188058" indent="0">
+            <a:lvl2pPr marL="174819" indent="0">
               <a:buNone/>
               <a:defRPr sz="500"/>
             </a:lvl2pPr>
-            <a:lvl3pPr marL="376117" indent="0">
+            <a:lvl3pPr marL="349638" indent="0">
               <a:buNone/>
               <a:defRPr sz="500"/>
             </a:lvl3pPr>
-            <a:lvl4pPr marL="564175" indent="0">
+            <a:lvl4pPr marL="524457" indent="0">
               <a:buNone/>
               <a:defRPr sz="400"/>
             </a:lvl4pPr>
-            <a:lvl5pPr marL="752233" indent="0">
+            <a:lvl5pPr marL="699276" indent="0">
               <a:buNone/>
               <a:defRPr sz="400"/>
             </a:lvl5pPr>
-            <a:lvl6pPr marL="940291" indent="0">
+            <a:lvl6pPr marL="874095" indent="0">
               <a:buNone/>
               <a:defRPr sz="400"/>
             </a:lvl6pPr>
-            <a:lvl7pPr marL="1128349" indent="0">
+            <a:lvl7pPr marL="1048913" indent="0">
               <a:buNone/>
               <a:defRPr sz="400"/>
             </a:lvl7pPr>
-            <a:lvl8pPr marL="1316407" indent="0">
+            <a:lvl8pPr marL="1223732" indent="0">
               <a:buNone/>
               <a:defRPr sz="400"/>
             </a:lvl8pPr>
-            <a:lvl9pPr marL="1504465" indent="0">
+            <a:lvl9pPr marL="1398551" indent="0">
               <a:buNone/>
               <a:defRPr sz="400"/>
             </a:lvl9pPr>
@@ -2949,7 +2949,7 @@
           <a:p>
             <a:fld id="{F0172217-DC24-48CD-AE89-68C8C8D878B4}" type="datetimeFigureOut">
               <a:rPr lang="en-US" smtClean="0"/>
-              <a:t>9/15/2010</a:t>
+              <a:t>9/28/2010</a:t>
             </a:fld>
             <a:endParaRPr lang="en-US"/>
           </a:p>
@@ -3044,15 +3044,15 @@
         </p:nvSpPr>
         <p:spPr>
           <a:xfrm>
-            <a:off x="160020" y="102546"/>
-            <a:ext cx="2880360" cy="426773"/>
+            <a:off x="118906" y="84241"/>
+            <a:ext cx="2140267" cy="350573"/>
           </a:xfrm>
           <a:prstGeom prst="rect">
             <a:avLst/>
           </a:prstGeom>
         </p:spPr>
         <p:txBody>
-          <a:bodyPr vert="horz" lIns="37612" tIns="18806" rIns="37612" bIns="18806" rtlCol="0" anchor="ctr">
+          <a:bodyPr vert="horz" lIns="34964" tIns="17482" rIns="34964" bIns="17482" rtlCol="0" anchor="ctr">
             <a:normAutofit/>
           </a:bodyPr>
           <a:lstStyle/>
@@ -3077,15 +3077,15 @@
         </p:nvSpPr>
         <p:spPr>
           <a:xfrm>
-            <a:off x="160020" y="597484"/>
-            <a:ext cx="2880360" cy="1689903"/>
+            <a:off x="118906" y="490808"/>
+            <a:ext cx="2140267" cy="1388172"/>
           </a:xfrm>
           <a:prstGeom prst="rect">
             <a:avLst/>
           </a:prstGeom>
         </p:spPr>
         <p:txBody>
-          <a:bodyPr vert="horz" lIns="37612" tIns="18806" rIns="37612" bIns="18806" rtlCol="0">
+          <a:bodyPr vert="horz" lIns="34964" tIns="17482" rIns="34964" bIns="17482" rtlCol="0">
             <a:normAutofit/>
           </a:bodyPr>
           <a:lstStyle/>
@@ -3139,15 +3139,15 @@
         </p:nvSpPr>
         <p:spPr>
           <a:xfrm>
-            <a:off x="160020" y="2373338"/>
-            <a:ext cx="746760" cy="136331"/>
+            <a:off x="118904" y="1949585"/>
+            <a:ext cx="554884" cy="111989"/>
           </a:xfrm>
           <a:prstGeom prst="rect">
             <a:avLst/>
           </a:prstGeom>
         </p:spPr>
         <p:txBody>
-          <a:bodyPr vert="horz" lIns="37612" tIns="18806" rIns="37612" bIns="18806" rtlCol="0" anchor="ctr"/>
+          <a:bodyPr vert="horz" lIns="34964" tIns="17482" rIns="34964" bIns="17482" rtlCol="0" anchor="ctr"/>
           <a:lstStyle>
             <a:lvl1pPr algn="l">
               <a:defRPr sz="500">
@@ -3162,7 +3162,7 @@
           <a:p>
             <a:fld id="{F0172217-DC24-48CD-AE89-68C8C8D878B4}" type="datetimeFigureOut">
               <a:rPr lang="en-US" smtClean="0"/>
-              <a:t>9/15/2010</a:t>
+              <a:t>9/28/2010</a:t>
             </a:fld>
             <a:endParaRPr lang="en-US"/>
           </a:p>
@@ -3180,15 +3180,15 @@
         </p:nvSpPr>
         <p:spPr>
           <a:xfrm>
-            <a:off x="1093470" y="2373338"/>
-            <a:ext cx="1013460" cy="136331"/>
+            <a:off x="812514" y="1949585"/>
+            <a:ext cx="753057" cy="111989"/>
           </a:xfrm>
           <a:prstGeom prst="rect">
             <a:avLst/>
           </a:prstGeom>
         </p:spPr>
         <p:txBody>
-          <a:bodyPr vert="horz" lIns="37612" tIns="18806" rIns="37612" bIns="18806" rtlCol="0" anchor="ctr"/>
+          <a:bodyPr vert="horz" lIns="34964" tIns="17482" rIns="34964" bIns="17482" rtlCol="0" anchor="ctr"/>
           <a:lstStyle>
             <a:lvl1pPr algn="ctr">
               <a:defRPr sz="500">
@@ -3217,15 +3217,15 @@
         </p:nvSpPr>
         <p:spPr>
           <a:xfrm>
-            <a:off x="2293620" y="2373338"/>
-            <a:ext cx="746760" cy="136331"/>
+            <a:off x="1704287" y="1949585"/>
+            <a:ext cx="554884" cy="111989"/>
           </a:xfrm>
           <a:prstGeom prst="rect">
             <a:avLst/>
           </a:prstGeom>
         </p:spPr>
         <p:txBody>
-          <a:bodyPr vert="horz" lIns="37612" tIns="18806" rIns="37612" bIns="18806" rtlCol="0" anchor="ctr"/>
+          <a:bodyPr vert="horz" lIns="34964" tIns="17482" rIns="34964" bIns="17482" rtlCol="0" anchor="ctr"/>
           <a:lstStyle>
             <a:lvl1pPr algn="r">
               <a:defRPr sz="500">
@@ -3269,12 +3269,12 @@
   </p:sldLayoutIdLst>
   <p:txStyles>
     <p:titleStyle>
-      <a:lvl1pPr algn="ctr" defTabSz="376117" rtl="0" eaLnBrk="1" latinLnBrk="0" hangingPunct="1">
+      <a:lvl1pPr algn="ctr" defTabSz="349638" rtl="0" eaLnBrk="1" latinLnBrk="0" hangingPunct="1">
         <a:spcBef>
           <a:spcPct val="0"/>
         </a:spcBef>
         <a:buNone/>
-        <a:defRPr sz="1800" kern="1200">
+        <a:defRPr sz="1700" kern="1200">
           <a:solidFill>
             <a:schemeClr val="tx1"/>
           </a:solidFill>
@@ -3285,13 +3285,13 @@
       </a:lvl1pPr>
     </p:titleStyle>
     <p:bodyStyle>
-      <a:lvl1pPr marL="141044" indent="-141044" algn="l" defTabSz="376117" rtl="0" eaLnBrk="1" latinLnBrk="0" hangingPunct="1">
+      <a:lvl1pPr marL="131115" indent="-131115" algn="l" defTabSz="349638" rtl="0" eaLnBrk="1" latinLnBrk="0" hangingPunct="1">
         <a:spcBef>
           <a:spcPct val="20000"/>
         </a:spcBef>
         <a:buFont typeface="Arial" pitchFamily="34" charset="0"/>
         <a:buChar char="•"/>
-        <a:defRPr sz="1400" kern="1200">
+        <a:defRPr sz="1300" kern="1200">
           <a:solidFill>
             <a:schemeClr val="tx1"/>
           </a:solidFill>
@@ -3300,13 +3300,13 @@
           <a:cs typeface="+mn-cs"/>
         </a:defRPr>
       </a:lvl1pPr>
-      <a:lvl2pPr marL="305594" indent="-117536" algn="l" defTabSz="376117" rtl="0" eaLnBrk="1" latinLnBrk="0" hangingPunct="1">
+      <a:lvl2pPr marL="284080" indent="-109261" algn="l" defTabSz="349638" rtl="0" eaLnBrk="1" latinLnBrk="0" hangingPunct="1">
         <a:spcBef>
           <a:spcPct val="20000"/>
         </a:spcBef>
         <a:buFont typeface="Arial" pitchFamily="34" charset="0"/>
         <a:buChar char="–"/>
-        <a:defRPr sz="1200" kern="1200">
+        <a:defRPr sz="1100" kern="1200">
           <a:solidFill>
             <a:schemeClr val="tx1"/>
           </a:solidFill>
@@ -3315,13 +3315,13 @@
           <a:cs typeface="+mn-cs"/>
         </a:defRPr>
       </a:lvl2pPr>
-      <a:lvl3pPr marL="470146" indent="-94029" algn="l" defTabSz="376117" rtl="0" eaLnBrk="1" latinLnBrk="0" hangingPunct="1">
+      <a:lvl3pPr marL="437048" indent="-87409" algn="l" defTabSz="349638" rtl="0" eaLnBrk="1" latinLnBrk="0" hangingPunct="1">
         <a:spcBef>
           <a:spcPct val="20000"/>
         </a:spcBef>
         <a:buFont typeface="Arial" pitchFamily="34" charset="0"/>
         <a:buChar char="•"/>
-        <a:defRPr sz="1000" kern="1200">
+        <a:defRPr sz="900" kern="1200">
           <a:solidFill>
             <a:schemeClr val="tx1"/>
           </a:solidFill>
@@ -3330,13 +3330,13 @@
           <a:cs typeface="+mn-cs"/>
         </a:defRPr>
       </a:lvl3pPr>
-      <a:lvl4pPr marL="658203" indent="-94029" algn="l" defTabSz="376117" rtl="0" eaLnBrk="1" latinLnBrk="0" hangingPunct="1">
+      <a:lvl4pPr marL="611866" indent="-87409" algn="l" defTabSz="349638" rtl="0" eaLnBrk="1" latinLnBrk="0" hangingPunct="1">
         <a:spcBef>
           <a:spcPct val="20000"/>
         </a:spcBef>
         <a:buFont typeface="Arial" pitchFamily="34" charset="0"/>
         <a:buChar char="–"/>
-        <a:defRPr sz="800" kern="1200">
+        <a:defRPr sz="700" kern="1200">
           <a:solidFill>
             <a:schemeClr val="tx1"/>
           </a:solidFill>
@@ -3345,13 +3345,13 @@
           <a:cs typeface="+mn-cs"/>
         </a:defRPr>
       </a:lvl4pPr>
-      <a:lvl5pPr marL="846262" indent="-94029" algn="l" defTabSz="376117" rtl="0" eaLnBrk="1" latinLnBrk="0" hangingPunct="1">
+      <a:lvl5pPr marL="786685" indent="-87409" algn="l" defTabSz="349638" rtl="0" eaLnBrk="1" latinLnBrk="0" hangingPunct="1">
         <a:spcBef>
           <a:spcPct val="20000"/>
         </a:spcBef>
         <a:buFont typeface="Arial" pitchFamily="34" charset="0"/>
         <a:buChar char="»"/>
-        <a:defRPr sz="800" kern="1200">
+        <a:defRPr sz="700" kern="1200">
           <a:solidFill>
             <a:schemeClr val="tx1"/>
           </a:solidFill>
@@ -3360,13 +3360,13 @@
           <a:cs typeface="+mn-cs"/>
         </a:defRPr>
       </a:lvl5pPr>
-      <a:lvl6pPr marL="1034320" indent="-94029" algn="l" defTabSz="376117" rtl="0" eaLnBrk="1" latinLnBrk="0" hangingPunct="1">
+      <a:lvl6pPr marL="961504" indent="-87409" algn="l" defTabSz="349638" rtl="0" eaLnBrk="1" latinLnBrk="0" hangingPunct="1">
         <a:spcBef>
           <a:spcPct val="20000"/>
         </a:spcBef>
         <a:buFont typeface="Arial" pitchFamily="34" charset="0"/>
         <a:buChar char="•"/>
-        <a:defRPr sz="800" kern="1200">
+        <a:defRPr sz="700" kern="1200">
           <a:solidFill>
             <a:schemeClr val="tx1"/>
           </a:solidFill>
@@ -3375,13 +3375,13 @@
           <a:cs typeface="+mn-cs"/>
         </a:defRPr>
       </a:lvl6pPr>
-      <a:lvl7pPr marL="1222378" indent="-94029" algn="l" defTabSz="376117" rtl="0" eaLnBrk="1" latinLnBrk="0" hangingPunct="1">
+      <a:lvl7pPr marL="1136323" indent="-87409" algn="l" defTabSz="349638" rtl="0" eaLnBrk="1" latinLnBrk="0" hangingPunct="1">
         <a:spcBef>
           <a:spcPct val="20000"/>
         </a:spcBef>
         <a:buFont typeface="Arial" pitchFamily="34" charset="0"/>
         <a:buChar char="•"/>
-        <a:defRPr sz="800" kern="1200">
+        <a:defRPr sz="700" kern="1200">
           <a:solidFill>
             <a:schemeClr val="tx1"/>
           </a:solidFill>
@@ -3390,13 +3390,13 @@
           <a:cs typeface="+mn-cs"/>
         </a:defRPr>
       </a:lvl7pPr>
-      <a:lvl8pPr marL="1410436" indent="-94029" algn="l" defTabSz="376117" rtl="0" eaLnBrk="1" latinLnBrk="0" hangingPunct="1">
+      <a:lvl8pPr marL="1311141" indent="-87409" algn="l" defTabSz="349638" rtl="0" eaLnBrk="1" latinLnBrk="0" hangingPunct="1">
         <a:spcBef>
           <a:spcPct val="20000"/>
         </a:spcBef>
         <a:buFont typeface="Arial" pitchFamily="34" charset="0"/>
         <a:buChar char="•"/>
-        <a:defRPr sz="800" kern="1200">
+        <a:defRPr sz="700" kern="1200">
           <a:solidFill>
             <a:schemeClr val="tx1"/>
           </a:solidFill>
@@ -3405,13 +3405,13 @@
           <a:cs typeface="+mn-cs"/>
         </a:defRPr>
       </a:lvl8pPr>
-      <a:lvl9pPr marL="1598494" indent="-94029" algn="l" defTabSz="376117" rtl="0" eaLnBrk="1" latinLnBrk="0" hangingPunct="1">
+      <a:lvl9pPr marL="1485960" indent="-87409" algn="l" defTabSz="349638" rtl="0" eaLnBrk="1" latinLnBrk="0" hangingPunct="1">
         <a:spcBef>
           <a:spcPct val="20000"/>
         </a:spcBef>
         <a:buFont typeface="Arial" pitchFamily="34" charset="0"/>
         <a:buChar char="•"/>
-        <a:defRPr sz="800" kern="1200">
+        <a:defRPr sz="700" kern="1200">
           <a:solidFill>
             <a:schemeClr val="tx1"/>
           </a:solidFill>
@@ -3425,7 +3425,7 @@
       <a:defPPr>
         <a:defRPr lang="en-US"/>
       </a:defPPr>
-      <a:lvl1pPr marL="0" algn="l" defTabSz="376117" rtl="0" eaLnBrk="1" latinLnBrk="0" hangingPunct="1">
+      <a:lvl1pPr marL="0" algn="l" defTabSz="349638" rtl="0" eaLnBrk="1" latinLnBrk="0" hangingPunct="1">
         <a:defRPr sz="700" kern="1200">
           <a:solidFill>
             <a:schemeClr val="tx1"/>
@@ -3435,7 +3435,7 @@
           <a:cs typeface="+mn-cs"/>
         </a:defRPr>
       </a:lvl1pPr>
-      <a:lvl2pPr marL="188058" algn="l" defTabSz="376117" rtl="0" eaLnBrk="1" latinLnBrk="0" hangingPunct="1">
+      <a:lvl2pPr marL="174819" algn="l" defTabSz="349638" rtl="0" eaLnBrk="1" latinLnBrk="0" hangingPunct="1">
         <a:defRPr sz="700" kern="1200">
           <a:solidFill>
             <a:schemeClr val="tx1"/>
@@ -3445,7 +3445,7 @@
           <a:cs typeface="+mn-cs"/>
         </a:defRPr>
       </a:lvl2pPr>
-      <a:lvl3pPr marL="376117" algn="l" defTabSz="376117" rtl="0" eaLnBrk="1" latinLnBrk="0" hangingPunct="1">
+      <a:lvl3pPr marL="349638" algn="l" defTabSz="349638" rtl="0" eaLnBrk="1" latinLnBrk="0" hangingPunct="1">
         <a:defRPr sz="700" kern="1200">
           <a:solidFill>
             <a:schemeClr val="tx1"/>
@@ -3455,7 +3455,7 @@
           <a:cs typeface="+mn-cs"/>
         </a:defRPr>
       </a:lvl3pPr>
-      <a:lvl4pPr marL="564175" algn="l" defTabSz="376117" rtl="0" eaLnBrk="1" latinLnBrk="0" hangingPunct="1">
+      <a:lvl4pPr marL="524457" algn="l" defTabSz="349638" rtl="0" eaLnBrk="1" latinLnBrk="0" hangingPunct="1">
         <a:defRPr sz="700" kern="1200">
           <a:solidFill>
             <a:schemeClr val="tx1"/>
@@ -3465,7 +3465,7 @@
           <a:cs typeface="+mn-cs"/>
         </a:defRPr>
       </a:lvl4pPr>
-      <a:lvl5pPr marL="752233" algn="l" defTabSz="376117" rtl="0" eaLnBrk="1" latinLnBrk="0" hangingPunct="1">
+      <a:lvl5pPr marL="699276" algn="l" defTabSz="349638" rtl="0" eaLnBrk="1" latinLnBrk="0" hangingPunct="1">
         <a:defRPr sz="700" kern="1200">
           <a:solidFill>
             <a:schemeClr val="tx1"/>
@@ -3475,7 +3475,7 @@
           <a:cs typeface="+mn-cs"/>
         </a:defRPr>
       </a:lvl5pPr>
-      <a:lvl6pPr marL="940291" algn="l" defTabSz="376117" rtl="0" eaLnBrk="1" latinLnBrk="0" hangingPunct="1">
+      <a:lvl6pPr marL="874095" algn="l" defTabSz="349638" rtl="0" eaLnBrk="1" latinLnBrk="0" hangingPunct="1">
         <a:defRPr sz="700" kern="1200">
           <a:solidFill>
             <a:schemeClr val="tx1"/>
@@ -3485,7 +3485,7 @@
           <a:cs typeface="+mn-cs"/>
         </a:defRPr>
       </a:lvl6pPr>
-      <a:lvl7pPr marL="1128349" algn="l" defTabSz="376117" rtl="0" eaLnBrk="1" latinLnBrk="0" hangingPunct="1">
+      <a:lvl7pPr marL="1048913" algn="l" defTabSz="349638" rtl="0" eaLnBrk="1" latinLnBrk="0" hangingPunct="1">
         <a:defRPr sz="700" kern="1200">
           <a:solidFill>
             <a:schemeClr val="tx1"/>
@@ -3495,7 +3495,7 @@
           <a:cs typeface="+mn-cs"/>
         </a:defRPr>
       </a:lvl7pPr>
-      <a:lvl8pPr marL="1316407" algn="l" defTabSz="376117" rtl="0" eaLnBrk="1" latinLnBrk="0" hangingPunct="1">
+      <a:lvl8pPr marL="1223732" algn="l" defTabSz="349638" rtl="0" eaLnBrk="1" latinLnBrk="0" hangingPunct="1">
         <a:defRPr sz="700" kern="1200">
           <a:solidFill>
             <a:schemeClr val="tx1"/>
@@ -3505,7 +3505,7 @@
           <a:cs typeface="+mn-cs"/>
         </a:defRPr>
       </a:lvl8pPr>
-      <a:lvl9pPr marL="1504465" algn="l" defTabSz="376117" rtl="0" eaLnBrk="1" latinLnBrk="0" hangingPunct="1">
+      <a:lvl9pPr marL="1398551" algn="l" defTabSz="349638" rtl="0" eaLnBrk="1" latinLnBrk="0" hangingPunct="1">
         <a:defRPr sz="700" kern="1200">
           <a:solidFill>
             <a:schemeClr val="tx1"/>
@@ -3539,161 +3539,154 @@
       </p:grpSpPr>
       <p:grpSp>
         <p:nvGrpSpPr>
-          <p:cNvPr id="3" name="Group 2"/>
+          <p:cNvPr id="2" name="Group 1"/>
           <p:cNvGrpSpPr/>
           <p:nvPr/>
         </p:nvGrpSpPr>
         <p:grpSpPr>
           <a:xfrm>
-            <a:off x="69742" y="54992"/>
-            <a:ext cx="3060916" cy="2450655"/>
-            <a:chOff x="74572" y="54992"/>
-            <a:chExt cx="3060916" cy="2450655"/>
+            <a:off x="47484" y="62107"/>
+            <a:ext cx="2283106" cy="1979224"/>
+            <a:chOff x="47484" y="62107"/>
+            <a:chExt cx="2283106" cy="1979224"/>
           </a:xfrm>
         </p:grpSpPr>
-        <p:grpSp>
-          <p:nvGrpSpPr>
-            <p:cNvPr id="2" name="Group 1"/>
-            <p:cNvGrpSpPr/>
+        <p:sp>
+          <p:nvSpPr>
+            <p:cNvPr id="65" name="Rectangle 64"/>
+            <p:cNvSpPr/>
             <p:nvPr/>
-          </p:nvGrpSpPr>
-          <p:grpSpPr>
+          </p:nvSpPr>
+          <p:spPr>
             <a:xfrm>
-              <a:off x="116648" y="711633"/>
-              <a:ext cx="1534747" cy="433495"/>
-              <a:chOff x="116648" y="711633"/>
-              <a:chExt cx="1534747" cy="433495"/>
+              <a:off x="118765" y="388636"/>
+              <a:ext cx="1502199" cy="279596"/>
             </a:xfrm>
-          </p:grpSpPr>
-          <p:sp>
-            <p:nvSpPr>
-              <p:cNvPr id="162" name="Rectangle 161"/>
-              <p:cNvSpPr/>
-              <p:nvPr/>
-            </p:nvSpPr>
-            <p:spPr>
-              <a:xfrm>
-                <a:off x="149196" y="711633"/>
-                <a:ext cx="1502199" cy="279596"/>
-              </a:xfrm>
-              <a:prstGeom prst="rect">
-                <a:avLst/>
-              </a:prstGeom>
-              <a:noFill/>
-              <a:ln w="6350">
-                <a:solidFill>
-                  <a:srgbClr val="002060"/>
-                </a:solidFill>
-              </a:ln>
-            </p:spPr>
-            <p:style>
-              <a:lnRef idx="2">
-                <a:schemeClr val="accent1">
-                  <a:shade val="50000"/>
-                </a:schemeClr>
-              </a:lnRef>
-              <a:fillRef idx="1">
-                <a:schemeClr val="accent1"/>
-              </a:fillRef>
-              <a:effectRef idx="0">
-                <a:schemeClr val="accent1"/>
-              </a:effectRef>
-              <a:fontRef idx="minor">
-                <a:schemeClr val="lt1"/>
-              </a:fontRef>
-            </p:style>
-            <p:txBody>
-              <a:bodyPr rtlCol="0" anchor="t"/>
-              <a:lstStyle/>
-              <a:p>
-                <a:pPr algn="ctr"/>
-                <a:r>
-                  <a:rPr lang="en-US" sz="1100" b="1" dirty="0" smtClean="0">
-                    <a:solidFill>
-                      <a:schemeClr val="tx1"/>
-                    </a:solidFill>
-                  </a:rPr>
-                  <a:t>HierarchicalModel</a:t>
-                </a:r>
-                <a:endParaRPr lang="en-US" sz="900" dirty="0">
+            <a:prstGeom prst="rect">
+              <a:avLst/>
+            </a:prstGeom>
+            <a:noFill/>
+            <a:ln w="6350">
+              <a:solidFill>
+                <a:schemeClr val="tx1"/>
+              </a:solidFill>
+            </a:ln>
+          </p:spPr>
+          <p:style>
+            <a:lnRef idx="2">
+              <a:schemeClr val="accent1">
+                <a:shade val="50000"/>
+              </a:schemeClr>
+            </a:lnRef>
+            <a:fillRef idx="1">
+              <a:schemeClr val="accent1"/>
+            </a:fillRef>
+            <a:effectRef idx="0">
+              <a:schemeClr val="accent1"/>
+            </a:effectRef>
+            <a:fontRef idx="minor">
+              <a:schemeClr val="lt1"/>
+            </a:fontRef>
+          </p:style>
+          <p:txBody>
+            <a:bodyPr rtlCol="0" anchor="t"/>
+            <a:lstStyle/>
+            <a:p>
+              <a:pPr algn="ctr"/>
+              <a:r>
+                <a:rPr lang="en-US" sz="1100" b="1" dirty="0" smtClean="0">
                   <a:solidFill>
                     <a:schemeClr val="tx1"/>
                   </a:solidFill>
-                </a:endParaRPr>
-              </a:p>
-            </p:txBody>
-          </p:sp>
-          <p:sp>
-            <p:nvSpPr>
-              <p:cNvPr id="163" name="Diamond 162"/>
-              <p:cNvSpPr/>
-              <p:nvPr/>
-            </p:nvSpPr>
-            <p:spPr>
-              <a:xfrm>
-                <a:off x="116648" y="992730"/>
-                <a:ext cx="66869" cy="152398"/>
-              </a:xfrm>
-              <a:prstGeom prst="diamond">
-                <a:avLst/>
-              </a:prstGeom>
+                </a:rPr>
+                <a:t>Model </a:t>
+              </a:r>
+              <a:r>
+                <a:rPr lang="en-US" sz="900" b="1" i="1" dirty="0" smtClean="0">
+                  <a:solidFill>
+                    <a:srgbClr val="00B050"/>
+                  </a:solidFill>
+                </a:rPr>
+                <a:t>(extended)</a:t>
+              </a:r>
+              <a:endParaRPr lang="en-US" sz="600" i="1" dirty="0">
+                <a:solidFill>
+                  <a:srgbClr val="00B050"/>
+                </a:solidFill>
+              </a:endParaRPr>
+            </a:p>
+          </p:txBody>
+        </p:sp>
+        <p:sp>
+          <p:nvSpPr>
+            <p:cNvPr id="66" name="Diamond 65"/>
+            <p:cNvSpPr/>
+            <p:nvPr/>
+          </p:nvSpPr>
+          <p:spPr>
+            <a:xfrm>
+              <a:off x="86217" y="669733"/>
+              <a:ext cx="66869" cy="152398"/>
+            </a:xfrm>
+            <a:prstGeom prst="diamond">
+              <a:avLst/>
+            </a:prstGeom>
+            <a:solidFill>
+              <a:srgbClr val="00B050"/>
+            </a:solidFill>
+            <a:ln w="6350">
               <a:solidFill>
-                <a:schemeClr val="tx1"/>
+                <a:srgbClr val="00B050"/>
               </a:solidFill>
-              <a:ln w="6350">
-                <a:solidFill>
-                  <a:schemeClr val="tx1"/>
-                </a:solidFill>
-              </a:ln>
-            </p:spPr>
-            <p:style>
-              <a:lnRef idx="2">
-                <a:schemeClr val="accent1">
-                  <a:shade val="50000"/>
-                </a:schemeClr>
-              </a:lnRef>
-              <a:fillRef idx="1">
-                <a:schemeClr val="accent1"/>
-              </a:fillRef>
-              <a:effectRef idx="0">
-                <a:schemeClr val="accent1"/>
-              </a:effectRef>
-              <a:fontRef idx="minor">
-                <a:schemeClr val="lt1"/>
-              </a:fontRef>
-            </p:style>
-            <p:txBody>
-              <a:bodyPr lIns="91440" tIns="45720" rIns="91440" bIns="45720" spcCol="0" rtlCol="0" anchor="ctr"/>
-              <a:lstStyle/>
-              <a:p>
-                <a:pPr algn="ctr"/>
-                <a:endParaRPr lang="en-US"/>
-              </a:p>
-            </p:txBody>
-          </p:sp>
-        </p:grpSp>
+            </a:ln>
+          </p:spPr>
+          <p:style>
+            <a:lnRef idx="2">
+              <a:schemeClr val="accent1">
+                <a:shade val="50000"/>
+              </a:schemeClr>
+            </a:lnRef>
+            <a:fillRef idx="1">
+              <a:schemeClr val="accent1"/>
+            </a:fillRef>
+            <a:effectRef idx="0">
+              <a:schemeClr val="accent1"/>
+            </a:effectRef>
+            <a:fontRef idx="minor">
+              <a:schemeClr val="lt1"/>
+            </a:fontRef>
+          </p:style>
+          <p:txBody>
+            <a:bodyPr lIns="91440" tIns="45720" rIns="91440" bIns="45720" spcCol="0" rtlCol="0" anchor="ctr"/>
+            <a:lstStyle/>
+            <a:p>
+              <a:pPr algn="ctr"/>
+              <a:endParaRPr lang="en-US"/>
+            </a:p>
+          </p:txBody>
+        </p:sp>
         <p:cxnSp>
           <p:nvCxnSpPr>
-            <p:cNvPr id="144" name="Elbow Connector 143"/>
+            <p:cNvPr id="67" name="Elbow Connector 66"/>
             <p:cNvCxnSpPr>
-              <a:stCxn id="159" idx="2"/>
-              <a:endCxn id="150" idx="0"/>
+              <a:stCxn id="76" idx="2"/>
+              <a:endCxn id="72" idx="0"/>
             </p:cNvCxnSpPr>
             <p:nvPr/>
           </p:nvCxnSpPr>
           <p:spPr>
             <a:xfrm rot="16200000" flipH="1">
-              <a:off x="730885" y="1516116"/>
-              <a:ext cx="342896" cy="1026567"/>
+              <a:off x="672370" y="1109711"/>
+              <a:ext cx="210807" cy="1042832"/>
             </a:xfrm>
             <a:prstGeom prst="bentConnector3">
               <a:avLst>
-                <a:gd name="adj1" fmla="val 34615"/>
+                <a:gd name="adj1" fmla="val 50000"/>
               </a:avLst>
             </a:prstGeom>
             <a:ln w="6350">
               <a:solidFill>
-                <a:schemeClr val="tx1"/>
+                <a:srgbClr val="0070C0"/>
               </a:solidFill>
             </a:ln>
           </p:spPr>
@@ -3714,17 +3707,17 @@
         </p:cxnSp>
         <p:cxnSp>
           <p:nvCxnSpPr>
-            <p:cNvPr id="145" name="Elbow Connector 144"/>
+            <p:cNvPr id="68" name="Elbow Connector 67"/>
             <p:cNvCxnSpPr>
-              <a:stCxn id="163" idx="2"/>
-              <a:endCxn id="158" idx="0"/>
+              <a:stCxn id="66" idx="2"/>
+              <a:endCxn id="75" idx="0"/>
             </p:cNvCxnSpPr>
             <p:nvPr/>
           </p:nvCxnSpPr>
           <p:spPr>
             <a:xfrm rot="16200000" flipH="1">
-              <a:off x="551271" y="743940"/>
-              <a:ext cx="257448" cy="1059824"/>
+              <a:off x="437997" y="503786"/>
+              <a:ext cx="248218" cy="884908"/>
             </a:xfrm>
             <a:prstGeom prst="bentConnector3">
               <a:avLst>
@@ -3733,7 +3726,7 @@
             </a:prstGeom>
             <a:ln w="6350">
               <a:solidFill>
-                <a:schemeClr val="tx1"/>
+                <a:srgbClr val="00B050"/>
               </a:solidFill>
             </a:ln>
           </p:spPr>
@@ -3754,28 +3747,28 @@
         </p:cxnSp>
         <p:grpSp>
           <p:nvGrpSpPr>
-            <p:cNvPr id="146" name="Group 145"/>
+            <p:cNvPr id="69" name="Group 68"/>
             <p:cNvGrpSpPr/>
             <p:nvPr/>
           </p:nvGrpSpPr>
           <p:grpSpPr>
             <a:xfrm>
-              <a:off x="2553319" y="54992"/>
-              <a:ext cx="582169" cy="422032"/>
-              <a:chOff x="4453762" y="214881"/>
-              <a:chExt cx="582169" cy="422032"/>
+              <a:off x="1748421" y="62107"/>
+              <a:ext cx="582169" cy="395396"/>
+              <a:chOff x="1585454" y="260276"/>
+              <a:chExt cx="582169" cy="395396"/>
             </a:xfrm>
           </p:grpSpPr>
           <p:sp>
             <p:nvSpPr>
-              <p:cNvPr id="160" name="Rectangle 159"/>
+              <p:cNvPr id="78" name="Rectangle 77"/>
               <p:cNvSpPr/>
               <p:nvPr/>
             </p:nvSpPr>
             <p:spPr>
               <a:xfrm>
-                <a:off x="4453762" y="214881"/>
-                <a:ext cx="582169" cy="304800"/>
+                <a:off x="1585454" y="260276"/>
+                <a:ext cx="582169" cy="281097"/>
               </a:xfrm>
               <a:prstGeom prst="rect">
                 <a:avLst/>
@@ -3821,13 +3814,13 @@
           </p:sp>
           <p:sp>
             <p:nvSpPr>
-              <p:cNvPr id="161" name="Isosceles Triangle 160"/>
+              <p:cNvPr id="79" name="Isosceles Triangle 78"/>
               <p:cNvSpPr/>
               <p:nvPr/>
             </p:nvSpPr>
             <p:spPr>
               <a:xfrm>
-                <a:off x="4682364" y="522613"/>
+                <a:off x="1814057" y="541372"/>
                 <a:ext cx="159199" cy="114300"/>
               </a:xfrm>
               <a:prstGeom prst="triangle">
@@ -3872,64 +3865,24 @@
         </p:grpSp>
         <p:cxnSp>
           <p:nvCxnSpPr>
-            <p:cNvPr id="147" name="Elbow Connector 146"/>
+            <p:cNvPr id="70" name="Elbow Connector 69"/>
             <p:cNvCxnSpPr>
-              <a:stCxn id="162" idx="0"/>
-              <a:endCxn id="157" idx="3"/>
-            </p:cNvCxnSpPr>
-            <p:nvPr/>
-          </p:nvCxnSpPr>
-          <p:spPr>
-            <a:xfrm rot="5400000" flipH="1" flipV="1">
-              <a:off x="1497311" y="-1608"/>
-              <a:ext cx="116226" cy="1310257"/>
-            </a:xfrm>
-            <a:prstGeom prst="bentConnector3">
-              <a:avLst>
-                <a:gd name="adj1" fmla="val 296686"/>
-              </a:avLst>
-            </a:prstGeom>
-            <a:ln w="6350">
-              <a:solidFill>
-                <a:schemeClr val="tx1"/>
-              </a:solidFill>
-            </a:ln>
-          </p:spPr>
-          <p:style>
-            <a:lnRef idx="1">
-              <a:schemeClr val="accent1"/>
-            </a:lnRef>
-            <a:fillRef idx="0">
-              <a:schemeClr val="accent1"/>
-            </a:fillRef>
-            <a:effectRef idx="0">
-              <a:schemeClr val="accent1"/>
-            </a:effectRef>
-            <a:fontRef idx="minor">
-              <a:schemeClr val="tx1"/>
-            </a:fontRef>
-          </p:style>
-        </p:cxnSp>
-        <p:cxnSp>
-          <p:nvCxnSpPr>
-            <p:cNvPr id="148" name="Elbow Connector 147"/>
-            <p:cNvCxnSpPr>
-              <a:stCxn id="158" idx="3"/>
-              <a:endCxn id="161" idx="3"/>
+              <a:stCxn id="75" idx="3"/>
+              <a:endCxn id="79" idx="3"/>
             </p:cNvCxnSpPr>
             <p:nvPr/>
           </p:nvCxnSpPr>
           <p:spPr>
             <a:xfrm flipV="1">
-              <a:off x="2034391" y="477024"/>
-              <a:ext cx="827130" cy="1077952"/>
+              <a:off x="1756390" y="457503"/>
+              <a:ext cx="300234" cy="765246"/>
             </a:xfrm>
             <a:prstGeom prst="bentConnector2">
               <a:avLst/>
             </a:prstGeom>
             <a:ln w="6350">
               <a:solidFill>
-                <a:schemeClr val="tx1"/>
+                <a:srgbClr val="0070C0"/>
               </a:solidFill>
             </a:ln>
           </p:spPr>
@@ -3950,13 +3903,13 @@
         </p:cxnSp>
         <p:sp>
           <p:nvSpPr>
-            <p:cNvPr id="149" name="Rectangle 148"/>
+            <p:cNvPr id="71" name="Rectangle 70"/>
             <p:cNvSpPr/>
             <p:nvPr/>
           </p:nvSpPr>
           <p:spPr>
             <a:xfrm>
-              <a:off x="74572" y="1081296"/>
+              <a:off x="47484" y="757599"/>
               <a:ext cx="954107" cy="369332"/>
             </a:xfrm>
             <a:prstGeom prst="rect">
@@ -3970,14 +3923,26 @@
             <a:lstStyle/>
             <a:p>
               <a:r>
-                <a:rPr lang="en-US" sz="900" dirty="0" err="1" smtClean="0"/>
+                <a:rPr lang="en-US" sz="900" dirty="0" err="1" smtClean="0">
+                  <a:solidFill>
+                    <a:srgbClr val="00B050"/>
+                  </a:solidFill>
+                </a:rPr>
                 <a:t>listOfSubmodels</a:t>
               </a:r>
-              <a:endParaRPr lang="en-US" sz="900" dirty="0"/>
+              <a:endParaRPr lang="en-US" sz="900" dirty="0">
+                <a:solidFill>
+                  <a:srgbClr val="00B050"/>
+                </a:solidFill>
+              </a:endParaRPr>
             </a:p>
             <a:p>
               <a:r>
-                <a:rPr lang="en-US" sz="900" dirty="0"/>
+                <a:rPr lang="en-US" sz="900" dirty="0">
+                  <a:solidFill>
+                    <a:srgbClr val="00B050"/>
+                  </a:solidFill>
+                </a:rPr>
                 <a:t>0,1</a:t>
               </a:r>
             </a:p>
@@ -3985,14 +3950,14 @@
         </p:sp>
         <p:sp>
           <p:nvSpPr>
-            <p:cNvPr id="150" name="Rectangle 149"/>
+            <p:cNvPr id="72" name="Rectangle 71"/>
             <p:cNvSpPr/>
             <p:nvPr/>
           </p:nvSpPr>
           <p:spPr>
             <a:xfrm>
-              <a:off x="591131" y="2200847"/>
-              <a:ext cx="1648969" cy="304800"/>
+              <a:off x="689589" y="1736531"/>
+              <a:ext cx="1219200" cy="304800"/>
             </a:xfrm>
             <a:prstGeom prst="rect">
               <a:avLst/>
@@ -4000,7 +3965,7 @@
             <a:noFill/>
             <a:ln w="6350">
               <a:solidFill>
-                <a:srgbClr val="002060"/>
+                <a:srgbClr val="0070C0"/>
               </a:solidFill>
             </a:ln>
           </p:spPr>
@@ -4028,14 +3993,14 @@
               <a:r>
                 <a:rPr lang="en-US" sz="1100" b="1" dirty="0" smtClean="0">
                   <a:solidFill>
-                    <a:schemeClr val="tx1"/>
+                    <a:srgbClr val="0070C0"/>
                   </a:solidFill>
                 </a:rPr>
                 <a:t>Submodel</a:t>
               </a:r>
               <a:endParaRPr lang="en-US" sz="1100" b="1" dirty="0">
                 <a:solidFill>
-                  <a:schemeClr val="tx1"/>
+                  <a:srgbClr val="0070C0"/>
                 </a:solidFill>
               </a:endParaRPr>
             </a:p>
@@ -4043,18 +4008,21 @@
         </p:sp>
         <p:sp>
           <p:nvSpPr>
-            <p:cNvPr id="151" name="Rectangle 150"/>
+            <p:cNvPr id="73" name="Rectangle 72"/>
             <p:cNvSpPr/>
             <p:nvPr/>
           </p:nvSpPr>
           <p:spPr>
             <a:xfrm>
-              <a:off x="346822" y="1802211"/>
+              <a:off x="214127" y="1469982"/>
               <a:ext cx="651140" cy="369332"/>
             </a:xfrm>
             <a:prstGeom prst="rect">
               <a:avLst/>
             </a:prstGeom>
+            <a:ln>
+              <a:noFill/>
+            </a:ln>
           </p:spPr>
           <p:txBody>
             <a:bodyPr wrap="none" lIns="91440" tIns="45720" rIns="91440" bIns="45720">
@@ -4063,14 +4031,26 @@
             <a:lstStyle/>
             <a:p>
               <a:r>
-                <a:rPr lang="en-US" sz="900" dirty="0" smtClean="0"/>
+                <a:rPr lang="en-US" sz="900" dirty="0" smtClean="0">
+                  <a:solidFill>
+                    <a:srgbClr val="0070C0"/>
+                  </a:solidFill>
+                </a:rPr>
                 <a:t>submodel</a:t>
               </a:r>
-              <a:endParaRPr lang="en-US" sz="900" dirty="0"/>
+              <a:endParaRPr lang="en-US" sz="900" dirty="0">
+                <a:solidFill>
+                  <a:srgbClr val="0070C0"/>
+                </a:solidFill>
+              </a:endParaRPr>
             </a:p>
             <a:p>
               <a:r>
-                <a:rPr lang="en-US" sz="900" dirty="0"/>
+                <a:rPr lang="en-US" sz="900" dirty="0">
+                  <a:solidFill>
+                    <a:srgbClr val="0070C0"/>
+                  </a:solidFill>
+                </a:rPr>
                 <a:t>0,…,*</a:t>
               </a:r>
             </a:p>
@@ -4078,24 +4058,24 @@
         </p:sp>
         <p:cxnSp>
           <p:nvCxnSpPr>
-            <p:cNvPr id="152" name="Elbow Connector 151"/>
+            <p:cNvPr id="74" name="Elbow Connector 73"/>
             <p:cNvCxnSpPr>
-              <a:stCxn id="150" idx="3"/>
-              <a:endCxn id="161" idx="3"/>
+              <a:stCxn id="72" idx="3"/>
+              <a:endCxn id="79" idx="3"/>
             </p:cNvCxnSpPr>
             <p:nvPr/>
           </p:nvCxnSpPr>
           <p:spPr>
             <a:xfrm flipV="1">
-              <a:off x="2240100" y="477024"/>
-              <a:ext cx="621421" cy="1876223"/>
+              <a:off x="1908789" y="457503"/>
+              <a:ext cx="147835" cy="1431428"/>
             </a:xfrm>
             <a:prstGeom prst="bentConnector2">
               <a:avLst/>
             </a:prstGeom>
             <a:ln w="6350">
               <a:solidFill>
-                <a:schemeClr val="tx1"/>
+                <a:srgbClr val="0070C0"/>
               </a:solidFill>
             </a:ln>
           </p:spPr>
@@ -4114,263 +4094,129 @@
             </a:fontRef>
           </p:style>
         </p:cxnSp>
-        <p:grpSp>
-          <p:nvGrpSpPr>
-            <p:cNvPr id="153" name="Group 152"/>
-            <p:cNvGrpSpPr/>
+        <p:sp>
+          <p:nvSpPr>
+            <p:cNvPr id="75" name="Rectangle 74"/>
+            <p:cNvSpPr/>
             <p:nvPr/>
-          </p:nvGrpSpPr>
-          <p:grpSpPr>
+          </p:nvSpPr>
+          <p:spPr>
             <a:xfrm>
-              <a:off x="355615" y="1402576"/>
-              <a:ext cx="1678776" cy="455375"/>
-              <a:chOff x="1231296" y="1561144"/>
-              <a:chExt cx="1678776" cy="455375"/>
+              <a:off x="252730" y="1070349"/>
+              <a:ext cx="1503660" cy="304800"/>
             </a:xfrm>
-          </p:grpSpPr>
-          <p:sp>
-            <p:nvSpPr>
-              <p:cNvPr id="158" name="Rectangle 157"/>
-              <p:cNvSpPr/>
-              <p:nvPr/>
-            </p:nvSpPr>
-            <p:spPr>
-              <a:xfrm>
-                <a:off x="1261103" y="1561144"/>
-                <a:ext cx="1648969" cy="304800"/>
-              </a:xfrm>
-              <a:prstGeom prst="rect">
-                <a:avLst/>
-              </a:prstGeom>
-              <a:noFill/>
-              <a:ln w="6350">
+            <a:prstGeom prst="rect">
+              <a:avLst/>
+            </a:prstGeom>
+            <a:noFill/>
+            <a:ln w="6350">
+              <a:solidFill>
+                <a:srgbClr val="0070C0"/>
+              </a:solidFill>
+            </a:ln>
+          </p:spPr>
+          <p:style>
+            <a:lnRef idx="2">
+              <a:schemeClr val="accent1">
+                <a:shade val="50000"/>
+              </a:schemeClr>
+            </a:lnRef>
+            <a:fillRef idx="1">
+              <a:schemeClr val="accent1"/>
+            </a:fillRef>
+            <a:effectRef idx="0">
+              <a:schemeClr val="accent1"/>
+            </a:effectRef>
+            <a:fontRef idx="minor">
+              <a:schemeClr val="lt1"/>
+            </a:fontRef>
+          </p:style>
+          <p:txBody>
+            <a:bodyPr lIns="91440" tIns="45720" rIns="91440" bIns="45720" spcCol="0" rtlCol="0" anchor="ctr"/>
+            <a:lstStyle/>
+            <a:p>
+              <a:pPr algn="ctr"/>
+              <a:r>
+                <a:rPr lang="en-US" sz="1100" b="1" dirty="0" err="1" smtClean="0">
+                  <a:solidFill>
+                    <a:srgbClr val="0070C0"/>
+                  </a:solidFill>
+                </a:rPr>
+                <a:t>ListOfSubmodels</a:t>
+              </a:r>
+              <a:endParaRPr lang="en-US" sz="1100" b="1" dirty="0">
                 <a:solidFill>
-                  <a:srgbClr val="002060"/>
+                  <a:srgbClr val="0070C0"/>
                 </a:solidFill>
-              </a:ln>
-            </p:spPr>
-            <p:style>
-              <a:lnRef idx="2">
-                <a:schemeClr val="accent1">
-                  <a:shade val="50000"/>
-                </a:schemeClr>
-              </a:lnRef>
-              <a:fillRef idx="1">
-                <a:schemeClr val="accent1"/>
-              </a:fillRef>
-              <a:effectRef idx="0">
-                <a:schemeClr val="accent1"/>
-              </a:effectRef>
-              <a:fontRef idx="minor">
-                <a:schemeClr val="lt1"/>
-              </a:fontRef>
-            </p:style>
-            <p:txBody>
-              <a:bodyPr lIns="91440" tIns="45720" rIns="91440" bIns="45720" spcCol="0" rtlCol="0" anchor="ctr"/>
-              <a:lstStyle/>
-              <a:p>
-                <a:pPr algn="ctr"/>
-                <a:r>
-                  <a:rPr lang="en-US" sz="1100" b="1" dirty="0" err="1" smtClean="0">
-                    <a:solidFill>
-                      <a:schemeClr val="tx1"/>
-                    </a:solidFill>
-                  </a:rPr>
-                  <a:t>ListOfSubmodels</a:t>
-                </a:r>
-                <a:endParaRPr lang="en-US" sz="1100" b="1" dirty="0">
-                  <a:solidFill>
-                    <a:schemeClr val="tx1"/>
-                  </a:solidFill>
-                </a:endParaRPr>
-              </a:p>
-            </p:txBody>
-          </p:sp>
-          <p:sp>
-            <p:nvSpPr>
-              <p:cNvPr id="159" name="Diamond 158"/>
-              <p:cNvSpPr/>
-              <p:nvPr/>
-            </p:nvSpPr>
-            <p:spPr>
-              <a:xfrm>
-                <a:off x="1231296" y="1864121"/>
-                <a:ext cx="66869" cy="152398"/>
-              </a:xfrm>
-              <a:prstGeom prst="diamond">
-                <a:avLst/>
-              </a:prstGeom>
+              </a:endParaRPr>
+            </a:p>
+          </p:txBody>
+        </p:sp>
+        <p:sp>
+          <p:nvSpPr>
+            <p:cNvPr id="76" name="Diamond 75"/>
+            <p:cNvSpPr/>
+            <p:nvPr/>
+          </p:nvSpPr>
+          <p:spPr>
+            <a:xfrm>
+              <a:off x="222922" y="1373326"/>
+              <a:ext cx="66869" cy="152398"/>
+            </a:xfrm>
+            <a:prstGeom prst="diamond">
+              <a:avLst/>
+            </a:prstGeom>
+            <a:solidFill>
+              <a:srgbClr val="0070C0"/>
+            </a:solidFill>
+            <a:ln w="6350">
               <a:solidFill>
-                <a:schemeClr val="tx1"/>
+                <a:srgbClr val="0070C0"/>
               </a:solidFill>
-              <a:ln w="6350">
+            </a:ln>
+          </p:spPr>
+          <p:style>
+            <a:lnRef idx="2">
+              <a:schemeClr val="accent1">
+                <a:shade val="50000"/>
+              </a:schemeClr>
+            </a:lnRef>
+            <a:fillRef idx="1">
+              <a:schemeClr val="accent1"/>
+            </a:fillRef>
+            <a:effectRef idx="0">
+              <a:schemeClr val="accent1"/>
+            </a:effectRef>
+            <a:fontRef idx="minor">
+              <a:schemeClr val="lt1"/>
+            </a:fontRef>
+          </p:style>
+          <p:txBody>
+            <a:bodyPr lIns="91440" tIns="45720" rIns="91440" bIns="45720" spcCol="0" rtlCol="0" anchor="ctr"/>
+            <a:lstStyle/>
+            <a:p>
+              <a:pPr algn="ctr"/>
+              <a:endParaRPr lang="en-US">
                 <a:solidFill>
-                  <a:schemeClr val="tx1"/>
+                  <a:srgbClr val="0070C0"/>
                 </a:solidFill>
-              </a:ln>
-            </p:spPr>
-            <p:style>
-              <a:lnRef idx="2">
-                <a:schemeClr val="accent1">
-                  <a:shade val="50000"/>
-                </a:schemeClr>
-              </a:lnRef>
-              <a:fillRef idx="1">
-                <a:schemeClr val="accent1"/>
-              </a:fillRef>
-              <a:effectRef idx="0">
-                <a:schemeClr val="accent1"/>
-              </a:effectRef>
-              <a:fontRef idx="minor">
-                <a:schemeClr val="lt1"/>
-              </a:fontRef>
-            </p:style>
-            <p:txBody>
-              <a:bodyPr lIns="91440" tIns="45720" rIns="91440" bIns="45720" spcCol="0" rtlCol="0" anchor="ctr"/>
-              <a:lstStyle/>
-              <a:p>
-                <a:pPr algn="ctr"/>
-                <a:endParaRPr lang="en-US"/>
-              </a:p>
-            </p:txBody>
-          </p:sp>
-        </p:grpSp>
-        <p:grpSp>
-          <p:nvGrpSpPr>
-            <p:cNvPr id="154" name="Group 153"/>
-            <p:cNvGrpSpPr/>
-            <p:nvPr/>
-          </p:nvGrpSpPr>
-          <p:grpSpPr>
-            <a:xfrm>
-              <a:off x="1881371" y="595407"/>
-              <a:ext cx="658367" cy="395821"/>
-              <a:chOff x="2757052" y="707481"/>
-              <a:chExt cx="658367" cy="395821"/>
-            </a:xfrm>
-          </p:grpSpPr>
-          <p:sp>
-            <p:nvSpPr>
-              <p:cNvPr id="156" name="Rectangle 155"/>
-              <p:cNvSpPr/>
-              <p:nvPr/>
-            </p:nvSpPr>
-            <p:spPr>
-              <a:xfrm>
-                <a:off x="2757052" y="823707"/>
-                <a:ext cx="658367" cy="279595"/>
-              </a:xfrm>
-              <a:prstGeom prst="rect">
-                <a:avLst/>
-              </a:prstGeom>
-              <a:noFill/>
-              <a:ln w="6350">
-                <a:solidFill>
-                  <a:srgbClr val="002060"/>
-                </a:solidFill>
-              </a:ln>
-            </p:spPr>
-            <p:style>
-              <a:lnRef idx="2">
-                <a:schemeClr val="accent1">
-                  <a:shade val="50000"/>
-                </a:schemeClr>
-              </a:lnRef>
-              <a:fillRef idx="1">
-                <a:schemeClr val="accent1"/>
-              </a:fillRef>
-              <a:effectRef idx="0">
-                <a:schemeClr val="accent1"/>
-              </a:effectRef>
-              <a:fontRef idx="minor">
-                <a:schemeClr val="lt1"/>
-              </a:fontRef>
-            </p:style>
-            <p:txBody>
-              <a:bodyPr lIns="91440" tIns="45720" rIns="91440" bIns="45720" spcCol="0" rtlCol="0" anchor="ctr"/>
-              <a:lstStyle/>
-              <a:p>
-                <a:pPr algn="ctr"/>
-                <a:r>
-                  <a:rPr lang="en-US" sz="1100" b="1" dirty="0" smtClean="0">
-                    <a:solidFill>
-                      <a:schemeClr val="tx1"/>
-                    </a:solidFill>
-                  </a:rPr>
-                  <a:t>Model</a:t>
-                </a:r>
-                <a:endParaRPr lang="en-US" sz="1100" b="1" dirty="0">
-                  <a:solidFill>
-                    <a:schemeClr val="tx1"/>
-                  </a:solidFill>
-                </a:endParaRPr>
-              </a:p>
-            </p:txBody>
-          </p:sp>
-          <p:sp>
-            <p:nvSpPr>
-              <p:cNvPr id="157" name="Isosceles Triangle 156"/>
-              <p:cNvSpPr/>
-              <p:nvPr/>
-            </p:nvSpPr>
-            <p:spPr>
-              <a:xfrm rot="10800000">
-                <a:off x="3006635" y="707481"/>
-                <a:ext cx="159199" cy="114300"/>
-              </a:xfrm>
-              <a:prstGeom prst="triangle">
-                <a:avLst/>
-              </a:prstGeom>
-              <a:noFill/>
-              <a:ln w="6350">
-                <a:solidFill>
-                  <a:srgbClr val="002060"/>
-                </a:solidFill>
-              </a:ln>
-            </p:spPr>
-            <p:style>
-              <a:lnRef idx="2">
-                <a:schemeClr val="accent1">
-                  <a:shade val="50000"/>
-                </a:schemeClr>
-              </a:lnRef>
-              <a:fillRef idx="1">
-                <a:schemeClr val="accent1"/>
-              </a:fillRef>
-              <a:effectRef idx="0">
-                <a:schemeClr val="accent1"/>
-              </a:effectRef>
-              <a:fontRef idx="minor">
-                <a:schemeClr val="lt1"/>
-              </a:fontRef>
-            </p:style>
-            <p:txBody>
-              <a:bodyPr lIns="91440" tIns="45720" rIns="91440" bIns="45720" spcCol="0" rtlCol="0" anchor="ctr"/>
-              <a:lstStyle/>
-              <a:p>
-                <a:pPr algn="ctr"/>
-                <a:endParaRPr lang="en-US" sz="1100" b="1" dirty="0">
-                  <a:solidFill>
-                    <a:schemeClr val="tx1"/>
-                  </a:solidFill>
-                </a:endParaRPr>
-              </a:p>
-            </p:txBody>
-          </p:sp>
-        </p:grpSp>
+              </a:endParaRPr>
+            </a:p>
+          </p:txBody>
+        </p:sp>
         <p:cxnSp>
           <p:nvCxnSpPr>
-            <p:cNvPr id="155" name="Elbow Connector 154"/>
+            <p:cNvPr id="77" name="Elbow Connector 76"/>
             <p:cNvCxnSpPr>
-              <a:stCxn id="156" idx="3"/>
-              <a:endCxn id="161" idx="3"/>
+              <a:stCxn id="65" idx="3"/>
+              <a:endCxn id="79" idx="3"/>
             </p:cNvCxnSpPr>
             <p:nvPr/>
           </p:nvCxnSpPr>
           <p:spPr>
             <a:xfrm flipV="1">
-              <a:off x="2539738" y="477024"/>
-              <a:ext cx="321783" cy="374407"/>
+              <a:off x="1620964" y="457503"/>
+              <a:ext cx="435660" cy="70931"/>
             </a:xfrm>
             <a:prstGeom prst="bentConnector2">
               <a:avLst/>

</xml_diff>

<commit_message>
conversion factor added to ReplacedElement.
</commit_message>
<xml_diff>
--- a/sbml-level-3/version-1/comp/HierarchicalModel.pptx
+++ b/sbml-level-3/version-1/comp/HierarchicalModel.pptx
@@ -10,7 +10,7 @@
   <p:sldIdLst>
     <p:sldId id="257" r:id="rId2"/>
   </p:sldIdLst>
-  <p:sldSz cx="2378075" cy="2103438"/>
+  <p:sldSz cx="2378075" cy="1828800"/>
   <p:notesSz cx="6858000" cy="9144000"/>
   <p:defaultTextStyle>
     <a:defPPr>
@@ -192,7 +192,7 @@
           <a:p>
             <a:fld id="{7754A941-C6C2-4027-B1F4-A5E937B2245F}" type="datetimeFigureOut">
               <a:rPr lang="en-US" smtClean="0"/>
-              <a:t>9/28/2010</a:t>
+              <a:t>10/1/2010</a:t>
             </a:fld>
             <a:endParaRPr lang="en-US"/>
           </a:p>
@@ -210,8 +210,8 @@
         </p:nvSpPr>
         <p:spPr>
           <a:xfrm>
-            <a:off x="1490663" y="685800"/>
-            <a:ext cx="3876675" cy="3429000"/>
+            <a:off x="1200150" y="685800"/>
+            <a:ext cx="4457700" cy="3429000"/>
           </a:xfrm>
           <a:prstGeom prst="rect">
             <a:avLst/>
@@ -489,8 +489,8 @@
         </p:nvSpPr>
         <p:spPr>
           <a:xfrm>
-            <a:off x="1490663" y="685800"/>
-            <a:ext cx="3876675" cy="3429000"/>
+            <a:off x="1200150" y="685800"/>
+            <a:ext cx="4457700" cy="3429000"/>
           </a:xfrm>
         </p:spPr>
       </p:sp>
@@ -578,8 +578,8 @@
         </p:nvSpPr>
         <p:spPr>
           <a:xfrm>
-            <a:off x="178358" y="653433"/>
-            <a:ext cx="2021363" cy="450876"/>
+            <a:off x="178360" y="568118"/>
+            <a:ext cx="2021363" cy="392007"/>
           </a:xfrm>
         </p:spPr>
         <p:txBody>
@@ -606,8 +606,8 @@
         </p:nvSpPr>
         <p:spPr>
           <a:xfrm>
-            <a:off x="356716" y="1191953"/>
-            <a:ext cx="1664653" cy="537545"/>
+            <a:off x="356717" y="1036325"/>
+            <a:ext cx="1664653" cy="467360"/>
           </a:xfrm>
         </p:spPr>
         <p:txBody>
@@ -730,7 +730,7 @@
           <a:p>
             <a:fld id="{F0172217-DC24-48CD-AE89-68C8C8D878B4}" type="datetimeFigureOut">
               <a:rPr lang="en-US" smtClean="0"/>
-              <a:t>9/28/2010</a:t>
+              <a:t>10/1/2010</a:t>
             </a:fld>
             <a:endParaRPr lang="en-US"/>
           </a:p>
@@ -900,7 +900,7 @@
           <a:p>
             <a:fld id="{F0172217-DC24-48CD-AE89-68C8C8D878B4}" type="datetimeFigureOut">
               <a:rPr lang="en-US" smtClean="0"/>
-              <a:t>9/28/2010</a:t>
+              <a:t>10/1/2010</a:t>
             </a:fld>
             <a:endParaRPr lang="en-US"/>
           </a:p>
@@ -990,8 +990,8 @@
         </p:nvSpPr>
         <p:spPr>
           <a:xfrm>
-            <a:off x="1724106" y="84239"/>
-            <a:ext cx="535067" cy="1794740"/>
+            <a:off x="1724108" y="73240"/>
+            <a:ext cx="535067" cy="1560408"/>
           </a:xfrm>
         </p:spPr>
         <p:txBody>
@@ -1018,8 +1018,8 @@
         </p:nvSpPr>
         <p:spPr>
           <a:xfrm>
-            <a:off x="118905" y="84239"/>
-            <a:ext cx="1565566" cy="1794740"/>
+            <a:off x="118905" y="73240"/>
+            <a:ext cx="1565566" cy="1560408"/>
           </a:xfrm>
         </p:spPr>
         <p:txBody>
@@ -1080,7 +1080,7 @@
           <a:p>
             <a:fld id="{F0172217-DC24-48CD-AE89-68C8C8D878B4}" type="datetimeFigureOut">
               <a:rPr lang="en-US" smtClean="0"/>
-              <a:t>9/28/2010</a:t>
+              <a:t>10/1/2010</a:t>
             </a:fld>
             <a:endParaRPr lang="en-US"/>
           </a:p>
@@ -1250,7 +1250,7 @@
           <a:p>
             <a:fld id="{F0172217-DC24-48CD-AE89-68C8C8D878B4}" type="datetimeFigureOut">
               <a:rPr lang="en-US" smtClean="0"/>
-              <a:t>9/28/2010</a:t>
+              <a:t>10/1/2010</a:t>
             </a:fld>
             <a:endParaRPr lang="en-US"/>
           </a:p>
@@ -1340,8 +1340,8 @@
         </p:nvSpPr>
         <p:spPr>
           <a:xfrm>
-            <a:off x="187853" y="1351658"/>
-            <a:ext cx="2021363" cy="417766"/>
+            <a:off x="187855" y="1175177"/>
+            <a:ext cx="2021363" cy="363220"/>
           </a:xfrm>
         </p:spPr>
         <p:txBody>
@@ -1372,8 +1372,8 @@
         </p:nvSpPr>
         <p:spPr>
           <a:xfrm>
-            <a:off x="187853" y="891531"/>
-            <a:ext cx="2021363" cy="460127"/>
+            <a:off x="187855" y="775128"/>
+            <a:ext cx="2021363" cy="400050"/>
           </a:xfrm>
         </p:spPr>
         <p:txBody>
@@ -1496,7 +1496,7 @@
           <a:p>
             <a:fld id="{F0172217-DC24-48CD-AE89-68C8C8D878B4}" type="datetimeFigureOut">
               <a:rPr lang="en-US" smtClean="0"/>
-              <a:t>9/28/2010</a:t>
+              <a:t>10/1/2010</a:t>
             </a:fld>
             <a:endParaRPr lang="en-US"/>
           </a:p>
@@ -1609,8 +1609,8 @@
         </p:nvSpPr>
         <p:spPr>
           <a:xfrm>
-            <a:off x="118904" y="490808"/>
-            <a:ext cx="1050316" cy="1388172"/>
+            <a:off x="118906" y="426725"/>
+            <a:ext cx="1050316" cy="1206924"/>
           </a:xfrm>
         </p:spPr>
         <p:txBody>
@@ -1694,8 +1694,8 @@
         </p:nvSpPr>
         <p:spPr>
           <a:xfrm>
-            <a:off x="1208855" y="490808"/>
-            <a:ext cx="1050316" cy="1388172"/>
+            <a:off x="1208856" y="426725"/>
+            <a:ext cx="1050316" cy="1206924"/>
           </a:xfrm>
         </p:spPr>
         <p:txBody>
@@ -1784,7 +1784,7 @@
           <a:p>
             <a:fld id="{F0172217-DC24-48CD-AE89-68C8C8D878B4}" type="datetimeFigureOut">
               <a:rPr lang="en-US" smtClean="0"/>
-              <a:t>9/28/2010</a:t>
+              <a:t>10/1/2010</a:t>
             </a:fld>
             <a:endParaRPr lang="en-US"/>
           </a:p>
@@ -1901,8 +1901,8 @@
         </p:nvSpPr>
         <p:spPr>
           <a:xfrm>
-            <a:off x="118912" y="470843"/>
-            <a:ext cx="1050729" cy="196223"/>
+            <a:off x="118914" y="409369"/>
+            <a:ext cx="1050729" cy="170603"/>
           </a:xfrm>
         </p:spPr>
         <p:txBody>
@@ -1966,8 +1966,8 @@
         </p:nvSpPr>
         <p:spPr>
           <a:xfrm>
-            <a:off x="118912" y="667066"/>
-            <a:ext cx="1050729" cy="1211912"/>
+            <a:off x="118914" y="579971"/>
+            <a:ext cx="1050729" cy="1053677"/>
           </a:xfrm>
         </p:spPr>
         <p:txBody>
@@ -2051,8 +2051,8 @@
         </p:nvSpPr>
         <p:spPr>
           <a:xfrm>
-            <a:off x="1208034" y="470843"/>
-            <a:ext cx="1051143" cy="196223"/>
+            <a:off x="1208036" y="409369"/>
+            <a:ext cx="1051143" cy="170603"/>
           </a:xfrm>
         </p:spPr>
         <p:txBody>
@@ -2116,8 +2116,8 @@
         </p:nvSpPr>
         <p:spPr>
           <a:xfrm>
-            <a:off x="1208034" y="667066"/>
-            <a:ext cx="1051143" cy="1211912"/>
+            <a:off x="1208036" y="579971"/>
+            <a:ext cx="1051143" cy="1053677"/>
           </a:xfrm>
         </p:spPr>
         <p:txBody>
@@ -2206,7 +2206,7 @@
           <a:p>
             <a:fld id="{F0172217-DC24-48CD-AE89-68C8C8D878B4}" type="datetimeFigureOut">
               <a:rPr lang="en-US" smtClean="0"/>
-              <a:t>9/28/2010</a:t>
+              <a:t>10/1/2010</a:t>
             </a:fld>
             <a:endParaRPr lang="en-US"/>
           </a:p>
@@ -2324,7 +2324,7 @@
           <a:p>
             <a:fld id="{F0172217-DC24-48CD-AE89-68C8C8D878B4}" type="datetimeFigureOut">
               <a:rPr lang="en-US" smtClean="0"/>
-              <a:t>9/28/2010</a:t>
+              <a:t>10/1/2010</a:t>
             </a:fld>
             <a:endParaRPr lang="en-US"/>
           </a:p>
@@ -2419,7 +2419,7 @@
           <a:p>
             <a:fld id="{F0172217-DC24-48CD-AE89-68C8C8D878B4}" type="datetimeFigureOut">
               <a:rPr lang="en-US" smtClean="0"/>
-              <a:t>9/28/2010</a:t>
+              <a:t>10/1/2010</a:t>
             </a:fld>
             <a:endParaRPr lang="en-US"/>
           </a:p>
@@ -2509,8 +2509,8 @@
         </p:nvSpPr>
         <p:spPr>
           <a:xfrm>
-            <a:off x="118913" y="83748"/>
-            <a:ext cx="782369" cy="356416"/>
+            <a:off x="118913" y="72813"/>
+            <a:ext cx="782369" cy="309880"/>
           </a:xfrm>
         </p:spPr>
         <p:txBody>
@@ -2541,8 +2541,8 @@
         </p:nvSpPr>
         <p:spPr>
           <a:xfrm>
-            <a:off x="929765" y="83758"/>
-            <a:ext cx="1329410" cy="1795226"/>
+            <a:off x="929766" y="72822"/>
+            <a:ext cx="1329410" cy="1560830"/>
           </a:xfrm>
         </p:spPr>
         <p:txBody>
@@ -2626,8 +2626,8 @@
         </p:nvSpPr>
         <p:spPr>
           <a:xfrm>
-            <a:off x="118913" y="440167"/>
-            <a:ext cx="782369" cy="1438811"/>
+            <a:off x="118913" y="382698"/>
+            <a:ext cx="782369" cy="1250951"/>
           </a:xfrm>
         </p:spPr>
         <p:txBody>
@@ -2696,7 +2696,7 @@
           <a:p>
             <a:fld id="{F0172217-DC24-48CD-AE89-68C8C8D878B4}" type="datetimeFigureOut">
               <a:rPr lang="en-US" smtClean="0"/>
-              <a:t>9/28/2010</a:t>
+              <a:t>10/1/2010</a:t>
             </a:fld>
             <a:endParaRPr lang="en-US"/>
           </a:p>
@@ -2786,8 +2786,8 @@
         </p:nvSpPr>
         <p:spPr>
           <a:xfrm>
-            <a:off x="466123" y="1472412"/>
-            <a:ext cx="1426845" cy="173825"/>
+            <a:off x="466125" y="1280167"/>
+            <a:ext cx="1426845" cy="151129"/>
           </a:xfrm>
         </p:spPr>
         <p:txBody>
@@ -2818,8 +2818,8 @@
         </p:nvSpPr>
         <p:spPr>
           <a:xfrm>
-            <a:off x="466123" y="187952"/>
-            <a:ext cx="1426845" cy="1262063"/>
+            <a:off x="466125" y="163413"/>
+            <a:ext cx="1426845" cy="1097280"/>
           </a:xfrm>
         </p:spPr>
         <p:txBody>
@@ -2879,8 +2879,8 @@
         </p:nvSpPr>
         <p:spPr>
           <a:xfrm>
-            <a:off x="466123" y="1646242"/>
-            <a:ext cx="1426845" cy="246861"/>
+            <a:off x="466125" y="1431301"/>
+            <a:ext cx="1426845" cy="214629"/>
           </a:xfrm>
         </p:spPr>
         <p:txBody>
@@ -2949,7 +2949,7 @@
           <a:p>
             <a:fld id="{F0172217-DC24-48CD-AE89-68C8C8D878B4}" type="datetimeFigureOut">
               <a:rPr lang="en-US" smtClean="0"/>
-              <a:t>9/28/2010</a:t>
+              <a:t>10/1/2010</a:t>
             </a:fld>
             <a:endParaRPr lang="en-US"/>
           </a:p>
@@ -3044,8 +3044,8 @@
         </p:nvSpPr>
         <p:spPr>
           <a:xfrm>
-            <a:off x="118906" y="84241"/>
-            <a:ext cx="2140267" cy="350573"/>
+            <a:off x="118906" y="73243"/>
+            <a:ext cx="2140267" cy="304800"/>
           </a:xfrm>
           <a:prstGeom prst="rect">
             <a:avLst/>
@@ -3077,8 +3077,8 @@
         </p:nvSpPr>
         <p:spPr>
           <a:xfrm>
-            <a:off x="118906" y="490808"/>
-            <a:ext cx="2140267" cy="1388172"/>
+            <a:off x="118906" y="426725"/>
+            <a:ext cx="2140267" cy="1206924"/>
           </a:xfrm>
           <a:prstGeom prst="rect">
             <a:avLst/>
@@ -3139,8 +3139,8 @@
         </p:nvSpPr>
         <p:spPr>
           <a:xfrm>
-            <a:off x="118904" y="1949585"/>
-            <a:ext cx="554884" cy="111989"/>
+            <a:off x="118904" y="1695037"/>
+            <a:ext cx="554884" cy="97367"/>
           </a:xfrm>
           <a:prstGeom prst="rect">
             <a:avLst/>
@@ -3162,7 +3162,7 @@
           <a:p>
             <a:fld id="{F0172217-DC24-48CD-AE89-68C8C8D878B4}" type="datetimeFigureOut">
               <a:rPr lang="en-US" smtClean="0"/>
-              <a:t>9/28/2010</a:t>
+              <a:t>10/1/2010</a:t>
             </a:fld>
             <a:endParaRPr lang="en-US"/>
           </a:p>
@@ -3180,8 +3180,8 @@
         </p:nvSpPr>
         <p:spPr>
           <a:xfrm>
-            <a:off x="812514" y="1949585"/>
-            <a:ext cx="753057" cy="111989"/>
+            <a:off x="812515" y="1695037"/>
+            <a:ext cx="753057" cy="97367"/>
           </a:xfrm>
           <a:prstGeom prst="rect">
             <a:avLst/>
@@ -3217,8 +3217,8 @@
         </p:nvSpPr>
         <p:spPr>
           <a:xfrm>
-            <a:off x="1704287" y="1949585"/>
-            <a:ext cx="554884" cy="111989"/>
+            <a:off x="1704287" y="1695037"/>
+            <a:ext cx="554884" cy="97367"/>
           </a:xfrm>
           <a:prstGeom prst="rect">
             <a:avLst/>
@@ -3539,21 +3539,21 @@
       </p:grpSpPr>
       <p:grpSp>
         <p:nvGrpSpPr>
-          <p:cNvPr id="2" name="Group 1"/>
+          <p:cNvPr id="54" name="Group 53"/>
           <p:cNvGrpSpPr/>
           <p:nvPr/>
         </p:nvGrpSpPr>
         <p:grpSpPr>
           <a:xfrm>
-            <a:off x="47484" y="62107"/>
-            <a:ext cx="2283106" cy="1979224"/>
-            <a:chOff x="47484" y="62107"/>
-            <a:chExt cx="2283106" cy="1979224"/>
+            <a:off x="47485" y="87559"/>
+            <a:ext cx="2283105" cy="1653683"/>
+            <a:chOff x="47484" y="388636"/>
+            <a:chExt cx="2283105" cy="1653683"/>
           </a:xfrm>
         </p:grpSpPr>
         <p:sp>
           <p:nvSpPr>
-            <p:cNvPr id="65" name="Rectangle 64"/>
+            <p:cNvPr id="55" name="Rectangle 54"/>
             <p:cNvSpPr/>
             <p:nvPr/>
           </p:nvSpPr>
@@ -3619,7 +3619,7 @@
         </p:sp>
         <p:sp>
           <p:nvSpPr>
-            <p:cNvPr id="66" name="Diamond 65"/>
+            <p:cNvPr id="56" name="Diamond 55"/>
             <p:cNvSpPr/>
             <p:nvPr/>
           </p:nvSpPr>
@@ -3667,16 +3667,16 @@
         </p:sp>
         <p:cxnSp>
           <p:nvCxnSpPr>
-            <p:cNvPr id="67" name="Elbow Connector 66"/>
+            <p:cNvPr id="57" name="Elbow Connector 56"/>
             <p:cNvCxnSpPr>
-              <a:stCxn id="76" idx="2"/>
-              <a:endCxn id="72" idx="0"/>
+              <a:stCxn id="81" idx="2"/>
+              <a:endCxn id="62" idx="0"/>
             </p:cNvCxnSpPr>
             <p:nvPr/>
           </p:nvCxnSpPr>
           <p:spPr>
             <a:xfrm rot="16200000" flipH="1">
-              <a:off x="672370" y="1109711"/>
+              <a:off x="672370" y="1110699"/>
               <a:ext cx="210807" cy="1042832"/>
             </a:xfrm>
             <a:prstGeom prst="bentConnector3">
@@ -3707,17 +3707,17 @@
         </p:cxnSp>
         <p:cxnSp>
           <p:nvCxnSpPr>
-            <p:cNvPr id="68" name="Elbow Connector 67"/>
+            <p:cNvPr id="58" name="Elbow Connector 57"/>
             <p:cNvCxnSpPr>
-              <a:stCxn id="66" idx="2"/>
-              <a:endCxn id="75" idx="0"/>
+              <a:stCxn id="56" idx="2"/>
+              <a:endCxn id="80" idx="0"/>
             </p:cNvCxnSpPr>
             <p:nvPr/>
           </p:nvCxnSpPr>
           <p:spPr>
             <a:xfrm rot="16200000" flipH="1">
-              <a:off x="437997" y="503786"/>
-              <a:ext cx="248218" cy="884908"/>
+              <a:off x="437503" y="504280"/>
+              <a:ext cx="249206" cy="884908"/>
             </a:xfrm>
             <a:prstGeom prst="bentConnector3">
               <a:avLst>
@@ -3747,13 +3747,13 @@
         </p:cxnSp>
         <p:grpSp>
           <p:nvGrpSpPr>
-            <p:cNvPr id="69" name="Group 68"/>
+            <p:cNvPr id="59" name="Group 58"/>
             <p:cNvGrpSpPr/>
             <p:nvPr/>
           </p:nvGrpSpPr>
           <p:grpSpPr>
             <a:xfrm>
-              <a:off x="1748421" y="62107"/>
+              <a:off x="1748420" y="388636"/>
               <a:ext cx="582169" cy="395396"/>
               <a:chOff x="1585454" y="260276"/>
               <a:chExt cx="582169" cy="395396"/>
@@ -3761,7 +3761,7 @@
           </p:grpSpPr>
           <p:sp>
             <p:nvSpPr>
-              <p:cNvPr id="78" name="Rectangle 77"/>
+              <p:cNvPr id="83" name="Rectangle 82"/>
               <p:cNvSpPr/>
               <p:nvPr/>
             </p:nvSpPr>
@@ -3814,7 +3814,7 @@
           </p:sp>
           <p:sp>
             <p:nvSpPr>
-              <p:cNvPr id="79" name="Isosceles Triangle 78"/>
+              <p:cNvPr id="84" name="Isosceles Triangle 83"/>
               <p:cNvSpPr/>
               <p:nvPr/>
             </p:nvSpPr>
@@ -3865,17 +3865,17 @@
         </p:grpSp>
         <p:cxnSp>
           <p:nvCxnSpPr>
-            <p:cNvPr id="70" name="Elbow Connector 69"/>
+            <p:cNvPr id="60" name="Elbow Connector 59"/>
             <p:cNvCxnSpPr>
-              <a:stCxn id="75" idx="3"/>
-              <a:endCxn id="79" idx="3"/>
+              <a:stCxn id="80" idx="3"/>
+              <a:endCxn id="84" idx="3"/>
             </p:cNvCxnSpPr>
             <p:nvPr/>
           </p:nvCxnSpPr>
           <p:spPr>
             <a:xfrm flipV="1">
-              <a:off x="1756390" y="457503"/>
-              <a:ext cx="300234" cy="765246"/>
+              <a:off x="1756390" y="784032"/>
+              <a:ext cx="300233" cy="439705"/>
             </a:xfrm>
             <a:prstGeom prst="bentConnector2">
               <a:avLst/>
@@ -3903,13 +3903,13 @@
         </p:cxnSp>
         <p:sp>
           <p:nvSpPr>
-            <p:cNvPr id="71" name="Rectangle 70"/>
+            <p:cNvPr id="61" name="Rectangle 60"/>
             <p:cNvSpPr/>
             <p:nvPr/>
           </p:nvSpPr>
           <p:spPr>
             <a:xfrm>
-              <a:off x="47484" y="757599"/>
+              <a:off x="47484" y="758587"/>
               <a:ext cx="954107" cy="369332"/>
             </a:xfrm>
             <a:prstGeom prst="rect">
@@ -3950,13 +3950,13 @@
         </p:sp>
         <p:sp>
           <p:nvSpPr>
-            <p:cNvPr id="72" name="Rectangle 71"/>
+            <p:cNvPr id="62" name="Rectangle 61"/>
             <p:cNvSpPr/>
             <p:nvPr/>
           </p:nvSpPr>
           <p:spPr>
             <a:xfrm>
-              <a:off x="689589" y="1736531"/>
+              <a:off x="689589" y="1737519"/>
               <a:ext cx="1219200" cy="304800"/>
             </a:xfrm>
             <a:prstGeom prst="rect">
@@ -4008,13 +4008,13 @@
         </p:sp>
         <p:sp>
           <p:nvSpPr>
-            <p:cNvPr id="73" name="Rectangle 72"/>
+            <p:cNvPr id="63" name="Rectangle 62"/>
             <p:cNvSpPr/>
             <p:nvPr/>
           </p:nvSpPr>
           <p:spPr>
             <a:xfrm>
-              <a:off x="214127" y="1469982"/>
+              <a:off x="214127" y="1470970"/>
               <a:ext cx="651140" cy="369332"/>
             </a:xfrm>
             <a:prstGeom prst="rect">
@@ -4058,17 +4058,17 @@
         </p:sp>
         <p:cxnSp>
           <p:nvCxnSpPr>
-            <p:cNvPr id="74" name="Elbow Connector 73"/>
+            <p:cNvPr id="64" name="Elbow Connector 63"/>
             <p:cNvCxnSpPr>
-              <a:stCxn id="72" idx="3"/>
-              <a:endCxn id="79" idx="3"/>
+              <a:stCxn id="62" idx="3"/>
+              <a:endCxn id="84" idx="3"/>
             </p:cNvCxnSpPr>
             <p:nvPr/>
           </p:nvCxnSpPr>
           <p:spPr>
             <a:xfrm flipV="1">
-              <a:off x="1908789" y="457503"/>
-              <a:ext cx="147835" cy="1431428"/>
+              <a:off x="1908789" y="784032"/>
+              <a:ext cx="147834" cy="1105887"/>
             </a:xfrm>
             <a:prstGeom prst="bentConnector2">
               <a:avLst/>
@@ -4096,13 +4096,13 @@
         </p:cxnSp>
         <p:sp>
           <p:nvSpPr>
-            <p:cNvPr id="75" name="Rectangle 74"/>
+            <p:cNvPr id="80" name="Rectangle 79"/>
             <p:cNvSpPr/>
             <p:nvPr/>
           </p:nvSpPr>
           <p:spPr>
             <a:xfrm>
-              <a:off x="252730" y="1070349"/>
+              <a:off x="252730" y="1071337"/>
               <a:ext cx="1503660" cy="304800"/>
             </a:xfrm>
             <a:prstGeom prst="rect">
@@ -4154,13 +4154,13 @@
         </p:sp>
         <p:sp>
           <p:nvSpPr>
-            <p:cNvPr id="76" name="Diamond 75"/>
+            <p:cNvPr id="81" name="Diamond 80"/>
             <p:cNvSpPr/>
             <p:nvPr/>
           </p:nvSpPr>
           <p:spPr>
             <a:xfrm>
-              <a:off x="222922" y="1373326"/>
+              <a:off x="222922" y="1374314"/>
               <a:ext cx="66869" cy="152398"/>
             </a:xfrm>
             <a:prstGeom prst="diamond">
@@ -4206,20 +4206,22 @@
         </p:sp>
         <p:cxnSp>
           <p:nvCxnSpPr>
-            <p:cNvPr id="77" name="Elbow Connector 76"/>
+            <p:cNvPr id="82" name="Elbow Connector 81"/>
             <p:cNvCxnSpPr>
-              <a:stCxn id="65" idx="3"/>
-              <a:endCxn id="79" idx="3"/>
+              <a:stCxn id="55" idx="2"/>
+              <a:endCxn id="84" idx="3"/>
             </p:cNvCxnSpPr>
             <p:nvPr/>
           </p:nvCxnSpPr>
           <p:spPr>
-            <a:xfrm flipV="1">
-              <a:off x="1620964" y="457503"/>
-              <a:ext cx="435660" cy="70931"/>
+            <a:xfrm rot="16200000" flipH="1">
+              <a:off x="1405344" y="132753"/>
+              <a:ext cx="115800" cy="1186758"/>
             </a:xfrm>
-            <a:prstGeom prst="bentConnector2">
-              <a:avLst/>
+            <a:prstGeom prst="bentConnector3">
+              <a:avLst>
+                <a:gd name="adj1" fmla="val 137544"/>
+              </a:avLst>
             </a:prstGeom>
             <a:ln w="6350">
               <a:solidFill>

</xml_diff>

<commit_message>
A few updates to the proposal, including modifying Figure 1 to be an actual figure, and modifying the history a bit.
</commit_message>
<xml_diff>
--- a/sbml-level-3/version-1/comp/HierarchicalModel.pptx
+++ b/sbml-level-3/version-1/comp/HierarchicalModel.pptx
@@ -192,7 +192,7 @@
           <a:p>
             <a:fld id="{7754A941-C6C2-4027-B1F4-A5E937B2245F}" type="datetimeFigureOut">
               <a:rPr lang="en-US" smtClean="0"/>
-              <a:t>10/1/2010</a:t>
+              <a:t>10/26/2010</a:t>
             </a:fld>
             <a:endParaRPr lang="en-US"/>
           </a:p>
@@ -730,7 +730,7 @@
           <a:p>
             <a:fld id="{F0172217-DC24-48CD-AE89-68C8C8D878B4}" type="datetimeFigureOut">
               <a:rPr lang="en-US" smtClean="0"/>
-              <a:t>10/1/2010</a:t>
+              <a:t>10/26/2010</a:t>
             </a:fld>
             <a:endParaRPr lang="en-US"/>
           </a:p>
@@ -900,7 +900,7 @@
           <a:p>
             <a:fld id="{F0172217-DC24-48CD-AE89-68C8C8D878B4}" type="datetimeFigureOut">
               <a:rPr lang="en-US" smtClean="0"/>
-              <a:t>10/1/2010</a:t>
+              <a:t>10/26/2010</a:t>
             </a:fld>
             <a:endParaRPr lang="en-US"/>
           </a:p>
@@ -1080,7 +1080,7 @@
           <a:p>
             <a:fld id="{F0172217-DC24-48CD-AE89-68C8C8D878B4}" type="datetimeFigureOut">
               <a:rPr lang="en-US" smtClean="0"/>
-              <a:t>10/1/2010</a:t>
+              <a:t>10/26/2010</a:t>
             </a:fld>
             <a:endParaRPr lang="en-US"/>
           </a:p>
@@ -1250,7 +1250,7 @@
           <a:p>
             <a:fld id="{F0172217-DC24-48CD-AE89-68C8C8D878B4}" type="datetimeFigureOut">
               <a:rPr lang="en-US" smtClean="0"/>
-              <a:t>10/1/2010</a:t>
+              <a:t>10/26/2010</a:t>
             </a:fld>
             <a:endParaRPr lang="en-US"/>
           </a:p>
@@ -1496,7 +1496,7 @@
           <a:p>
             <a:fld id="{F0172217-DC24-48CD-AE89-68C8C8D878B4}" type="datetimeFigureOut">
               <a:rPr lang="en-US" smtClean="0"/>
-              <a:t>10/1/2010</a:t>
+              <a:t>10/26/2010</a:t>
             </a:fld>
             <a:endParaRPr lang="en-US"/>
           </a:p>
@@ -1784,7 +1784,7 @@
           <a:p>
             <a:fld id="{F0172217-DC24-48CD-AE89-68C8C8D878B4}" type="datetimeFigureOut">
               <a:rPr lang="en-US" smtClean="0"/>
-              <a:t>10/1/2010</a:t>
+              <a:t>10/26/2010</a:t>
             </a:fld>
             <a:endParaRPr lang="en-US"/>
           </a:p>
@@ -2206,7 +2206,7 @@
           <a:p>
             <a:fld id="{F0172217-DC24-48CD-AE89-68C8C8D878B4}" type="datetimeFigureOut">
               <a:rPr lang="en-US" smtClean="0"/>
-              <a:t>10/1/2010</a:t>
+              <a:t>10/26/2010</a:t>
             </a:fld>
             <a:endParaRPr lang="en-US"/>
           </a:p>
@@ -2324,7 +2324,7 @@
           <a:p>
             <a:fld id="{F0172217-DC24-48CD-AE89-68C8C8D878B4}" type="datetimeFigureOut">
               <a:rPr lang="en-US" smtClean="0"/>
-              <a:t>10/1/2010</a:t>
+              <a:t>10/26/2010</a:t>
             </a:fld>
             <a:endParaRPr lang="en-US"/>
           </a:p>
@@ -2419,7 +2419,7 @@
           <a:p>
             <a:fld id="{F0172217-DC24-48CD-AE89-68C8C8D878B4}" type="datetimeFigureOut">
               <a:rPr lang="en-US" smtClean="0"/>
-              <a:t>10/1/2010</a:t>
+              <a:t>10/26/2010</a:t>
             </a:fld>
             <a:endParaRPr lang="en-US"/>
           </a:p>
@@ -2696,7 +2696,7 @@
           <a:p>
             <a:fld id="{F0172217-DC24-48CD-AE89-68C8C8D878B4}" type="datetimeFigureOut">
               <a:rPr lang="en-US" smtClean="0"/>
-              <a:t>10/1/2010</a:t>
+              <a:t>10/26/2010</a:t>
             </a:fld>
             <a:endParaRPr lang="en-US"/>
           </a:p>
@@ -2949,7 +2949,7 @@
           <a:p>
             <a:fld id="{F0172217-DC24-48CD-AE89-68C8C8D878B4}" type="datetimeFigureOut">
               <a:rPr lang="en-US" smtClean="0"/>
-              <a:t>10/1/2010</a:t>
+              <a:t>10/26/2010</a:t>
             </a:fld>
             <a:endParaRPr lang="en-US"/>
           </a:p>
@@ -3162,7 +3162,7 @@
           <a:p>
             <a:fld id="{F0172217-DC24-48CD-AE89-68C8C8D878B4}" type="datetimeFigureOut">
               <a:rPr lang="en-US" smtClean="0"/>
-              <a:t>10/1/2010</a:t>
+              <a:t>10/26/2010</a:t>
             </a:fld>
             <a:endParaRPr lang="en-US"/>
           </a:p>
@@ -3776,7 +3776,7 @@
               <a:noFill/>
               <a:ln w="6350">
                 <a:solidFill>
-                  <a:srgbClr val="002060"/>
+                  <a:schemeClr val="tx1"/>
                 </a:solidFill>
               </a:ln>
             </p:spPr>
@@ -3829,7 +3829,7 @@
               <a:noFill/>
               <a:ln w="6350">
                 <a:solidFill>
-                  <a:srgbClr val="002060"/>
+                  <a:schemeClr val="tx1"/>
                 </a:solidFill>
               </a:ln>
             </p:spPr>

</xml_diff>

<commit_message>
A variety of updates to the spec, largely based on feedback from HARMONY 2011.  Includes: -reshuffling of attributes on Deletion/Replacements, -renaming of Subelement to SBaseRef, -removal of xpath:element (well, moved it from the spec to a 'future sections' bit), -removal of references to xinclude, -moving ports to a <listofports> element so that it can be annotated with port contracts in the future (officially) and now (unofficially).
</commit_message>
<xml_diff>
--- a/sbml-level-3/version-1/comp/HierarchicalModel.pptx
+++ b/sbml-level-3/version-1/comp/HierarchicalModel.pptx
@@ -10,7 +10,7 @@
   <p:sldIdLst>
     <p:sldId id="257" r:id="rId2"/>
   </p:sldIdLst>
-  <p:sldSz cx="2378075" cy="1828800"/>
+  <p:sldSz cx="2378075" cy="2560638"/>
   <p:notesSz cx="6858000" cy="9144000"/>
   <p:defaultTextStyle>
     <a:defPPr>
@@ -192,7 +192,7 @@
           <a:p>
             <a:fld id="{7754A941-C6C2-4027-B1F4-A5E937B2245F}" type="datetimeFigureOut">
               <a:rPr lang="en-US" smtClean="0"/>
-              <a:t>10/26/2010</a:t>
+              <a:t>4/27/2011</a:t>
             </a:fld>
             <a:endParaRPr lang="en-US"/>
           </a:p>
@@ -210,8 +210,8 @@
         </p:nvSpPr>
         <p:spPr>
           <a:xfrm>
-            <a:off x="1200150" y="685800"/>
-            <a:ext cx="4457700" cy="3429000"/>
+            <a:off x="1836738" y="685800"/>
+            <a:ext cx="3184525" cy="3429000"/>
           </a:xfrm>
           <a:prstGeom prst="rect">
             <a:avLst/>
@@ -489,8 +489,8 @@
         </p:nvSpPr>
         <p:spPr>
           <a:xfrm>
-            <a:off x="1200150" y="685800"/>
-            <a:ext cx="4457700" cy="3429000"/>
+            <a:off x="1836738" y="685800"/>
+            <a:ext cx="3184525" cy="3429000"/>
           </a:xfrm>
         </p:spPr>
       </p:sp>
@@ -578,8 +578,8 @@
         </p:nvSpPr>
         <p:spPr>
           <a:xfrm>
-            <a:off x="178360" y="568118"/>
-            <a:ext cx="2021363" cy="392007"/>
+            <a:off x="178369" y="795467"/>
+            <a:ext cx="2021363" cy="548879"/>
           </a:xfrm>
         </p:spPr>
         <p:txBody>
@@ -606,8 +606,8 @@
         </p:nvSpPr>
         <p:spPr>
           <a:xfrm>
-            <a:off x="356717" y="1036325"/>
-            <a:ext cx="1664653" cy="467360"/>
+            <a:off x="356726" y="1451038"/>
+            <a:ext cx="1664653" cy="654384"/>
           </a:xfrm>
         </p:spPr>
         <p:txBody>
@@ -730,7 +730,7 @@
           <a:p>
             <a:fld id="{F0172217-DC24-48CD-AE89-68C8C8D878B4}" type="datetimeFigureOut">
               <a:rPr lang="en-US" smtClean="0"/>
-              <a:t>10/26/2010</a:t>
+              <a:t>4/27/2011</a:t>
             </a:fld>
             <a:endParaRPr lang="en-US"/>
           </a:p>
@@ -900,7 +900,7 @@
           <a:p>
             <a:fld id="{F0172217-DC24-48CD-AE89-68C8C8D878B4}" type="datetimeFigureOut">
               <a:rPr lang="en-US" smtClean="0"/>
-              <a:t>10/26/2010</a:t>
+              <a:t>4/27/2011</a:t>
             </a:fld>
             <a:endParaRPr lang="en-US"/>
           </a:p>
@@ -990,8 +990,8 @@
         </p:nvSpPr>
         <p:spPr>
           <a:xfrm>
-            <a:off x="1724108" y="73240"/>
-            <a:ext cx="535067" cy="1560408"/>
+            <a:off x="1724111" y="102548"/>
+            <a:ext cx="535067" cy="2184843"/>
           </a:xfrm>
         </p:spPr>
         <p:txBody>
@@ -1018,8 +1018,8 @@
         </p:nvSpPr>
         <p:spPr>
           <a:xfrm>
-            <a:off x="118905" y="73240"/>
-            <a:ext cx="1565566" cy="1560408"/>
+            <a:off x="118905" y="102548"/>
+            <a:ext cx="1565566" cy="2184843"/>
           </a:xfrm>
         </p:spPr>
         <p:txBody>
@@ -1080,7 +1080,7 @@
           <a:p>
             <a:fld id="{F0172217-DC24-48CD-AE89-68C8C8D878B4}" type="datetimeFigureOut">
               <a:rPr lang="en-US" smtClean="0"/>
-              <a:t>10/26/2010</a:t>
+              <a:t>4/27/2011</a:t>
             </a:fld>
             <a:endParaRPr lang="en-US"/>
           </a:p>
@@ -1250,7 +1250,7 @@
           <a:p>
             <a:fld id="{F0172217-DC24-48CD-AE89-68C8C8D878B4}" type="datetimeFigureOut">
               <a:rPr lang="en-US" smtClean="0"/>
-              <a:t>10/26/2010</a:t>
+              <a:t>4/27/2011</a:t>
             </a:fld>
             <a:endParaRPr lang="en-US"/>
           </a:p>
@@ -1340,8 +1340,8 @@
         </p:nvSpPr>
         <p:spPr>
           <a:xfrm>
-            <a:off x="187855" y="1175177"/>
-            <a:ext cx="2021363" cy="363220"/>
+            <a:off x="187858" y="1645455"/>
+            <a:ext cx="2021363" cy="508571"/>
           </a:xfrm>
         </p:spPr>
         <p:txBody>
@@ -1372,8 +1372,8 @@
         </p:nvSpPr>
         <p:spPr>
           <a:xfrm>
-            <a:off x="187855" y="775128"/>
-            <a:ext cx="2021363" cy="400050"/>
+            <a:off x="187858" y="1085315"/>
+            <a:ext cx="2021363" cy="560141"/>
           </a:xfrm>
         </p:spPr>
         <p:txBody>
@@ -1496,7 +1496,7 @@
           <a:p>
             <a:fld id="{F0172217-DC24-48CD-AE89-68C8C8D878B4}" type="datetimeFigureOut">
               <a:rPr lang="en-US" smtClean="0"/>
-              <a:t>10/26/2010</a:t>
+              <a:t>4/27/2011</a:t>
             </a:fld>
             <a:endParaRPr lang="en-US"/>
           </a:p>
@@ -1609,8 +1609,8 @@
         </p:nvSpPr>
         <p:spPr>
           <a:xfrm>
-            <a:off x="118906" y="426725"/>
-            <a:ext cx="1050316" cy="1206924"/>
+            <a:off x="118906" y="597492"/>
+            <a:ext cx="1050316" cy="1689902"/>
           </a:xfrm>
         </p:spPr>
         <p:txBody>
@@ -1694,8 +1694,8 @@
         </p:nvSpPr>
         <p:spPr>
           <a:xfrm>
-            <a:off x="1208856" y="426725"/>
-            <a:ext cx="1050316" cy="1206924"/>
+            <a:off x="1208856" y="597492"/>
+            <a:ext cx="1050316" cy="1689902"/>
           </a:xfrm>
         </p:spPr>
         <p:txBody>
@@ -1784,7 +1784,7 @@
           <a:p>
             <a:fld id="{F0172217-DC24-48CD-AE89-68C8C8D878B4}" type="datetimeFigureOut">
               <a:rPr lang="en-US" smtClean="0"/>
-              <a:t>10/26/2010</a:t>
+              <a:t>4/27/2011</a:t>
             </a:fld>
             <a:endParaRPr lang="en-US"/>
           </a:p>
@@ -1901,8 +1901,8 @@
         </p:nvSpPr>
         <p:spPr>
           <a:xfrm>
-            <a:off x="118914" y="409369"/>
-            <a:ext cx="1050729" cy="170603"/>
+            <a:off x="118923" y="573189"/>
+            <a:ext cx="1050729" cy="238875"/>
           </a:xfrm>
         </p:spPr>
         <p:txBody>
@@ -1966,8 +1966,8 @@
         </p:nvSpPr>
         <p:spPr>
           <a:xfrm>
-            <a:off x="118914" y="579971"/>
-            <a:ext cx="1050729" cy="1053677"/>
+            <a:off x="118923" y="812062"/>
+            <a:ext cx="1050729" cy="1475330"/>
           </a:xfrm>
         </p:spPr>
         <p:txBody>
@@ -2051,8 +2051,8 @@
         </p:nvSpPr>
         <p:spPr>
           <a:xfrm>
-            <a:off x="1208036" y="409369"/>
-            <a:ext cx="1051143" cy="170603"/>
+            <a:off x="1208038" y="573189"/>
+            <a:ext cx="1051143" cy="238875"/>
           </a:xfrm>
         </p:spPr>
         <p:txBody>
@@ -2116,8 +2116,8 @@
         </p:nvSpPr>
         <p:spPr>
           <a:xfrm>
-            <a:off x="1208036" y="579971"/>
-            <a:ext cx="1051143" cy="1053677"/>
+            <a:off x="1208038" y="812062"/>
+            <a:ext cx="1051143" cy="1475330"/>
           </a:xfrm>
         </p:spPr>
         <p:txBody>
@@ -2206,7 +2206,7 @@
           <a:p>
             <a:fld id="{F0172217-DC24-48CD-AE89-68C8C8D878B4}" type="datetimeFigureOut">
               <a:rPr lang="en-US" smtClean="0"/>
-              <a:t>10/26/2010</a:t>
+              <a:t>4/27/2011</a:t>
             </a:fld>
             <a:endParaRPr lang="en-US"/>
           </a:p>
@@ -2324,7 +2324,7 @@
           <a:p>
             <a:fld id="{F0172217-DC24-48CD-AE89-68C8C8D878B4}" type="datetimeFigureOut">
               <a:rPr lang="en-US" smtClean="0"/>
-              <a:t>10/26/2010</a:t>
+              <a:t>4/27/2011</a:t>
             </a:fld>
             <a:endParaRPr lang="en-US"/>
           </a:p>
@@ -2419,7 +2419,7 @@
           <a:p>
             <a:fld id="{F0172217-DC24-48CD-AE89-68C8C8D878B4}" type="datetimeFigureOut">
               <a:rPr lang="en-US" smtClean="0"/>
-              <a:t>10/26/2010</a:t>
+              <a:t>4/27/2011</a:t>
             </a:fld>
             <a:endParaRPr lang="en-US"/>
           </a:p>
@@ -2509,8 +2509,8 @@
         </p:nvSpPr>
         <p:spPr>
           <a:xfrm>
-            <a:off x="118913" y="72813"/>
-            <a:ext cx="782369" cy="309880"/>
+            <a:off x="118922" y="101954"/>
+            <a:ext cx="782369" cy="433886"/>
           </a:xfrm>
         </p:spPr>
         <p:txBody>
@@ -2541,8 +2541,8 @@
         </p:nvSpPr>
         <p:spPr>
           <a:xfrm>
-            <a:off x="929766" y="72822"/>
-            <a:ext cx="1329410" cy="1560830"/>
+            <a:off x="929766" y="101966"/>
+            <a:ext cx="1329410" cy="2185434"/>
           </a:xfrm>
         </p:spPr>
         <p:txBody>
@@ -2626,8 +2626,8 @@
         </p:nvSpPr>
         <p:spPr>
           <a:xfrm>
-            <a:off x="118913" y="382698"/>
-            <a:ext cx="782369" cy="1250951"/>
+            <a:off x="118922" y="535849"/>
+            <a:ext cx="782369" cy="1751549"/>
           </a:xfrm>
         </p:spPr>
         <p:txBody>
@@ -2696,7 +2696,7 @@
           <a:p>
             <a:fld id="{F0172217-DC24-48CD-AE89-68C8C8D878B4}" type="datetimeFigureOut">
               <a:rPr lang="en-US" smtClean="0"/>
-              <a:t>10/26/2010</a:t>
+              <a:t>4/27/2011</a:t>
             </a:fld>
             <a:endParaRPr lang="en-US"/>
           </a:p>
@@ -2786,8 +2786,8 @@
         </p:nvSpPr>
         <p:spPr>
           <a:xfrm>
-            <a:off x="466125" y="1280167"/>
-            <a:ext cx="1426845" cy="151129"/>
+            <a:off x="466134" y="1792459"/>
+            <a:ext cx="1426845" cy="211607"/>
           </a:xfrm>
         </p:spPr>
         <p:txBody>
@@ -2818,8 +2818,8 @@
         </p:nvSpPr>
         <p:spPr>
           <a:xfrm>
-            <a:off x="466125" y="163413"/>
-            <a:ext cx="1426845" cy="1097280"/>
+            <a:off x="466134" y="228809"/>
+            <a:ext cx="1426845" cy="1536383"/>
           </a:xfrm>
         </p:spPr>
         <p:txBody>
@@ -2879,8 +2879,8 @@
         </p:nvSpPr>
         <p:spPr>
           <a:xfrm>
-            <a:off x="466125" y="1431301"/>
-            <a:ext cx="1426845" cy="214629"/>
+            <a:off x="466134" y="2004073"/>
+            <a:ext cx="1426845" cy="300518"/>
           </a:xfrm>
         </p:spPr>
         <p:txBody>
@@ -2949,7 +2949,7 @@
           <a:p>
             <a:fld id="{F0172217-DC24-48CD-AE89-68C8C8D878B4}" type="datetimeFigureOut">
               <a:rPr lang="en-US" smtClean="0"/>
-              <a:t>10/26/2010</a:t>
+              <a:t>4/27/2011</a:t>
             </a:fld>
             <a:endParaRPr lang="en-US"/>
           </a:p>
@@ -3044,8 +3044,8 @@
         </p:nvSpPr>
         <p:spPr>
           <a:xfrm>
-            <a:off x="118906" y="73243"/>
-            <a:ext cx="2140267" cy="304800"/>
+            <a:off x="118915" y="102554"/>
+            <a:ext cx="2140267" cy="426773"/>
           </a:xfrm>
           <a:prstGeom prst="rect">
             <a:avLst/>
@@ -3077,8 +3077,8 @@
         </p:nvSpPr>
         <p:spPr>
           <a:xfrm>
-            <a:off x="118906" y="426725"/>
-            <a:ext cx="2140267" cy="1206924"/>
+            <a:off x="118915" y="597492"/>
+            <a:ext cx="2140267" cy="1689902"/>
           </a:xfrm>
           <a:prstGeom prst="rect">
             <a:avLst/>
@@ -3139,8 +3139,8 @@
         </p:nvSpPr>
         <p:spPr>
           <a:xfrm>
-            <a:off x="118904" y="1695037"/>
-            <a:ext cx="554884" cy="97367"/>
+            <a:off x="118904" y="2373351"/>
+            <a:ext cx="554884" cy="136330"/>
           </a:xfrm>
           <a:prstGeom prst="rect">
             <a:avLst/>
@@ -3162,7 +3162,7 @@
           <a:p>
             <a:fld id="{F0172217-DC24-48CD-AE89-68C8C8D878B4}" type="datetimeFigureOut">
               <a:rPr lang="en-US" smtClean="0"/>
-              <a:t>10/26/2010</a:t>
+              <a:t>4/27/2011</a:t>
             </a:fld>
             <a:endParaRPr lang="en-US"/>
           </a:p>
@@ -3180,8 +3180,8 @@
         </p:nvSpPr>
         <p:spPr>
           <a:xfrm>
-            <a:off x="812515" y="1695037"/>
-            <a:ext cx="753057" cy="97367"/>
+            <a:off x="812524" y="2373351"/>
+            <a:ext cx="753057" cy="136330"/>
           </a:xfrm>
           <a:prstGeom prst="rect">
             <a:avLst/>
@@ -3217,8 +3217,8 @@
         </p:nvSpPr>
         <p:spPr>
           <a:xfrm>
-            <a:off x="1704287" y="1695037"/>
-            <a:ext cx="554884" cy="97367"/>
+            <a:off x="1704287" y="2373351"/>
+            <a:ext cx="554884" cy="136330"/>
           </a:xfrm>
           <a:prstGeom prst="rect">
             <a:avLst/>
@@ -3539,236 +3539,42 @@
       </p:grpSpPr>
       <p:grpSp>
         <p:nvGrpSpPr>
-          <p:cNvPr id="54" name="Group 53"/>
+          <p:cNvPr id="4" name="Group 3"/>
           <p:cNvGrpSpPr/>
           <p:nvPr/>
         </p:nvGrpSpPr>
         <p:grpSpPr>
           <a:xfrm>
-            <a:off x="47485" y="87559"/>
-            <a:ext cx="2283105" cy="1653683"/>
-            <a:chOff x="47484" y="388636"/>
-            <a:chExt cx="2283105" cy="1653683"/>
+            <a:off x="46761" y="54355"/>
+            <a:ext cx="2284553" cy="2451928"/>
+            <a:chOff x="46761" y="16633"/>
+            <a:chExt cx="2284553" cy="2451928"/>
           </a:xfrm>
         </p:grpSpPr>
-        <p:sp>
-          <p:nvSpPr>
-            <p:cNvPr id="55" name="Rectangle 54"/>
-            <p:cNvSpPr/>
-            <p:nvPr/>
-          </p:nvSpPr>
-          <p:spPr>
-            <a:xfrm>
-              <a:off x="118765" y="388636"/>
-              <a:ext cx="1502199" cy="279596"/>
-            </a:xfrm>
-            <a:prstGeom prst="rect">
-              <a:avLst/>
-            </a:prstGeom>
-            <a:noFill/>
-            <a:ln w="6350">
-              <a:solidFill>
-                <a:schemeClr val="tx1"/>
-              </a:solidFill>
-            </a:ln>
-          </p:spPr>
-          <p:style>
-            <a:lnRef idx="2">
-              <a:schemeClr val="accent1">
-                <a:shade val="50000"/>
-              </a:schemeClr>
-            </a:lnRef>
-            <a:fillRef idx="1">
-              <a:schemeClr val="accent1"/>
-            </a:fillRef>
-            <a:effectRef idx="0">
-              <a:schemeClr val="accent1"/>
-            </a:effectRef>
-            <a:fontRef idx="minor">
-              <a:schemeClr val="lt1"/>
-            </a:fontRef>
-          </p:style>
-          <p:txBody>
-            <a:bodyPr rtlCol="0" anchor="t"/>
-            <a:lstStyle/>
-            <a:p>
-              <a:pPr algn="ctr"/>
-              <a:r>
-                <a:rPr lang="en-US" sz="1100" b="1" dirty="0" smtClean="0">
-                  <a:solidFill>
-                    <a:schemeClr val="tx1"/>
-                  </a:solidFill>
-                </a:rPr>
-                <a:t>Model </a:t>
-              </a:r>
-              <a:r>
-                <a:rPr lang="en-US" sz="900" b="1" i="1" dirty="0" smtClean="0">
-                  <a:solidFill>
-                    <a:srgbClr val="00B050"/>
-                  </a:solidFill>
-                </a:rPr>
-                <a:t>(extended)</a:t>
-              </a:r>
-              <a:endParaRPr lang="en-US" sz="600" i="1" dirty="0">
-                <a:solidFill>
-                  <a:srgbClr val="00B050"/>
-                </a:solidFill>
-              </a:endParaRPr>
-            </a:p>
-          </p:txBody>
-        </p:sp>
-        <p:sp>
-          <p:nvSpPr>
-            <p:cNvPr id="56" name="Diamond 55"/>
-            <p:cNvSpPr/>
-            <p:nvPr/>
-          </p:nvSpPr>
-          <p:spPr>
-            <a:xfrm>
-              <a:off x="86217" y="669733"/>
-              <a:ext cx="66869" cy="152398"/>
-            </a:xfrm>
-            <a:prstGeom prst="diamond">
-              <a:avLst/>
-            </a:prstGeom>
-            <a:solidFill>
-              <a:srgbClr val="00B050"/>
-            </a:solidFill>
-            <a:ln w="6350">
-              <a:solidFill>
-                <a:srgbClr val="00B050"/>
-              </a:solidFill>
-            </a:ln>
-          </p:spPr>
-          <p:style>
-            <a:lnRef idx="2">
-              <a:schemeClr val="accent1">
-                <a:shade val="50000"/>
-              </a:schemeClr>
-            </a:lnRef>
-            <a:fillRef idx="1">
-              <a:schemeClr val="accent1"/>
-            </a:fillRef>
-            <a:effectRef idx="0">
-              <a:schemeClr val="accent1"/>
-            </a:effectRef>
-            <a:fontRef idx="minor">
-              <a:schemeClr val="lt1"/>
-            </a:fontRef>
-          </p:style>
-          <p:txBody>
-            <a:bodyPr lIns="91440" tIns="45720" rIns="91440" bIns="45720" spcCol="0" rtlCol="0" anchor="ctr"/>
-            <a:lstStyle/>
-            <a:p>
-              <a:pPr algn="ctr"/>
-              <a:endParaRPr lang="en-US"/>
-            </a:p>
-          </p:txBody>
-        </p:sp>
-        <p:cxnSp>
-          <p:nvCxnSpPr>
-            <p:cNvPr id="57" name="Elbow Connector 56"/>
-            <p:cNvCxnSpPr>
-              <a:stCxn id="81" idx="2"/>
-              <a:endCxn id="62" idx="0"/>
-            </p:cNvCxnSpPr>
-            <p:nvPr/>
-          </p:nvCxnSpPr>
-          <p:spPr>
-            <a:xfrm rot="16200000" flipH="1">
-              <a:off x="672370" y="1110699"/>
-              <a:ext cx="210807" cy="1042832"/>
-            </a:xfrm>
-            <a:prstGeom prst="bentConnector3">
-              <a:avLst>
-                <a:gd name="adj1" fmla="val 50000"/>
-              </a:avLst>
-            </a:prstGeom>
-            <a:ln w="6350">
-              <a:solidFill>
-                <a:srgbClr val="0070C0"/>
-              </a:solidFill>
-            </a:ln>
-          </p:spPr>
-          <p:style>
-            <a:lnRef idx="1">
-              <a:schemeClr val="accent1"/>
-            </a:lnRef>
-            <a:fillRef idx="0">
-              <a:schemeClr val="accent1"/>
-            </a:fillRef>
-            <a:effectRef idx="0">
-              <a:schemeClr val="accent1"/>
-            </a:effectRef>
-            <a:fontRef idx="minor">
-              <a:schemeClr val="tx1"/>
-            </a:fontRef>
-          </p:style>
-        </p:cxnSp>
-        <p:cxnSp>
-          <p:nvCxnSpPr>
-            <p:cNvPr id="58" name="Elbow Connector 57"/>
-            <p:cNvCxnSpPr>
-              <a:stCxn id="56" idx="2"/>
-              <a:endCxn id="80" idx="0"/>
-            </p:cNvCxnSpPr>
-            <p:nvPr/>
-          </p:nvCxnSpPr>
-          <p:spPr>
-            <a:xfrm rot="16200000" flipH="1">
-              <a:off x="437503" y="504280"/>
-              <a:ext cx="249206" cy="884908"/>
-            </a:xfrm>
-            <a:prstGeom prst="bentConnector3">
-              <a:avLst>
-                <a:gd name="adj1" fmla="val 50000"/>
-              </a:avLst>
-            </a:prstGeom>
-            <a:ln w="6350">
-              <a:solidFill>
-                <a:srgbClr val="00B050"/>
-              </a:solidFill>
-            </a:ln>
-          </p:spPr>
-          <p:style>
-            <a:lnRef idx="1">
-              <a:schemeClr val="accent1"/>
-            </a:lnRef>
-            <a:fillRef idx="0">
-              <a:schemeClr val="accent1"/>
-            </a:fillRef>
-            <a:effectRef idx="0">
-              <a:schemeClr val="accent1"/>
-            </a:effectRef>
-            <a:fontRef idx="minor">
-              <a:schemeClr val="tx1"/>
-            </a:fontRef>
-          </p:style>
-        </p:cxnSp>
         <p:grpSp>
           <p:nvGrpSpPr>
-            <p:cNvPr id="59" name="Group 58"/>
+            <p:cNvPr id="79" name="Group 78"/>
             <p:cNvGrpSpPr/>
             <p:nvPr/>
           </p:nvGrpSpPr>
           <p:grpSpPr>
             <a:xfrm>
-              <a:off x="1748420" y="388636"/>
-              <a:ext cx="582169" cy="395396"/>
-              <a:chOff x="1585454" y="260276"/>
-              <a:chExt cx="582169" cy="395396"/>
+              <a:off x="46761" y="16633"/>
+              <a:ext cx="2284553" cy="2451928"/>
+              <a:chOff x="46037" y="87559"/>
+              <a:chExt cx="2284553" cy="2451928"/>
             </a:xfrm>
           </p:grpSpPr>
           <p:sp>
             <p:nvSpPr>
-              <p:cNvPr id="83" name="Rectangle 82"/>
+              <p:cNvPr id="80" name="Rectangle 79"/>
               <p:cNvSpPr/>
               <p:nvPr/>
             </p:nvSpPr>
             <p:spPr>
               <a:xfrm>
-                <a:off x="1585454" y="260276"/>
-                <a:ext cx="582169" cy="281097"/>
+                <a:off x="118766" y="87559"/>
+                <a:ext cx="1502199" cy="279596"/>
               </a:xfrm>
               <a:prstGeom prst="rect">
                 <a:avLst/>
@@ -3797,39 +3603,54 @@
               </a:fontRef>
             </p:style>
             <p:txBody>
-              <a:bodyPr lIns="91440" tIns="45720" rIns="91440" bIns="45720" spcCol="0" rtlCol="0" anchor="ctr"/>
+              <a:bodyPr rtlCol="0" anchor="t"/>
               <a:lstStyle/>
               <a:p>
                 <a:pPr algn="ctr"/>
                 <a:r>
-                  <a:rPr lang="en-US" sz="1100" b="1" dirty="0">
+                  <a:rPr lang="en-US" sz="1100" b="1" dirty="0" smtClean="0">
                     <a:solidFill>
                       <a:schemeClr val="tx1"/>
                     </a:solidFill>
                   </a:rPr>
-                  <a:t>SBase</a:t>
+                  <a:t>Model </a:t>
                 </a:r>
+                <a:r>
+                  <a:rPr lang="en-US" sz="900" b="1" i="1" dirty="0" smtClean="0">
+                    <a:solidFill>
+                      <a:srgbClr val="00B050"/>
+                    </a:solidFill>
+                  </a:rPr>
+                  <a:t>(extended)</a:t>
+                </a:r>
+                <a:endParaRPr lang="en-US" sz="600" i="1" dirty="0">
+                  <a:solidFill>
+                    <a:srgbClr val="00B050"/>
+                  </a:solidFill>
+                </a:endParaRPr>
               </a:p>
             </p:txBody>
           </p:sp>
           <p:sp>
             <p:nvSpPr>
-              <p:cNvPr id="84" name="Isosceles Triangle 83"/>
+              <p:cNvPr id="81" name="Diamond 80"/>
               <p:cNvSpPr/>
               <p:nvPr/>
             </p:nvSpPr>
             <p:spPr>
               <a:xfrm>
-                <a:off x="1814057" y="541372"/>
-                <a:ext cx="159199" cy="114300"/>
+                <a:off x="86218" y="368656"/>
+                <a:ext cx="66869" cy="152398"/>
               </a:xfrm>
-              <a:prstGeom prst="triangle">
+              <a:prstGeom prst="diamond">
                 <a:avLst/>
               </a:prstGeom>
-              <a:noFill/>
+              <a:solidFill>
+                <a:srgbClr val="00B050"/>
+              </a:solidFill>
               <a:ln w="6350">
                 <a:solidFill>
-                  <a:schemeClr val="tx1"/>
+                  <a:srgbClr val="00B050"/>
                 </a:solidFill>
               </a:ln>
             </p:spPr>
@@ -3854,9 +3675,1060 @@
               <a:lstStyle/>
               <a:p>
                 <a:pPr algn="ctr"/>
+                <a:endParaRPr lang="en-US"/>
+              </a:p>
+            </p:txBody>
+          </p:sp>
+          <p:cxnSp>
+            <p:nvCxnSpPr>
+              <p:cNvPr id="82" name="Elbow Connector 81"/>
+              <p:cNvCxnSpPr>
+                <a:stCxn id="91" idx="2"/>
+                <a:endCxn id="87" idx="0"/>
+              </p:cNvCxnSpPr>
+              <p:nvPr/>
+            </p:nvCxnSpPr>
+            <p:spPr>
+              <a:xfrm rot="16200000" flipH="1">
+                <a:off x="747775" y="659919"/>
+                <a:ext cx="59998" cy="1042832"/>
+              </a:xfrm>
+              <a:prstGeom prst="bentConnector3">
+                <a:avLst>
+                  <a:gd name="adj1" fmla="val 50000"/>
+                </a:avLst>
+              </a:prstGeom>
+              <a:ln w="6350">
+                <a:solidFill>
+                  <a:srgbClr val="0070C0"/>
+                </a:solidFill>
+              </a:ln>
+            </p:spPr>
+            <p:style>
+              <a:lnRef idx="1">
+                <a:schemeClr val="accent1"/>
+              </a:lnRef>
+              <a:fillRef idx="0">
+                <a:schemeClr val="accent1"/>
+              </a:fillRef>
+              <a:effectRef idx="0">
+                <a:schemeClr val="accent1"/>
+              </a:effectRef>
+              <a:fontRef idx="minor">
+                <a:schemeClr val="tx1"/>
+              </a:fontRef>
+            </p:style>
+          </p:cxnSp>
+          <p:cxnSp>
+            <p:nvCxnSpPr>
+              <p:cNvPr id="83" name="Elbow Connector 82"/>
+              <p:cNvCxnSpPr>
+                <a:stCxn id="81" idx="2"/>
+              </p:cNvCxnSpPr>
+              <p:nvPr/>
+            </p:nvCxnSpPr>
+            <p:spPr>
+              <a:xfrm rot="16200000" flipH="1">
+                <a:off x="387625" y="253082"/>
+                <a:ext cx="249206" cy="785150"/>
+              </a:xfrm>
+              <a:prstGeom prst="bentConnector3">
+                <a:avLst>
+                  <a:gd name="adj1" fmla="val 50000"/>
+                </a:avLst>
+              </a:prstGeom>
+              <a:ln w="6350">
+                <a:solidFill>
+                  <a:srgbClr val="00B050"/>
+                </a:solidFill>
+              </a:ln>
+            </p:spPr>
+            <p:style>
+              <a:lnRef idx="1">
+                <a:schemeClr val="accent1"/>
+              </a:lnRef>
+              <a:fillRef idx="0">
+                <a:schemeClr val="accent1"/>
+              </a:fillRef>
+              <a:effectRef idx="0">
+                <a:schemeClr val="accent1"/>
+              </a:effectRef>
+              <a:fontRef idx="minor">
+                <a:schemeClr val="tx1"/>
+              </a:fontRef>
+            </p:style>
+          </p:cxnSp>
+          <p:grpSp>
+            <p:nvGrpSpPr>
+              <p:cNvPr id="84" name="Group 83"/>
+              <p:cNvGrpSpPr/>
+              <p:nvPr/>
+            </p:nvGrpSpPr>
+            <p:grpSpPr>
+              <a:xfrm>
+                <a:off x="1748421" y="87559"/>
+                <a:ext cx="582169" cy="395396"/>
+                <a:chOff x="1585454" y="260276"/>
+                <a:chExt cx="582169" cy="395396"/>
+              </a:xfrm>
+            </p:grpSpPr>
+            <p:sp>
+              <p:nvSpPr>
+                <p:cNvPr id="102" name="Rectangle 101"/>
+                <p:cNvSpPr/>
+                <p:nvPr/>
+              </p:nvSpPr>
+              <p:spPr>
+                <a:xfrm>
+                  <a:off x="1585454" y="260276"/>
+                  <a:ext cx="582169" cy="281097"/>
+                </a:xfrm>
+                <a:prstGeom prst="rect">
+                  <a:avLst/>
+                </a:prstGeom>
+                <a:noFill/>
+                <a:ln w="6350">
+                  <a:solidFill>
+                    <a:schemeClr val="tx1"/>
+                  </a:solidFill>
+                </a:ln>
+              </p:spPr>
+              <p:style>
+                <a:lnRef idx="2">
+                  <a:schemeClr val="accent1">
+                    <a:shade val="50000"/>
+                  </a:schemeClr>
+                </a:lnRef>
+                <a:fillRef idx="1">
+                  <a:schemeClr val="accent1"/>
+                </a:fillRef>
+                <a:effectRef idx="0">
+                  <a:schemeClr val="accent1"/>
+                </a:effectRef>
+                <a:fontRef idx="minor">
+                  <a:schemeClr val="lt1"/>
+                </a:fontRef>
+              </p:style>
+              <p:txBody>
+                <a:bodyPr lIns="91440" tIns="45720" rIns="91440" bIns="45720" spcCol="0" rtlCol="0" anchor="ctr"/>
+                <a:lstStyle/>
+                <a:p>
+                  <a:pPr algn="ctr"/>
+                  <a:r>
+                    <a:rPr lang="en-US" sz="1100" b="1" dirty="0">
+                      <a:solidFill>
+                        <a:schemeClr val="tx1"/>
+                      </a:solidFill>
+                    </a:rPr>
+                    <a:t>SBase</a:t>
+                  </a:r>
+                </a:p>
+              </p:txBody>
+            </p:sp>
+            <p:sp>
+              <p:nvSpPr>
+                <p:cNvPr id="103" name="Isosceles Triangle 102"/>
+                <p:cNvSpPr/>
+                <p:nvPr/>
+              </p:nvSpPr>
+              <p:spPr>
+                <a:xfrm>
+                  <a:off x="1814057" y="541372"/>
+                  <a:ext cx="159199" cy="114300"/>
+                </a:xfrm>
+                <a:prstGeom prst="triangle">
+                  <a:avLst/>
+                </a:prstGeom>
+                <a:noFill/>
+                <a:ln w="6350">
+                  <a:solidFill>
+                    <a:schemeClr val="tx1"/>
+                  </a:solidFill>
+                </a:ln>
+              </p:spPr>
+              <p:style>
+                <a:lnRef idx="2">
+                  <a:schemeClr val="accent1">
+                    <a:shade val="50000"/>
+                  </a:schemeClr>
+                </a:lnRef>
+                <a:fillRef idx="1">
+                  <a:schemeClr val="accent1"/>
+                </a:fillRef>
+                <a:effectRef idx="0">
+                  <a:schemeClr val="accent1"/>
+                </a:effectRef>
+                <a:fontRef idx="minor">
+                  <a:schemeClr val="lt1"/>
+                </a:fontRef>
+              </p:style>
+              <p:txBody>
+                <a:bodyPr lIns="91440" tIns="45720" rIns="91440" bIns="45720" spcCol="0" rtlCol="0" anchor="ctr"/>
+                <a:lstStyle/>
+                <a:p>
+                  <a:pPr algn="ctr"/>
+                  <a:endParaRPr lang="en-US" sz="1100" b="1" dirty="0">
+                    <a:solidFill>
+                      <a:schemeClr val="tx1"/>
+                    </a:solidFill>
+                  </a:endParaRPr>
+                </a:p>
+              </p:txBody>
+            </p:sp>
+          </p:grpSp>
+          <p:cxnSp>
+            <p:nvCxnSpPr>
+              <p:cNvPr id="85" name="Elbow Connector 84"/>
+              <p:cNvCxnSpPr>
+                <a:stCxn id="90" idx="3"/>
+                <a:endCxn id="103" idx="3"/>
+              </p:cNvCxnSpPr>
+              <p:nvPr/>
+            </p:nvCxnSpPr>
+            <p:spPr>
+              <a:xfrm flipV="1">
+                <a:off x="1556874" y="482955"/>
+                <a:ext cx="499750" cy="401643"/>
+              </a:xfrm>
+              <a:prstGeom prst="bentConnector2">
+                <a:avLst/>
+              </a:prstGeom>
+              <a:ln w="6350">
+                <a:solidFill>
+                  <a:srgbClr val="0070C0"/>
+                </a:solidFill>
+              </a:ln>
+            </p:spPr>
+            <p:style>
+              <a:lnRef idx="1">
+                <a:schemeClr val="accent1"/>
+              </a:lnRef>
+              <a:fillRef idx="0">
+                <a:schemeClr val="accent1"/>
+              </a:fillRef>
+              <a:effectRef idx="0">
+                <a:schemeClr val="accent1"/>
+              </a:effectRef>
+              <a:fontRef idx="minor">
+                <a:schemeClr val="tx1"/>
+              </a:fontRef>
+            </p:style>
+          </p:cxnSp>
+          <p:sp>
+            <p:nvSpPr>
+              <p:cNvPr id="86" name="Rectangle 85"/>
+              <p:cNvSpPr/>
+              <p:nvPr/>
+            </p:nvSpPr>
+            <p:spPr>
+              <a:xfrm>
+                <a:off x="47485" y="457510"/>
+                <a:ext cx="954107" cy="369332"/>
+              </a:xfrm>
+              <a:prstGeom prst="rect">
+                <a:avLst/>
+              </a:prstGeom>
+            </p:spPr>
+            <p:txBody>
+              <a:bodyPr wrap="none" lIns="91440" tIns="45720" rIns="91440" bIns="45720">
+                <a:spAutoFit/>
+              </a:bodyPr>
+              <a:lstStyle/>
+              <a:p>
+                <a:r>
+                  <a:rPr lang="en-US" sz="900" dirty="0" err="1" smtClean="0">
+                    <a:solidFill>
+                      <a:srgbClr val="00B050"/>
+                    </a:solidFill>
+                  </a:rPr>
+                  <a:t>listOfSubmodels</a:t>
+                </a:r>
+                <a:endParaRPr lang="en-US" sz="900" dirty="0">
+                  <a:solidFill>
+                    <a:srgbClr val="00B050"/>
+                  </a:solidFill>
+                </a:endParaRPr>
+              </a:p>
+              <a:p>
+                <a:r>
+                  <a:rPr lang="en-US" sz="900" dirty="0">
+                    <a:solidFill>
+                      <a:srgbClr val="00B050"/>
+                    </a:solidFill>
+                  </a:rPr>
+                  <a:t>0,1</a:t>
+                </a:r>
+              </a:p>
+            </p:txBody>
+          </p:sp>
+          <p:sp>
+            <p:nvSpPr>
+              <p:cNvPr id="87" name="Rectangle 86"/>
+              <p:cNvSpPr/>
+              <p:nvPr/>
+            </p:nvSpPr>
+            <p:spPr>
+              <a:xfrm>
+                <a:off x="689590" y="1211334"/>
+                <a:ext cx="1219200" cy="231056"/>
+              </a:xfrm>
+              <a:prstGeom prst="rect">
+                <a:avLst/>
+              </a:prstGeom>
+              <a:noFill/>
+              <a:ln w="6350">
+                <a:solidFill>
+                  <a:srgbClr val="0070C0"/>
+                </a:solidFill>
+              </a:ln>
+            </p:spPr>
+            <p:style>
+              <a:lnRef idx="2">
+                <a:schemeClr val="accent1">
+                  <a:shade val="50000"/>
+                </a:schemeClr>
+              </a:lnRef>
+              <a:fillRef idx="1">
+                <a:schemeClr val="accent1"/>
+              </a:fillRef>
+              <a:effectRef idx="0">
+                <a:schemeClr val="accent1"/>
+              </a:effectRef>
+              <a:fontRef idx="minor">
+                <a:schemeClr val="lt1"/>
+              </a:fontRef>
+            </p:style>
+            <p:txBody>
+              <a:bodyPr lIns="91440" tIns="45720" rIns="91440" bIns="45720" spcCol="0" rtlCol="0" anchor="ctr"/>
+              <a:lstStyle/>
+              <a:p>
+                <a:pPr algn="ctr"/>
+                <a:r>
+                  <a:rPr lang="en-US" sz="1100" b="1" dirty="0" smtClean="0">
+                    <a:solidFill>
+                      <a:srgbClr val="0070C0"/>
+                    </a:solidFill>
+                  </a:rPr>
+                  <a:t>Submodel</a:t>
+                </a:r>
                 <a:endParaRPr lang="en-US" sz="1100" b="1" dirty="0">
                   <a:solidFill>
-                    <a:schemeClr val="tx1"/>
+                    <a:srgbClr val="0070C0"/>
+                  </a:solidFill>
+                </a:endParaRPr>
+              </a:p>
+            </p:txBody>
+          </p:sp>
+          <p:sp>
+            <p:nvSpPr>
+              <p:cNvPr id="88" name="Rectangle 87"/>
+              <p:cNvSpPr/>
+              <p:nvPr/>
+            </p:nvSpPr>
+            <p:spPr>
+              <a:xfrm>
+                <a:off x="214128" y="1004543"/>
+                <a:ext cx="651140" cy="369332"/>
+              </a:xfrm>
+              <a:prstGeom prst="rect">
+                <a:avLst/>
+              </a:prstGeom>
+              <a:ln>
+                <a:noFill/>
+              </a:ln>
+            </p:spPr>
+            <p:txBody>
+              <a:bodyPr wrap="none" lIns="91440" tIns="45720" rIns="91440" bIns="45720">
+                <a:spAutoFit/>
+              </a:bodyPr>
+              <a:lstStyle/>
+              <a:p>
+                <a:r>
+                  <a:rPr lang="en-US" sz="900" dirty="0" smtClean="0">
+                    <a:solidFill>
+                      <a:srgbClr val="0070C0"/>
+                    </a:solidFill>
+                  </a:rPr>
+                  <a:t>submodel</a:t>
+                </a:r>
+                <a:endParaRPr lang="en-US" sz="900" dirty="0">
+                  <a:solidFill>
+                    <a:srgbClr val="0070C0"/>
+                  </a:solidFill>
+                </a:endParaRPr>
+              </a:p>
+              <a:p>
+                <a:r>
+                  <a:rPr lang="en-US" sz="900" dirty="0">
+                    <a:solidFill>
+                      <a:srgbClr val="0070C0"/>
+                    </a:solidFill>
+                  </a:rPr>
+                  <a:t>0,…,*</a:t>
+                </a:r>
+              </a:p>
+            </p:txBody>
+          </p:sp>
+          <p:cxnSp>
+            <p:nvCxnSpPr>
+              <p:cNvPr id="89" name="Elbow Connector 88"/>
+              <p:cNvCxnSpPr>
+                <a:stCxn id="87" idx="3"/>
+                <a:endCxn id="103" idx="3"/>
+              </p:cNvCxnSpPr>
+              <p:nvPr/>
+            </p:nvCxnSpPr>
+            <p:spPr>
+              <a:xfrm flipV="1">
+                <a:off x="1908790" y="482955"/>
+                <a:ext cx="147834" cy="843907"/>
+              </a:xfrm>
+              <a:prstGeom prst="bentConnector2">
+                <a:avLst/>
+              </a:prstGeom>
+              <a:ln w="6350">
+                <a:solidFill>
+                  <a:srgbClr val="0070C0"/>
+                </a:solidFill>
+              </a:ln>
+            </p:spPr>
+            <p:style>
+              <a:lnRef idx="1">
+                <a:schemeClr val="accent1"/>
+              </a:lnRef>
+              <a:fillRef idx="0">
+                <a:schemeClr val="accent1"/>
+              </a:fillRef>
+              <a:effectRef idx="0">
+                <a:schemeClr val="accent1"/>
+              </a:effectRef>
+              <a:fontRef idx="minor">
+                <a:schemeClr val="tx1"/>
+              </a:fontRef>
+            </p:style>
+          </p:cxnSp>
+          <p:sp>
+            <p:nvSpPr>
+              <p:cNvPr id="90" name="Rectangle 89"/>
+              <p:cNvSpPr/>
+              <p:nvPr/>
+            </p:nvSpPr>
+            <p:spPr>
+              <a:xfrm>
+                <a:off x="252731" y="770260"/>
+                <a:ext cx="1304143" cy="228676"/>
+              </a:xfrm>
+              <a:prstGeom prst="rect">
+                <a:avLst/>
+              </a:prstGeom>
+              <a:noFill/>
+              <a:ln w="6350">
+                <a:solidFill>
+                  <a:srgbClr val="0070C0"/>
+                </a:solidFill>
+              </a:ln>
+            </p:spPr>
+            <p:style>
+              <a:lnRef idx="2">
+                <a:schemeClr val="accent1">
+                  <a:shade val="50000"/>
+                </a:schemeClr>
+              </a:lnRef>
+              <a:fillRef idx="1">
+                <a:schemeClr val="accent1"/>
+              </a:fillRef>
+              <a:effectRef idx="0">
+                <a:schemeClr val="accent1"/>
+              </a:effectRef>
+              <a:fontRef idx="minor">
+                <a:schemeClr val="lt1"/>
+              </a:fontRef>
+            </p:style>
+            <p:txBody>
+              <a:bodyPr lIns="91440" tIns="45720" rIns="91440" bIns="45720" spcCol="0" rtlCol="0" anchor="ctr"/>
+              <a:lstStyle/>
+              <a:p>
+                <a:pPr algn="ctr"/>
+                <a:r>
+                  <a:rPr lang="en-US" sz="1100" b="1" dirty="0" err="1" smtClean="0">
+                    <a:solidFill>
+                      <a:srgbClr val="0070C0"/>
+                    </a:solidFill>
+                  </a:rPr>
+                  <a:t>ListOfSubmodels</a:t>
+                </a:r>
+                <a:endParaRPr lang="en-US" sz="1100" b="1" dirty="0">
+                  <a:solidFill>
+                    <a:srgbClr val="0070C0"/>
+                  </a:solidFill>
+                </a:endParaRPr>
+              </a:p>
+            </p:txBody>
+          </p:sp>
+          <p:sp>
+            <p:nvSpPr>
+              <p:cNvPr id="91" name="Diamond 90"/>
+              <p:cNvSpPr/>
+              <p:nvPr/>
+            </p:nvSpPr>
+            <p:spPr>
+              <a:xfrm>
+                <a:off x="222923" y="998938"/>
+                <a:ext cx="66869" cy="152398"/>
+              </a:xfrm>
+              <a:prstGeom prst="diamond">
+                <a:avLst/>
+              </a:prstGeom>
+              <a:solidFill>
+                <a:srgbClr val="0070C0"/>
+              </a:solidFill>
+              <a:ln w="6350">
+                <a:solidFill>
+                  <a:srgbClr val="0070C0"/>
+                </a:solidFill>
+              </a:ln>
+            </p:spPr>
+            <p:style>
+              <a:lnRef idx="2">
+                <a:schemeClr val="accent1">
+                  <a:shade val="50000"/>
+                </a:schemeClr>
+              </a:lnRef>
+              <a:fillRef idx="1">
+                <a:schemeClr val="accent1"/>
+              </a:fillRef>
+              <a:effectRef idx="0">
+                <a:schemeClr val="accent1"/>
+              </a:effectRef>
+              <a:fontRef idx="minor">
+                <a:schemeClr val="lt1"/>
+              </a:fontRef>
+            </p:style>
+            <p:txBody>
+              <a:bodyPr lIns="91440" tIns="45720" rIns="91440" bIns="45720" spcCol="0" rtlCol="0" anchor="ctr"/>
+              <a:lstStyle/>
+              <a:p>
+                <a:pPr algn="ctr"/>
+                <a:endParaRPr lang="en-US">
+                  <a:solidFill>
+                    <a:srgbClr val="0070C0"/>
+                  </a:solidFill>
+                </a:endParaRPr>
+              </a:p>
+            </p:txBody>
+          </p:sp>
+          <p:cxnSp>
+            <p:nvCxnSpPr>
+              <p:cNvPr id="92" name="Elbow Connector 91"/>
+              <p:cNvCxnSpPr>
+                <a:stCxn id="80" idx="2"/>
+                <a:endCxn id="103" idx="3"/>
+              </p:cNvCxnSpPr>
+              <p:nvPr/>
+            </p:nvCxnSpPr>
+            <p:spPr>
+              <a:xfrm rot="16200000" flipH="1">
+                <a:off x="1405345" y="-168324"/>
+                <a:ext cx="115800" cy="1186758"/>
+              </a:xfrm>
+              <a:prstGeom prst="bentConnector3">
+                <a:avLst>
+                  <a:gd name="adj1" fmla="val 137544"/>
+                </a:avLst>
+              </a:prstGeom>
+              <a:ln w="6350">
+                <a:solidFill>
+                  <a:schemeClr val="tx1"/>
+                </a:solidFill>
+              </a:ln>
+            </p:spPr>
+            <p:style>
+              <a:lnRef idx="1">
+                <a:schemeClr val="accent1"/>
+              </a:lnRef>
+              <a:fillRef idx="0">
+                <a:schemeClr val="accent1"/>
+              </a:fillRef>
+              <a:effectRef idx="0">
+                <a:schemeClr val="accent1"/>
+              </a:effectRef>
+              <a:fontRef idx="minor">
+                <a:schemeClr val="tx1"/>
+              </a:fontRef>
+            </p:style>
+          </p:cxnSp>
+          <p:cxnSp>
+            <p:nvCxnSpPr>
+              <p:cNvPr id="93" name="Elbow Connector 92"/>
+              <p:cNvCxnSpPr>
+                <a:stCxn id="101" idx="2"/>
+                <a:endCxn id="97" idx="0"/>
+              </p:cNvCxnSpPr>
+              <p:nvPr/>
+            </p:nvCxnSpPr>
+            <p:spPr>
+              <a:xfrm rot="16200000" flipH="1">
+                <a:off x="763189" y="1480198"/>
+                <a:ext cx="39165" cy="1032838"/>
+              </a:xfrm>
+              <a:prstGeom prst="bentConnector3">
+                <a:avLst>
+                  <a:gd name="adj1" fmla="val 50000"/>
+                </a:avLst>
+              </a:prstGeom>
+              <a:ln w="6350">
+                <a:solidFill>
+                  <a:srgbClr val="0070C0"/>
+                </a:solidFill>
+              </a:ln>
+            </p:spPr>
+            <p:style>
+              <a:lnRef idx="1">
+                <a:schemeClr val="accent1"/>
+              </a:lnRef>
+              <a:fillRef idx="0">
+                <a:schemeClr val="accent1"/>
+              </a:fillRef>
+              <a:effectRef idx="0">
+                <a:schemeClr val="accent1"/>
+              </a:effectRef>
+              <a:fontRef idx="minor">
+                <a:schemeClr val="tx1"/>
+              </a:fontRef>
+            </p:style>
+          </p:cxnSp>
+          <p:cxnSp>
+            <p:nvCxnSpPr>
+              <p:cNvPr id="94" name="Elbow Connector 93"/>
+              <p:cNvCxnSpPr>
+                <a:stCxn id="81" idx="2"/>
+                <a:endCxn id="100" idx="0"/>
+              </p:cNvCxnSpPr>
+              <p:nvPr/>
+            </p:nvCxnSpPr>
+            <p:spPr>
+              <a:xfrm rot="16200000" flipH="1">
+                <a:off x="-24922" y="665628"/>
+                <a:ext cx="1086738" cy="797589"/>
+              </a:xfrm>
+              <a:prstGeom prst="bentConnector3">
+                <a:avLst>
+                  <a:gd name="adj1" fmla="val 88835"/>
+                </a:avLst>
+              </a:prstGeom>
+              <a:ln w="6350">
+                <a:solidFill>
+                  <a:srgbClr val="00B050"/>
+                </a:solidFill>
+              </a:ln>
+            </p:spPr>
+            <p:style>
+              <a:lnRef idx="1">
+                <a:schemeClr val="accent1"/>
+              </a:lnRef>
+              <a:fillRef idx="0">
+                <a:schemeClr val="accent1"/>
+              </a:fillRef>
+              <a:effectRef idx="0">
+                <a:schemeClr val="accent1"/>
+              </a:effectRef>
+              <a:fontRef idx="minor">
+                <a:schemeClr val="tx1"/>
+              </a:fontRef>
+            </p:style>
+          </p:cxnSp>
+          <p:cxnSp>
+            <p:nvCxnSpPr>
+              <p:cNvPr id="95" name="Elbow Connector 94"/>
+              <p:cNvCxnSpPr>
+                <a:stCxn id="100" idx="3"/>
+                <a:endCxn id="103" idx="3"/>
+              </p:cNvCxnSpPr>
+              <p:nvPr/>
+            </p:nvCxnSpPr>
+            <p:spPr>
+              <a:xfrm flipV="1">
+                <a:off x="1569313" y="482955"/>
+                <a:ext cx="487311" cy="1233259"/>
+              </a:xfrm>
+              <a:prstGeom prst="bentConnector2">
+                <a:avLst/>
+              </a:prstGeom>
+              <a:ln w="6350">
+                <a:solidFill>
+                  <a:srgbClr val="0070C0"/>
+                </a:solidFill>
+              </a:ln>
+            </p:spPr>
+            <p:style>
+              <a:lnRef idx="1">
+                <a:schemeClr val="accent1"/>
+              </a:lnRef>
+              <a:fillRef idx="0">
+                <a:schemeClr val="accent1"/>
+              </a:fillRef>
+              <a:effectRef idx="0">
+                <a:schemeClr val="accent1"/>
+              </a:effectRef>
+              <a:fontRef idx="minor">
+                <a:schemeClr val="tx1"/>
+              </a:fontRef>
+            </p:style>
+          </p:cxnSp>
+          <p:sp>
+            <p:nvSpPr>
+              <p:cNvPr id="96" name="Rectangle 95"/>
+              <p:cNvSpPr/>
+              <p:nvPr/>
+            </p:nvSpPr>
+            <p:spPr>
+              <a:xfrm>
+                <a:off x="46037" y="1307900"/>
+                <a:ext cx="678391" cy="369332"/>
+              </a:xfrm>
+              <a:prstGeom prst="rect">
+                <a:avLst/>
+              </a:prstGeom>
+            </p:spPr>
+            <p:txBody>
+              <a:bodyPr wrap="none" lIns="91440" tIns="45720" rIns="91440" bIns="45720">
+                <a:spAutoFit/>
+              </a:bodyPr>
+              <a:lstStyle/>
+              <a:p>
+                <a:r>
+                  <a:rPr lang="en-US" sz="900" dirty="0" err="1" smtClean="0">
+                    <a:solidFill>
+                      <a:srgbClr val="00B050"/>
+                    </a:solidFill>
+                  </a:rPr>
+                  <a:t>listOfPorts</a:t>
+                </a:r>
+                <a:endParaRPr lang="en-US" sz="900" dirty="0">
+                  <a:solidFill>
+                    <a:srgbClr val="00B050"/>
+                  </a:solidFill>
+                </a:endParaRPr>
+              </a:p>
+              <a:p>
+                <a:r>
+                  <a:rPr lang="en-US" sz="900" dirty="0">
+                    <a:solidFill>
+                      <a:srgbClr val="00B050"/>
+                    </a:solidFill>
+                  </a:rPr>
+                  <a:t>0,1</a:t>
+                </a:r>
+              </a:p>
+            </p:txBody>
+          </p:sp>
+          <p:sp>
+            <p:nvSpPr>
+              <p:cNvPr id="97" name="Rectangle 96"/>
+              <p:cNvSpPr/>
+              <p:nvPr/>
+            </p:nvSpPr>
+            <p:spPr>
+              <a:xfrm>
+                <a:off x="689590" y="2016200"/>
+                <a:ext cx="1219200" cy="523287"/>
+              </a:xfrm>
+              <a:prstGeom prst="rect">
+                <a:avLst/>
+              </a:prstGeom>
+              <a:noFill/>
+              <a:ln w="6350">
+                <a:solidFill>
+                  <a:srgbClr val="0070C0"/>
+                </a:solidFill>
+              </a:ln>
+            </p:spPr>
+            <p:style>
+              <a:lnRef idx="2">
+                <a:schemeClr val="accent1">
+                  <a:shade val="50000"/>
+                </a:schemeClr>
+              </a:lnRef>
+              <a:fillRef idx="1">
+                <a:schemeClr val="accent1"/>
+              </a:fillRef>
+              <a:effectRef idx="0">
+                <a:schemeClr val="accent1"/>
+              </a:effectRef>
+              <a:fontRef idx="minor">
+                <a:schemeClr val="lt1"/>
+              </a:fontRef>
+            </p:style>
+            <p:txBody>
+              <a:bodyPr lIns="91440" tIns="45720" rIns="91440" bIns="45720" spcCol="0" rtlCol="0" anchor="t"/>
+              <a:lstStyle/>
+              <a:p>
+                <a:pPr algn="ctr"/>
+                <a:r>
+                  <a:rPr lang="en-US" sz="1100" b="1" dirty="0" smtClean="0">
+                    <a:solidFill>
+                      <a:srgbClr val="0070C0"/>
+                    </a:solidFill>
+                  </a:rPr>
+                  <a:t>Port</a:t>
+                </a:r>
+              </a:p>
+              <a:p>
+                <a:r>
+                  <a:rPr lang="en-US" sz="900" dirty="0" smtClean="0">
+                    <a:solidFill>
+                      <a:srgbClr val="0070C0"/>
+                    </a:solidFill>
+                  </a:rPr>
+                  <a:t>id: </a:t>
+                </a:r>
+                <a:r>
+                  <a:rPr lang="en-US" sz="900" smtClean="0">
+                    <a:solidFill>
+                      <a:srgbClr val="0070C0"/>
+                    </a:solidFill>
+                  </a:rPr>
+                  <a:t>PortId</a:t>
+                </a:r>
+                <a:endParaRPr lang="en-US" sz="900" dirty="0" smtClean="0">
+                  <a:solidFill>
+                    <a:srgbClr val="0070C0"/>
+                  </a:solidFill>
+                </a:endParaRPr>
+              </a:p>
+              <a:p>
+                <a:r>
+                  <a:rPr lang="en-US" sz="900" dirty="0" err="1" smtClean="0">
+                    <a:solidFill>
+                      <a:srgbClr val="0070C0"/>
+                    </a:solidFill>
+                  </a:rPr>
+                  <a:t>metaIdRef</a:t>
+                </a:r>
+                <a:r>
+                  <a:rPr lang="en-US" sz="900" dirty="0">
+                    <a:solidFill>
+                      <a:srgbClr val="0070C0"/>
+                    </a:solidFill>
+                  </a:rPr>
+                  <a:t>: </a:t>
+                </a:r>
+                <a:r>
+                  <a:rPr lang="en-US" sz="900" dirty="0" err="1">
+                    <a:solidFill>
+                      <a:srgbClr val="0070C0"/>
+                    </a:solidFill>
+                  </a:rPr>
+                  <a:t>MetaIdRef</a:t>
+                </a:r>
+                <a:endParaRPr lang="en-US" sz="900" dirty="0">
+                  <a:solidFill>
+                    <a:srgbClr val="0070C0"/>
+                  </a:solidFill>
+                </a:endParaRPr>
+              </a:p>
+              <a:p>
+                <a:endParaRPr lang="en-US" sz="900" dirty="0">
+                  <a:solidFill>
+                    <a:srgbClr val="0070C0"/>
+                  </a:solidFill>
+                </a:endParaRPr>
+              </a:p>
+            </p:txBody>
+          </p:sp>
+          <p:sp>
+            <p:nvSpPr>
+              <p:cNvPr id="98" name="Rectangle 97"/>
+              <p:cNvSpPr/>
+              <p:nvPr/>
+            </p:nvSpPr>
+            <p:spPr>
+              <a:xfrm>
+                <a:off x="222285" y="1807154"/>
+                <a:ext cx="437940" cy="369332"/>
+              </a:xfrm>
+              <a:prstGeom prst="rect">
+                <a:avLst/>
+              </a:prstGeom>
+              <a:ln>
+                <a:noFill/>
+              </a:ln>
+            </p:spPr>
+            <p:txBody>
+              <a:bodyPr wrap="none" lIns="91440" tIns="45720" rIns="91440" bIns="45720">
+                <a:spAutoFit/>
+              </a:bodyPr>
+              <a:lstStyle/>
+              <a:p>
+                <a:r>
+                  <a:rPr lang="en-US" sz="900" dirty="0" smtClean="0">
+                    <a:solidFill>
+                      <a:srgbClr val="0070C0"/>
+                    </a:solidFill>
+                  </a:rPr>
+                  <a:t>port</a:t>
+                </a:r>
+                <a:endParaRPr lang="en-US" sz="900" dirty="0">
+                  <a:solidFill>
+                    <a:srgbClr val="0070C0"/>
+                  </a:solidFill>
+                </a:endParaRPr>
+              </a:p>
+              <a:p>
+                <a:r>
+                  <a:rPr lang="en-US" sz="900" dirty="0">
+                    <a:solidFill>
+                      <a:srgbClr val="0070C0"/>
+                    </a:solidFill>
+                  </a:rPr>
+                  <a:t>0,…,*</a:t>
+                </a:r>
+              </a:p>
+            </p:txBody>
+          </p:sp>
+          <p:cxnSp>
+            <p:nvCxnSpPr>
+              <p:cNvPr id="99" name="Elbow Connector 98"/>
+              <p:cNvCxnSpPr>
+                <a:stCxn id="97" idx="3"/>
+                <a:endCxn id="103" idx="3"/>
+              </p:cNvCxnSpPr>
+              <p:nvPr/>
+            </p:nvCxnSpPr>
+            <p:spPr>
+              <a:xfrm flipV="1">
+                <a:off x="1908790" y="482955"/>
+                <a:ext cx="147834" cy="1794889"/>
+              </a:xfrm>
+              <a:prstGeom prst="bentConnector2">
+                <a:avLst/>
+              </a:prstGeom>
+              <a:ln w="6350">
+                <a:solidFill>
+                  <a:srgbClr val="0070C0"/>
+                </a:solidFill>
+              </a:ln>
+            </p:spPr>
+            <p:style>
+              <a:lnRef idx="1">
+                <a:schemeClr val="accent1"/>
+              </a:lnRef>
+              <a:fillRef idx="0">
+                <a:schemeClr val="accent1"/>
+              </a:fillRef>
+              <a:effectRef idx="0">
+                <a:schemeClr val="accent1"/>
+              </a:effectRef>
+              <a:fontRef idx="minor">
+                <a:schemeClr val="tx1"/>
+              </a:fontRef>
+            </p:style>
+          </p:cxnSp>
+          <p:sp>
+            <p:nvSpPr>
+              <p:cNvPr id="100" name="Rectangle 99"/>
+              <p:cNvSpPr/>
+              <p:nvPr/>
+            </p:nvSpPr>
+            <p:spPr>
+              <a:xfrm>
+                <a:off x="265170" y="1607792"/>
+                <a:ext cx="1304143" cy="216843"/>
+              </a:xfrm>
+              <a:prstGeom prst="rect">
+                <a:avLst/>
+              </a:prstGeom>
+              <a:noFill/>
+              <a:ln w="6350">
+                <a:solidFill>
+                  <a:srgbClr val="0070C0"/>
+                </a:solidFill>
+              </a:ln>
+            </p:spPr>
+            <p:style>
+              <a:lnRef idx="2">
+                <a:schemeClr val="accent1">
+                  <a:shade val="50000"/>
+                </a:schemeClr>
+              </a:lnRef>
+              <a:fillRef idx="1">
+                <a:schemeClr val="accent1"/>
+              </a:fillRef>
+              <a:effectRef idx="0">
+                <a:schemeClr val="accent1"/>
+              </a:effectRef>
+              <a:fontRef idx="minor">
+                <a:schemeClr val="lt1"/>
+              </a:fontRef>
+            </p:style>
+            <p:txBody>
+              <a:bodyPr lIns="91440" tIns="45720" rIns="91440" bIns="45720" spcCol="0" rtlCol="0" anchor="ctr"/>
+              <a:lstStyle/>
+              <a:p>
+                <a:pPr algn="ctr"/>
+                <a:r>
+                  <a:rPr lang="en-US" sz="1100" b="1" dirty="0" err="1" smtClean="0">
+                    <a:solidFill>
+                      <a:srgbClr val="0070C0"/>
+                    </a:solidFill>
+                  </a:rPr>
+                  <a:t>ListOfPorts</a:t>
+                </a:r>
+                <a:endParaRPr lang="en-US" sz="1100" b="1" dirty="0">
+                  <a:solidFill>
+                    <a:srgbClr val="0070C0"/>
+                  </a:solidFill>
+                </a:endParaRPr>
+              </a:p>
+            </p:txBody>
+          </p:sp>
+          <p:sp>
+            <p:nvSpPr>
+              <p:cNvPr id="101" name="Diamond 100"/>
+              <p:cNvSpPr/>
+              <p:nvPr/>
+            </p:nvSpPr>
+            <p:spPr>
+              <a:xfrm>
+                <a:off x="232917" y="1824637"/>
+                <a:ext cx="66869" cy="152398"/>
+              </a:xfrm>
+              <a:prstGeom prst="diamond">
+                <a:avLst/>
+              </a:prstGeom>
+              <a:solidFill>
+                <a:srgbClr val="0070C0"/>
+              </a:solidFill>
+              <a:ln w="6350">
+                <a:solidFill>
+                  <a:srgbClr val="0070C0"/>
+                </a:solidFill>
+              </a:ln>
+            </p:spPr>
+            <p:style>
+              <a:lnRef idx="2">
+                <a:schemeClr val="accent1">
+                  <a:shade val="50000"/>
+                </a:schemeClr>
+              </a:lnRef>
+              <a:fillRef idx="1">
+                <a:schemeClr val="accent1"/>
+              </a:fillRef>
+              <a:effectRef idx="0">
+                <a:schemeClr val="accent1"/>
+              </a:effectRef>
+              <a:fontRef idx="minor">
+                <a:schemeClr val="lt1"/>
+              </a:fontRef>
+            </p:style>
+            <p:txBody>
+              <a:bodyPr lIns="91440" tIns="45720" rIns="91440" bIns="45720" spcCol="0" rtlCol="0" anchor="ctr"/>
+              <a:lstStyle/>
+              <a:p>
+                <a:pPr algn="ctr"/>
+                <a:endParaRPr lang="en-US">
+                  <a:solidFill>
+                    <a:srgbClr val="0070C0"/>
                   </a:solidFill>
                 </a:endParaRPr>
               </a:p>
@@ -3865,367 +4737,21 @@
         </p:grpSp>
         <p:cxnSp>
           <p:nvCxnSpPr>
-            <p:cNvPr id="60" name="Elbow Connector 59"/>
-            <p:cNvCxnSpPr>
-              <a:stCxn id="80" idx="3"/>
-              <a:endCxn id="84" idx="3"/>
-            </p:cNvCxnSpPr>
+            <p:cNvPr id="104" name="Straight Connector 103"/>
+            <p:cNvCxnSpPr/>
             <p:nvPr/>
           </p:nvCxnSpPr>
           <p:spPr>
-            <a:xfrm flipV="1">
-              <a:off x="1756390" y="784032"/>
-              <a:ext cx="300233" cy="439705"/>
+            <a:xfrm>
+              <a:off x="691293" y="2134284"/>
+              <a:ext cx="1218221" cy="53"/>
             </a:xfrm>
-            <a:prstGeom prst="bentConnector2">
+            <a:prstGeom prst="line">
               <a:avLst/>
             </a:prstGeom>
             <a:ln w="6350">
               <a:solidFill>
                 <a:srgbClr val="0070C0"/>
-              </a:solidFill>
-            </a:ln>
-          </p:spPr>
-          <p:style>
-            <a:lnRef idx="1">
-              <a:schemeClr val="accent1"/>
-            </a:lnRef>
-            <a:fillRef idx="0">
-              <a:schemeClr val="accent1"/>
-            </a:fillRef>
-            <a:effectRef idx="0">
-              <a:schemeClr val="accent1"/>
-            </a:effectRef>
-            <a:fontRef idx="minor">
-              <a:schemeClr val="tx1"/>
-            </a:fontRef>
-          </p:style>
-        </p:cxnSp>
-        <p:sp>
-          <p:nvSpPr>
-            <p:cNvPr id="61" name="Rectangle 60"/>
-            <p:cNvSpPr/>
-            <p:nvPr/>
-          </p:nvSpPr>
-          <p:spPr>
-            <a:xfrm>
-              <a:off x="47484" y="758587"/>
-              <a:ext cx="954107" cy="369332"/>
-            </a:xfrm>
-            <a:prstGeom prst="rect">
-              <a:avLst/>
-            </a:prstGeom>
-          </p:spPr>
-          <p:txBody>
-            <a:bodyPr wrap="none" lIns="91440" tIns="45720" rIns="91440" bIns="45720">
-              <a:spAutoFit/>
-            </a:bodyPr>
-            <a:lstStyle/>
-            <a:p>
-              <a:r>
-                <a:rPr lang="en-US" sz="900" dirty="0" err="1" smtClean="0">
-                  <a:solidFill>
-                    <a:srgbClr val="00B050"/>
-                  </a:solidFill>
-                </a:rPr>
-                <a:t>listOfSubmodels</a:t>
-              </a:r>
-              <a:endParaRPr lang="en-US" sz="900" dirty="0">
-                <a:solidFill>
-                  <a:srgbClr val="00B050"/>
-                </a:solidFill>
-              </a:endParaRPr>
-            </a:p>
-            <a:p>
-              <a:r>
-                <a:rPr lang="en-US" sz="900" dirty="0">
-                  <a:solidFill>
-                    <a:srgbClr val="00B050"/>
-                  </a:solidFill>
-                </a:rPr>
-                <a:t>0,1</a:t>
-              </a:r>
-            </a:p>
-          </p:txBody>
-        </p:sp>
-        <p:sp>
-          <p:nvSpPr>
-            <p:cNvPr id="62" name="Rectangle 61"/>
-            <p:cNvSpPr/>
-            <p:nvPr/>
-          </p:nvSpPr>
-          <p:spPr>
-            <a:xfrm>
-              <a:off x="689589" y="1737519"/>
-              <a:ext cx="1219200" cy="304800"/>
-            </a:xfrm>
-            <a:prstGeom prst="rect">
-              <a:avLst/>
-            </a:prstGeom>
-            <a:noFill/>
-            <a:ln w="6350">
-              <a:solidFill>
-                <a:srgbClr val="0070C0"/>
-              </a:solidFill>
-            </a:ln>
-          </p:spPr>
-          <p:style>
-            <a:lnRef idx="2">
-              <a:schemeClr val="accent1">
-                <a:shade val="50000"/>
-              </a:schemeClr>
-            </a:lnRef>
-            <a:fillRef idx="1">
-              <a:schemeClr val="accent1"/>
-            </a:fillRef>
-            <a:effectRef idx="0">
-              <a:schemeClr val="accent1"/>
-            </a:effectRef>
-            <a:fontRef idx="minor">
-              <a:schemeClr val="lt1"/>
-            </a:fontRef>
-          </p:style>
-          <p:txBody>
-            <a:bodyPr lIns="91440" tIns="45720" rIns="91440" bIns="45720" spcCol="0" rtlCol="0" anchor="ctr"/>
-            <a:lstStyle/>
-            <a:p>
-              <a:pPr algn="ctr"/>
-              <a:r>
-                <a:rPr lang="en-US" sz="1100" b="1" dirty="0" smtClean="0">
-                  <a:solidFill>
-                    <a:srgbClr val="0070C0"/>
-                  </a:solidFill>
-                </a:rPr>
-                <a:t>Submodel</a:t>
-              </a:r>
-              <a:endParaRPr lang="en-US" sz="1100" b="1" dirty="0">
-                <a:solidFill>
-                  <a:srgbClr val="0070C0"/>
-                </a:solidFill>
-              </a:endParaRPr>
-            </a:p>
-          </p:txBody>
-        </p:sp>
-        <p:sp>
-          <p:nvSpPr>
-            <p:cNvPr id="63" name="Rectangle 62"/>
-            <p:cNvSpPr/>
-            <p:nvPr/>
-          </p:nvSpPr>
-          <p:spPr>
-            <a:xfrm>
-              <a:off x="214127" y="1470970"/>
-              <a:ext cx="651140" cy="369332"/>
-            </a:xfrm>
-            <a:prstGeom prst="rect">
-              <a:avLst/>
-            </a:prstGeom>
-            <a:ln>
-              <a:noFill/>
-            </a:ln>
-          </p:spPr>
-          <p:txBody>
-            <a:bodyPr wrap="none" lIns="91440" tIns="45720" rIns="91440" bIns="45720">
-              <a:spAutoFit/>
-            </a:bodyPr>
-            <a:lstStyle/>
-            <a:p>
-              <a:r>
-                <a:rPr lang="en-US" sz="900" dirty="0" smtClean="0">
-                  <a:solidFill>
-                    <a:srgbClr val="0070C0"/>
-                  </a:solidFill>
-                </a:rPr>
-                <a:t>submodel</a:t>
-              </a:r>
-              <a:endParaRPr lang="en-US" sz="900" dirty="0">
-                <a:solidFill>
-                  <a:srgbClr val="0070C0"/>
-                </a:solidFill>
-              </a:endParaRPr>
-            </a:p>
-            <a:p>
-              <a:r>
-                <a:rPr lang="en-US" sz="900" dirty="0">
-                  <a:solidFill>
-                    <a:srgbClr val="0070C0"/>
-                  </a:solidFill>
-                </a:rPr>
-                <a:t>0,…,*</a:t>
-              </a:r>
-            </a:p>
-          </p:txBody>
-        </p:sp>
-        <p:cxnSp>
-          <p:nvCxnSpPr>
-            <p:cNvPr id="64" name="Elbow Connector 63"/>
-            <p:cNvCxnSpPr>
-              <a:stCxn id="62" idx="3"/>
-              <a:endCxn id="84" idx="3"/>
-            </p:cNvCxnSpPr>
-            <p:nvPr/>
-          </p:nvCxnSpPr>
-          <p:spPr>
-            <a:xfrm flipV="1">
-              <a:off x="1908789" y="784032"/>
-              <a:ext cx="147834" cy="1105887"/>
-            </a:xfrm>
-            <a:prstGeom prst="bentConnector2">
-              <a:avLst/>
-            </a:prstGeom>
-            <a:ln w="6350">
-              <a:solidFill>
-                <a:srgbClr val="0070C0"/>
-              </a:solidFill>
-            </a:ln>
-          </p:spPr>
-          <p:style>
-            <a:lnRef idx="1">
-              <a:schemeClr val="accent1"/>
-            </a:lnRef>
-            <a:fillRef idx="0">
-              <a:schemeClr val="accent1"/>
-            </a:fillRef>
-            <a:effectRef idx="0">
-              <a:schemeClr val="accent1"/>
-            </a:effectRef>
-            <a:fontRef idx="minor">
-              <a:schemeClr val="tx1"/>
-            </a:fontRef>
-          </p:style>
-        </p:cxnSp>
-        <p:sp>
-          <p:nvSpPr>
-            <p:cNvPr id="80" name="Rectangle 79"/>
-            <p:cNvSpPr/>
-            <p:nvPr/>
-          </p:nvSpPr>
-          <p:spPr>
-            <a:xfrm>
-              <a:off x="252730" y="1071337"/>
-              <a:ext cx="1503660" cy="304800"/>
-            </a:xfrm>
-            <a:prstGeom prst="rect">
-              <a:avLst/>
-            </a:prstGeom>
-            <a:noFill/>
-            <a:ln w="6350">
-              <a:solidFill>
-                <a:srgbClr val="0070C0"/>
-              </a:solidFill>
-            </a:ln>
-          </p:spPr>
-          <p:style>
-            <a:lnRef idx="2">
-              <a:schemeClr val="accent1">
-                <a:shade val="50000"/>
-              </a:schemeClr>
-            </a:lnRef>
-            <a:fillRef idx="1">
-              <a:schemeClr val="accent1"/>
-            </a:fillRef>
-            <a:effectRef idx="0">
-              <a:schemeClr val="accent1"/>
-            </a:effectRef>
-            <a:fontRef idx="minor">
-              <a:schemeClr val="lt1"/>
-            </a:fontRef>
-          </p:style>
-          <p:txBody>
-            <a:bodyPr lIns="91440" tIns="45720" rIns="91440" bIns="45720" spcCol="0" rtlCol="0" anchor="ctr"/>
-            <a:lstStyle/>
-            <a:p>
-              <a:pPr algn="ctr"/>
-              <a:r>
-                <a:rPr lang="en-US" sz="1100" b="1" dirty="0" err="1" smtClean="0">
-                  <a:solidFill>
-                    <a:srgbClr val="0070C0"/>
-                  </a:solidFill>
-                </a:rPr>
-                <a:t>ListOfSubmodels</a:t>
-              </a:r>
-              <a:endParaRPr lang="en-US" sz="1100" b="1" dirty="0">
-                <a:solidFill>
-                  <a:srgbClr val="0070C0"/>
-                </a:solidFill>
-              </a:endParaRPr>
-            </a:p>
-          </p:txBody>
-        </p:sp>
-        <p:sp>
-          <p:nvSpPr>
-            <p:cNvPr id="81" name="Diamond 80"/>
-            <p:cNvSpPr/>
-            <p:nvPr/>
-          </p:nvSpPr>
-          <p:spPr>
-            <a:xfrm>
-              <a:off x="222922" y="1374314"/>
-              <a:ext cx="66869" cy="152398"/>
-            </a:xfrm>
-            <a:prstGeom prst="diamond">
-              <a:avLst/>
-            </a:prstGeom>
-            <a:solidFill>
-              <a:srgbClr val="0070C0"/>
-            </a:solidFill>
-            <a:ln w="6350">
-              <a:solidFill>
-                <a:srgbClr val="0070C0"/>
-              </a:solidFill>
-            </a:ln>
-          </p:spPr>
-          <p:style>
-            <a:lnRef idx="2">
-              <a:schemeClr val="accent1">
-                <a:shade val="50000"/>
-              </a:schemeClr>
-            </a:lnRef>
-            <a:fillRef idx="1">
-              <a:schemeClr val="accent1"/>
-            </a:fillRef>
-            <a:effectRef idx="0">
-              <a:schemeClr val="accent1"/>
-            </a:effectRef>
-            <a:fontRef idx="minor">
-              <a:schemeClr val="lt1"/>
-            </a:fontRef>
-          </p:style>
-          <p:txBody>
-            <a:bodyPr lIns="91440" tIns="45720" rIns="91440" bIns="45720" spcCol="0" rtlCol="0" anchor="ctr"/>
-            <a:lstStyle/>
-            <a:p>
-              <a:pPr algn="ctr"/>
-              <a:endParaRPr lang="en-US">
-                <a:solidFill>
-                  <a:srgbClr val="0070C0"/>
-                </a:solidFill>
-              </a:endParaRPr>
-            </a:p>
-          </p:txBody>
-        </p:sp>
-        <p:cxnSp>
-          <p:nvCxnSpPr>
-            <p:cNvPr id="82" name="Elbow Connector 81"/>
-            <p:cNvCxnSpPr>
-              <a:stCxn id="55" idx="2"/>
-              <a:endCxn id="84" idx="3"/>
-            </p:cNvCxnSpPr>
-            <p:nvPr/>
-          </p:nvCxnSpPr>
-          <p:spPr>
-            <a:xfrm rot="16200000" flipH="1">
-              <a:off x="1405344" y="132753"/>
-              <a:ext cx="115800" cy="1186758"/>
-            </a:xfrm>
-            <a:prstGeom prst="bentConnector3">
-              <a:avLst>
-                <a:gd name="adj1" fmla="val 137544"/>
-              </a:avLst>
-            </a:prstGeom>
-            <a:ln w="6350">
-              <a:solidFill>
-                <a:schemeClr val="tx1"/>
               </a:solidFill>
             </a:ln>
           </p:spPr>

</xml_diff>

<commit_message>
Added several validation rules to the end of the spec.  Slight changes here and there--it turns out that the MetaIdRef type is actually type IDREF, for example, and I changed the PortId type to PortSId to match UnitSId.
</commit_message>
<xml_diff>
--- a/sbml-level-3/version-1/comp/HierarchicalModel.pptx
+++ b/sbml-level-3/version-1/comp/HierarchicalModel.pptx
@@ -10,7 +10,7 @@
   <p:sldIdLst>
     <p:sldId id="257" r:id="rId2"/>
   </p:sldIdLst>
-  <p:sldSz cx="2378075" cy="2560638"/>
+  <p:sldSz cx="2468563" cy="2560638"/>
   <p:notesSz cx="6858000" cy="9144000"/>
   <p:defaultTextStyle>
     <a:defPPr>
@@ -192,7 +192,7 @@
           <a:p>
             <a:fld id="{7754A941-C6C2-4027-B1F4-A5E937B2245F}" type="datetimeFigureOut">
               <a:rPr lang="en-US" smtClean="0"/>
-              <a:t>4/27/2011</a:t>
+              <a:t>5/10/2011</a:t>
             </a:fld>
             <a:endParaRPr lang="en-US"/>
           </a:p>
@@ -210,8 +210,8 @@
         </p:nvSpPr>
         <p:spPr>
           <a:xfrm>
-            <a:off x="1836738" y="685800"/>
-            <a:ext cx="3184525" cy="3429000"/>
+            <a:off x="1776413" y="685800"/>
+            <a:ext cx="3305175" cy="3429000"/>
           </a:xfrm>
           <a:prstGeom prst="rect">
             <a:avLst/>
@@ -489,8 +489,8 @@
         </p:nvSpPr>
         <p:spPr>
           <a:xfrm>
-            <a:off x="1836738" y="685800"/>
-            <a:ext cx="3184525" cy="3429000"/>
+            <a:off x="1776413" y="685800"/>
+            <a:ext cx="3305175" cy="3429000"/>
           </a:xfrm>
         </p:spPr>
       </p:sp>
@@ -578,8 +578,8 @@
         </p:nvSpPr>
         <p:spPr>
           <a:xfrm>
-            <a:off x="178369" y="795467"/>
-            <a:ext cx="2021363" cy="548879"/>
+            <a:off x="185157" y="795468"/>
+            <a:ext cx="2098278" cy="548879"/>
           </a:xfrm>
         </p:spPr>
         <p:txBody>
@@ -606,8 +606,8 @@
         </p:nvSpPr>
         <p:spPr>
           <a:xfrm>
-            <a:off x="356726" y="1451038"/>
-            <a:ext cx="1664653" cy="654384"/>
+            <a:off x="370300" y="1451038"/>
+            <a:ext cx="1727995" cy="654384"/>
           </a:xfrm>
         </p:spPr>
         <p:txBody>
@@ -730,7 +730,7 @@
           <a:p>
             <a:fld id="{F0172217-DC24-48CD-AE89-68C8C8D878B4}" type="datetimeFigureOut">
               <a:rPr lang="en-US" smtClean="0"/>
-              <a:t>4/27/2011</a:t>
+              <a:t>5/10/2011</a:t>
             </a:fld>
             <a:endParaRPr lang="en-US"/>
           </a:p>
@@ -900,7 +900,7 @@
           <a:p>
             <a:fld id="{F0172217-DC24-48CD-AE89-68C8C8D878B4}" type="datetimeFigureOut">
               <a:rPr lang="en-US" smtClean="0"/>
-              <a:t>4/27/2011</a:t>
+              <a:t>5/10/2011</a:t>
             </a:fld>
             <a:endParaRPr lang="en-US"/>
           </a:p>
@@ -990,8 +990,8 @@
         </p:nvSpPr>
         <p:spPr>
           <a:xfrm>
-            <a:off x="1724111" y="102548"/>
-            <a:ext cx="535067" cy="2184843"/>
+            <a:off x="1789715" y="102549"/>
+            <a:ext cx="555427" cy="2184843"/>
           </a:xfrm>
         </p:spPr>
         <p:txBody>
@@ -1018,8 +1018,8 @@
         </p:nvSpPr>
         <p:spPr>
           <a:xfrm>
-            <a:off x="118905" y="102548"/>
-            <a:ext cx="1565566" cy="2184843"/>
+            <a:off x="123430" y="102549"/>
+            <a:ext cx="1625137" cy="2184843"/>
           </a:xfrm>
         </p:spPr>
         <p:txBody>
@@ -1080,7 +1080,7 @@
           <a:p>
             <a:fld id="{F0172217-DC24-48CD-AE89-68C8C8D878B4}" type="datetimeFigureOut">
               <a:rPr lang="en-US" smtClean="0"/>
-              <a:t>4/27/2011</a:t>
+              <a:t>5/10/2011</a:t>
             </a:fld>
             <a:endParaRPr lang="en-US"/>
           </a:p>
@@ -1250,7 +1250,7 @@
           <a:p>
             <a:fld id="{F0172217-DC24-48CD-AE89-68C8C8D878B4}" type="datetimeFigureOut">
               <a:rPr lang="en-US" smtClean="0"/>
-              <a:t>4/27/2011</a:t>
+              <a:t>5/10/2011</a:t>
             </a:fld>
             <a:endParaRPr lang="en-US"/>
           </a:p>
@@ -1340,8 +1340,8 @@
         </p:nvSpPr>
         <p:spPr>
           <a:xfrm>
-            <a:off x="187858" y="1645455"/>
-            <a:ext cx="2021363" cy="508571"/>
+            <a:off x="195007" y="1645456"/>
+            <a:ext cx="2098278" cy="508571"/>
           </a:xfrm>
         </p:spPr>
         <p:txBody>
@@ -1372,8 +1372,8 @@
         </p:nvSpPr>
         <p:spPr>
           <a:xfrm>
-            <a:off x="187858" y="1085315"/>
-            <a:ext cx="2021363" cy="560141"/>
+            <a:off x="195007" y="1085316"/>
+            <a:ext cx="2098278" cy="560141"/>
           </a:xfrm>
         </p:spPr>
         <p:txBody>
@@ -1496,7 +1496,7 @@
           <a:p>
             <a:fld id="{F0172217-DC24-48CD-AE89-68C8C8D878B4}" type="datetimeFigureOut">
               <a:rPr lang="en-US" smtClean="0"/>
-              <a:t>4/27/2011</a:t>
+              <a:t>5/10/2011</a:t>
             </a:fld>
             <a:endParaRPr lang="en-US"/>
           </a:p>
@@ -1609,8 +1609,8 @@
         </p:nvSpPr>
         <p:spPr>
           <a:xfrm>
-            <a:off x="118906" y="597492"/>
-            <a:ext cx="1050316" cy="1689902"/>
+            <a:off x="123430" y="597492"/>
+            <a:ext cx="1090282" cy="1689902"/>
           </a:xfrm>
         </p:spPr>
         <p:txBody>
@@ -1694,8 +1694,8 @@
         </p:nvSpPr>
         <p:spPr>
           <a:xfrm>
-            <a:off x="1208856" y="597492"/>
-            <a:ext cx="1050316" cy="1689902"/>
+            <a:off x="1254854" y="597492"/>
+            <a:ext cx="1090282" cy="1689902"/>
           </a:xfrm>
         </p:spPr>
         <p:txBody>
@@ -1784,7 +1784,7 @@
           <a:p>
             <a:fld id="{F0172217-DC24-48CD-AE89-68C8C8D878B4}" type="datetimeFigureOut">
               <a:rPr lang="en-US" smtClean="0"/>
-              <a:t>4/27/2011</a:t>
+              <a:t>5/10/2011</a:t>
             </a:fld>
             <a:endParaRPr lang="en-US"/>
           </a:p>
@@ -1901,8 +1901,8 @@
         </p:nvSpPr>
         <p:spPr>
           <a:xfrm>
-            <a:off x="118923" y="573189"/>
-            <a:ext cx="1050729" cy="238875"/>
+            <a:off x="123449" y="573189"/>
+            <a:ext cx="1090710" cy="238875"/>
           </a:xfrm>
         </p:spPr>
         <p:txBody>
@@ -1966,8 +1966,8 @@
         </p:nvSpPr>
         <p:spPr>
           <a:xfrm>
-            <a:off x="118923" y="812062"/>
-            <a:ext cx="1050729" cy="1475330"/>
+            <a:off x="123449" y="812062"/>
+            <a:ext cx="1090710" cy="1475330"/>
           </a:xfrm>
         </p:spPr>
         <p:txBody>
@@ -2051,8 +2051,8 @@
         </p:nvSpPr>
         <p:spPr>
           <a:xfrm>
-            <a:off x="1208038" y="573189"/>
-            <a:ext cx="1051143" cy="238875"/>
+            <a:off x="1254005" y="573189"/>
+            <a:ext cx="1091140" cy="238875"/>
           </a:xfrm>
         </p:spPr>
         <p:txBody>
@@ -2116,8 +2116,8 @@
         </p:nvSpPr>
         <p:spPr>
           <a:xfrm>
-            <a:off x="1208038" y="812062"/>
-            <a:ext cx="1051143" cy="1475330"/>
+            <a:off x="1254005" y="812062"/>
+            <a:ext cx="1091140" cy="1475330"/>
           </a:xfrm>
         </p:spPr>
         <p:txBody>
@@ -2206,7 +2206,7 @@
           <a:p>
             <a:fld id="{F0172217-DC24-48CD-AE89-68C8C8D878B4}" type="datetimeFigureOut">
               <a:rPr lang="en-US" smtClean="0"/>
-              <a:t>4/27/2011</a:t>
+              <a:t>5/10/2011</a:t>
             </a:fld>
             <a:endParaRPr lang="en-US"/>
           </a:p>
@@ -2324,7 +2324,7 @@
           <a:p>
             <a:fld id="{F0172217-DC24-48CD-AE89-68C8C8D878B4}" type="datetimeFigureOut">
               <a:rPr lang="en-US" smtClean="0"/>
-              <a:t>4/27/2011</a:t>
+              <a:t>5/10/2011</a:t>
             </a:fld>
             <a:endParaRPr lang="en-US"/>
           </a:p>
@@ -2419,7 +2419,7 @@
           <a:p>
             <a:fld id="{F0172217-DC24-48CD-AE89-68C8C8D878B4}" type="datetimeFigureOut">
               <a:rPr lang="en-US" smtClean="0"/>
-              <a:t>4/27/2011</a:t>
+              <a:t>5/10/2011</a:t>
             </a:fld>
             <a:endParaRPr lang="en-US"/>
           </a:p>
@@ -2509,8 +2509,8 @@
         </p:nvSpPr>
         <p:spPr>
           <a:xfrm>
-            <a:off x="118922" y="101954"/>
-            <a:ext cx="782369" cy="433886"/>
+            <a:off x="123448" y="101954"/>
+            <a:ext cx="812139" cy="433886"/>
           </a:xfrm>
         </p:spPr>
         <p:txBody>
@@ -2541,8 +2541,8 @@
         </p:nvSpPr>
         <p:spPr>
           <a:xfrm>
-            <a:off x="929766" y="101966"/>
-            <a:ext cx="1329410" cy="2185434"/>
+            <a:off x="965145" y="101966"/>
+            <a:ext cx="1379995" cy="2185434"/>
           </a:xfrm>
         </p:spPr>
         <p:txBody>
@@ -2626,8 +2626,8 @@
         </p:nvSpPr>
         <p:spPr>
           <a:xfrm>
-            <a:off x="118922" y="535849"/>
-            <a:ext cx="782369" cy="1751549"/>
+            <a:off x="123448" y="535849"/>
+            <a:ext cx="812139" cy="1751549"/>
           </a:xfrm>
         </p:spPr>
         <p:txBody>
@@ -2696,7 +2696,7 @@
           <a:p>
             <a:fld id="{F0172217-DC24-48CD-AE89-68C8C8D878B4}" type="datetimeFigureOut">
               <a:rPr lang="en-US" smtClean="0"/>
-              <a:t>4/27/2011</a:t>
+              <a:t>5/10/2011</a:t>
             </a:fld>
             <a:endParaRPr lang="en-US"/>
           </a:p>
@@ -2786,8 +2786,8 @@
         </p:nvSpPr>
         <p:spPr>
           <a:xfrm>
-            <a:off x="466134" y="1792459"/>
-            <a:ext cx="1426845" cy="211607"/>
+            <a:off x="483871" y="1792460"/>
+            <a:ext cx="1481138" cy="211607"/>
           </a:xfrm>
         </p:spPr>
         <p:txBody>
@@ -2818,8 +2818,8 @@
         </p:nvSpPr>
         <p:spPr>
           <a:xfrm>
-            <a:off x="466134" y="228809"/>
-            <a:ext cx="1426845" cy="1536383"/>
+            <a:off x="483871" y="228810"/>
+            <a:ext cx="1481138" cy="1536383"/>
           </a:xfrm>
         </p:spPr>
         <p:txBody>
@@ -2879,8 +2879,8 @@
         </p:nvSpPr>
         <p:spPr>
           <a:xfrm>
-            <a:off x="466134" y="2004073"/>
-            <a:ext cx="1426845" cy="300518"/>
+            <a:off x="483871" y="2004073"/>
+            <a:ext cx="1481138" cy="300518"/>
           </a:xfrm>
         </p:spPr>
         <p:txBody>
@@ -2949,7 +2949,7 @@
           <a:p>
             <a:fld id="{F0172217-DC24-48CD-AE89-68C8C8D878B4}" type="datetimeFigureOut">
               <a:rPr lang="en-US" smtClean="0"/>
-              <a:t>4/27/2011</a:t>
+              <a:t>5/10/2011</a:t>
             </a:fld>
             <a:endParaRPr lang="en-US"/>
           </a:p>
@@ -3044,8 +3044,8 @@
         </p:nvSpPr>
         <p:spPr>
           <a:xfrm>
-            <a:off x="118915" y="102554"/>
-            <a:ext cx="2140267" cy="426773"/>
+            <a:off x="123440" y="102555"/>
+            <a:ext cx="2221706" cy="426773"/>
           </a:xfrm>
           <a:prstGeom prst="rect">
             <a:avLst/>
@@ -3077,8 +3077,8 @@
         </p:nvSpPr>
         <p:spPr>
           <a:xfrm>
-            <a:off x="118915" y="597492"/>
-            <a:ext cx="2140267" cy="1689902"/>
+            <a:off x="123440" y="597492"/>
+            <a:ext cx="2221706" cy="1689902"/>
           </a:xfrm>
           <a:prstGeom prst="rect">
             <a:avLst/>
@@ -3139,8 +3139,8 @@
         </p:nvSpPr>
         <p:spPr>
           <a:xfrm>
-            <a:off x="118904" y="2373351"/>
-            <a:ext cx="554884" cy="136330"/>
+            <a:off x="123428" y="2373351"/>
+            <a:ext cx="575998" cy="136330"/>
           </a:xfrm>
           <a:prstGeom prst="rect">
             <a:avLst/>
@@ -3162,7 +3162,7 @@
           <a:p>
             <a:fld id="{F0172217-DC24-48CD-AE89-68C8C8D878B4}" type="datetimeFigureOut">
               <a:rPr lang="en-US" smtClean="0"/>
-              <a:t>4/27/2011</a:t>
+              <a:t>5/10/2011</a:t>
             </a:fld>
             <a:endParaRPr lang="en-US"/>
           </a:p>
@@ -3180,8 +3180,8 @@
         </p:nvSpPr>
         <p:spPr>
           <a:xfrm>
-            <a:off x="812524" y="2373351"/>
-            <a:ext cx="753057" cy="136330"/>
+            <a:off x="843442" y="2373351"/>
+            <a:ext cx="781712" cy="136330"/>
           </a:xfrm>
           <a:prstGeom prst="rect">
             <a:avLst/>
@@ -3217,8 +3217,8 @@
         </p:nvSpPr>
         <p:spPr>
           <a:xfrm>
-            <a:off x="1704287" y="2373351"/>
-            <a:ext cx="554884" cy="136330"/>
+            <a:off x="1769137" y="2373351"/>
+            <a:ext cx="575998" cy="136330"/>
           </a:xfrm>
           <a:prstGeom prst="rect">
             <a:avLst/>
@@ -3539,249 +3539,56 @@
       </p:grpSpPr>
       <p:grpSp>
         <p:nvGrpSpPr>
-          <p:cNvPr id="4" name="Group 3"/>
+          <p:cNvPr id="47" name="Group 46"/>
           <p:cNvGrpSpPr/>
           <p:nvPr/>
         </p:nvGrpSpPr>
         <p:grpSpPr>
           <a:xfrm>
-            <a:off x="46761" y="54355"/>
-            <a:ext cx="2284553" cy="2451928"/>
-            <a:chOff x="46761" y="16633"/>
-            <a:chExt cx="2284553" cy="2451928"/>
+            <a:off x="45073" y="54355"/>
+            <a:ext cx="2378416" cy="2451928"/>
+            <a:chOff x="46761" y="54355"/>
+            <a:chExt cx="2378416" cy="2451928"/>
           </a:xfrm>
         </p:grpSpPr>
         <p:grpSp>
           <p:nvGrpSpPr>
-            <p:cNvPr id="79" name="Group 78"/>
+            <p:cNvPr id="48" name="Group 47"/>
             <p:cNvGrpSpPr/>
             <p:nvPr/>
           </p:nvGrpSpPr>
           <p:grpSpPr>
             <a:xfrm>
-              <a:off x="46761" y="16633"/>
+              <a:off x="46761" y="54355"/>
               <a:ext cx="2284553" cy="2451928"/>
-              <a:chOff x="46037" y="87559"/>
+              <a:chOff x="46761" y="16633"/>
               <a:chExt cx="2284553" cy="2451928"/>
             </a:xfrm>
           </p:grpSpPr>
-          <p:sp>
-            <p:nvSpPr>
-              <p:cNvPr id="80" name="Rectangle 79"/>
-              <p:cNvSpPr/>
-              <p:nvPr/>
-            </p:nvSpPr>
-            <p:spPr>
-              <a:xfrm>
-                <a:off x="118766" y="87559"/>
-                <a:ext cx="1502199" cy="279596"/>
-              </a:xfrm>
-              <a:prstGeom prst="rect">
-                <a:avLst/>
-              </a:prstGeom>
-              <a:noFill/>
-              <a:ln w="6350">
-                <a:solidFill>
-                  <a:schemeClr val="tx1"/>
-                </a:solidFill>
-              </a:ln>
-            </p:spPr>
-            <p:style>
-              <a:lnRef idx="2">
-                <a:schemeClr val="accent1">
-                  <a:shade val="50000"/>
-                </a:schemeClr>
-              </a:lnRef>
-              <a:fillRef idx="1">
-                <a:schemeClr val="accent1"/>
-              </a:fillRef>
-              <a:effectRef idx="0">
-                <a:schemeClr val="accent1"/>
-              </a:effectRef>
-              <a:fontRef idx="minor">
-                <a:schemeClr val="lt1"/>
-              </a:fontRef>
-            </p:style>
-            <p:txBody>
-              <a:bodyPr rtlCol="0" anchor="t"/>
-              <a:lstStyle/>
-              <a:p>
-                <a:pPr algn="ctr"/>
-                <a:r>
-                  <a:rPr lang="en-US" sz="1100" b="1" dirty="0" smtClean="0">
-                    <a:solidFill>
-                      <a:schemeClr val="tx1"/>
-                    </a:solidFill>
-                  </a:rPr>
-                  <a:t>Model </a:t>
-                </a:r>
-                <a:r>
-                  <a:rPr lang="en-US" sz="900" b="1" i="1" dirty="0" smtClean="0">
-                    <a:solidFill>
-                      <a:srgbClr val="00B050"/>
-                    </a:solidFill>
-                  </a:rPr>
-                  <a:t>(extended)</a:t>
-                </a:r>
-                <a:endParaRPr lang="en-US" sz="600" i="1" dirty="0">
-                  <a:solidFill>
-                    <a:srgbClr val="00B050"/>
-                  </a:solidFill>
-                </a:endParaRPr>
-              </a:p>
-            </p:txBody>
-          </p:sp>
-          <p:sp>
-            <p:nvSpPr>
-              <p:cNvPr id="81" name="Diamond 80"/>
-              <p:cNvSpPr/>
-              <p:nvPr/>
-            </p:nvSpPr>
-            <p:spPr>
-              <a:xfrm>
-                <a:off x="86218" y="368656"/>
-                <a:ext cx="66869" cy="152398"/>
-              </a:xfrm>
-              <a:prstGeom prst="diamond">
-                <a:avLst/>
-              </a:prstGeom>
-              <a:solidFill>
-                <a:srgbClr val="00B050"/>
-              </a:solidFill>
-              <a:ln w="6350">
-                <a:solidFill>
-                  <a:srgbClr val="00B050"/>
-                </a:solidFill>
-              </a:ln>
-            </p:spPr>
-            <p:style>
-              <a:lnRef idx="2">
-                <a:schemeClr val="accent1">
-                  <a:shade val="50000"/>
-                </a:schemeClr>
-              </a:lnRef>
-              <a:fillRef idx="1">
-                <a:schemeClr val="accent1"/>
-              </a:fillRef>
-              <a:effectRef idx="0">
-                <a:schemeClr val="accent1"/>
-              </a:effectRef>
-              <a:fontRef idx="minor">
-                <a:schemeClr val="lt1"/>
-              </a:fontRef>
-            </p:style>
-            <p:txBody>
-              <a:bodyPr lIns="91440" tIns="45720" rIns="91440" bIns="45720" spcCol="0" rtlCol="0" anchor="ctr"/>
-              <a:lstStyle/>
-              <a:p>
-                <a:pPr algn="ctr"/>
-                <a:endParaRPr lang="en-US"/>
-              </a:p>
-            </p:txBody>
-          </p:sp>
-          <p:cxnSp>
-            <p:nvCxnSpPr>
-              <p:cNvPr id="82" name="Elbow Connector 81"/>
-              <p:cNvCxnSpPr>
-                <a:stCxn id="91" idx="2"/>
-                <a:endCxn id="87" idx="0"/>
-              </p:cNvCxnSpPr>
-              <p:nvPr/>
-            </p:nvCxnSpPr>
-            <p:spPr>
-              <a:xfrm rot="16200000" flipH="1">
-                <a:off x="747775" y="659919"/>
-                <a:ext cx="59998" cy="1042832"/>
-              </a:xfrm>
-              <a:prstGeom prst="bentConnector3">
-                <a:avLst>
-                  <a:gd name="adj1" fmla="val 50000"/>
-                </a:avLst>
-              </a:prstGeom>
-              <a:ln w="6350">
-                <a:solidFill>
-                  <a:srgbClr val="0070C0"/>
-                </a:solidFill>
-              </a:ln>
-            </p:spPr>
-            <p:style>
-              <a:lnRef idx="1">
-                <a:schemeClr val="accent1"/>
-              </a:lnRef>
-              <a:fillRef idx="0">
-                <a:schemeClr val="accent1"/>
-              </a:fillRef>
-              <a:effectRef idx="0">
-                <a:schemeClr val="accent1"/>
-              </a:effectRef>
-              <a:fontRef idx="minor">
-                <a:schemeClr val="tx1"/>
-              </a:fontRef>
-            </p:style>
-          </p:cxnSp>
-          <p:cxnSp>
-            <p:nvCxnSpPr>
-              <p:cNvPr id="83" name="Elbow Connector 82"/>
-              <p:cNvCxnSpPr>
-                <a:stCxn id="81" idx="2"/>
-              </p:cNvCxnSpPr>
-              <p:nvPr/>
-            </p:nvCxnSpPr>
-            <p:spPr>
-              <a:xfrm rot="16200000" flipH="1">
-                <a:off x="387625" y="253082"/>
-                <a:ext cx="249206" cy="785150"/>
-              </a:xfrm>
-              <a:prstGeom prst="bentConnector3">
-                <a:avLst>
-                  <a:gd name="adj1" fmla="val 50000"/>
-                </a:avLst>
-              </a:prstGeom>
-              <a:ln w="6350">
-                <a:solidFill>
-                  <a:srgbClr val="00B050"/>
-                </a:solidFill>
-              </a:ln>
-            </p:spPr>
-            <p:style>
-              <a:lnRef idx="1">
-                <a:schemeClr val="accent1"/>
-              </a:lnRef>
-              <a:fillRef idx="0">
-                <a:schemeClr val="accent1"/>
-              </a:fillRef>
-              <a:effectRef idx="0">
-                <a:schemeClr val="accent1"/>
-              </a:effectRef>
-              <a:fontRef idx="minor">
-                <a:schemeClr val="tx1"/>
-              </a:fontRef>
-            </p:style>
-          </p:cxnSp>
           <p:grpSp>
             <p:nvGrpSpPr>
-              <p:cNvPr id="84" name="Group 83"/>
+              <p:cNvPr id="52" name="Group 51"/>
               <p:cNvGrpSpPr/>
               <p:nvPr/>
             </p:nvGrpSpPr>
             <p:grpSpPr>
               <a:xfrm>
-                <a:off x="1748421" y="87559"/>
-                <a:ext cx="582169" cy="395396"/>
-                <a:chOff x="1585454" y="260276"/>
-                <a:chExt cx="582169" cy="395396"/>
+                <a:off x="46761" y="16633"/>
+                <a:ext cx="2284553" cy="2451928"/>
+                <a:chOff x="46037" y="87559"/>
+                <a:chExt cx="2284553" cy="2451928"/>
               </a:xfrm>
             </p:grpSpPr>
             <p:sp>
               <p:nvSpPr>
-                <p:cNvPr id="102" name="Rectangle 101"/>
+                <p:cNvPr id="54" name="Rectangle 53"/>
                 <p:cNvSpPr/>
                 <p:nvPr/>
               </p:nvSpPr>
               <p:spPr>
                 <a:xfrm>
-                  <a:off x="1585454" y="260276"/>
-                  <a:ext cx="582169" cy="281097"/>
+                  <a:off x="118766" y="87559"/>
+                  <a:ext cx="1502199" cy="279596"/>
                 </a:xfrm>
                 <a:prstGeom prst="rect">
                   <a:avLst/>
@@ -3810,39 +3617,54 @@
                 </a:fontRef>
               </p:style>
               <p:txBody>
-                <a:bodyPr lIns="91440" tIns="45720" rIns="91440" bIns="45720" spcCol="0" rtlCol="0" anchor="ctr"/>
+                <a:bodyPr rtlCol="0" anchor="t"/>
                 <a:lstStyle/>
                 <a:p>
                   <a:pPr algn="ctr"/>
                   <a:r>
-                    <a:rPr lang="en-US" sz="1100" b="1" dirty="0">
+                    <a:rPr lang="en-US" sz="1100" b="1" dirty="0" smtClean="0">
                       <a:solidFill>
                         <a:schemeClr val="tx1"/>
                       </a:solidFill>
                     </a:rPr>
-                    <a:t>SBase</a:t>
+                    <a:t>Model </a:t>
                   </a:r>
+                  <a:r>
+                    <a:rPr lang="en-US" sz="900" b="1" i="1" dirty="0" smtClean="0">
+                      <a:solidFill>
+                        <a:srgbClr val="00B050"/>
+                      </a:solidFill>
+                    </a:rPr>
+                    <a:t>(extended)</a:t>
+                  </a:r>
+                  <a:endParaRPr lang="en-US" sz="600" i="1" dirty="0">
+                    <a:solidFill>
+                      <a:srgbClr val="00B050"/>
+                    </a:solidFill>
+                  </a:endParaRPr>
                 </a:p>
               </p:txBody>
             </p:sp>
             <p:sp>
               <p:nvSpPr>
-                <p:cNvPr id="103" name="Isosceles Triangle 102"/>
+                <p:cNvPr id="55" name="Diamond 54"/>
                 <p:cNvSpPr/>
                 <p:nvPr/>
               </p:nvSpPr>
               <p:spPr>
                 <a:xfrm>
-                  <a:off x="1814057" y="541372"/>
-                  <a:ext cx="159199" cy="114300"/>
+                  <a:off x="86218" y="368656"/>
+                  <a:ext cx="66869" cy="152398"/>
                 </a:xfrm>
-                <a:prstGeom prst="triangle">
+                <a:prstGeom prst="diamond">
                   <a:avLst/>
                 </a:prstGeom>
-                <a:noFill/>
+                <a:solidFill>
+                  <a:srgbClr val="00B050"/>
+                </a:solidFill>
                 <a:ln w="6350">
                   <a:solidFill>
-                    <a:schemeClr val="tx1"/>
+                    <a:srgbClr val="00B050"/>
                   </a:solidFill>
                 </a:ln>
               </p:spPr>
@@ -3867,9 +3689,1022 @@
                 <a:lstStyle/>
                 <a:p>
                   <a:pPr algn="ctr"/>
+                  <a:endParaRPr lang="en-US"/>
+                </a:p>
+              </p:txBody>
+            </p:sp>
+            <p:cxnSp>
+              <p:nvCxnSpPr>
+                <p:cNvPr id="56" name="Elbow Connector 55"/>
+                <p:cNvCxnSpPr>
+                  <a:stCxn id="65" idx="2"/>
+                  <a:endCxn id="61" idx="0"/>
+                </p:cNvCxnSpPr>
+                <p:nvPr/>
+              </p:nvCxnSpPr>
+              <p:spPr>
+                <a:xfrm rot="16200000" flipH="1">
+                  <a:off x="747775" y="659919"/>
+                  <a:ext cx="59998" cy="1042832"/>
+                </a:xfrm>
+                <a:prstGeom prst="bentConnector3">
+                  <a:avLst>
+                    <a:gd name="adj1" fmla="val 50000"/>
+                  </a:avLst>
+                </a:prstGeom>
+                <a:ln w="6350">
+                  <a:solidFill>
+                    <a:srgbClr val="0070C0"/>
+                  </a:solidFill>
+                </a:ln>
+              </p:spPr>
+              <p:style>
+                <a:lnRef idx="1">
+                  <a:schemeClr val="accent1"/>
+                </a:lnRef>
+                <a:fillRef idx="0">
+                  <a:schemeClr val="accent1"/>
+                </a:fillRef>
+                <a:effectRef idx="0">
+                  <a:schemeClr val="accent1"/>
+                </a:effectRef>
+                <a:fontRef idx="minor">
+                  <a:schemeClr val="tx1"/>
+                </a:fontRef>
+              </p:style>
+            </p:cxnSp>
+            <p:cxnSp>
+              <p:nvCxnSpPr>
+                <p:cNvPr id="57" name="Elbow Connector 56"/>
+                <p:cNvCxnSpPr>
+                  <a:stCxn id="55" idx="2"/>
+                </p:cNvCxnSpPr>
+                <p:nvPr/>
+              </p:nvCxnSpPr>
+              <p:spPr>
+                <a:xfrm rot="16200000" flipH="1">
+                  <a:off x="387625" y="253082"/>
+                  <a:ext cx="249206" cy="785150"/>
+                </a:xfrm>
+                <a:prstGeom prst="bentConnector3">
+                  <a:avLst>
+                    <a:gd name="adj1" fmla="val 50000"/>
+                  </a:avLst>
+                </a:prstGeom>
+                <a:ln w="6350">
+                  <a:solidFill>
+                    <a:srgbClr val="00B050"/>
+                  </a:solidFill>
+                </a:ln>
+              </p:spPr>
+              <p:style>
+                <a:lnRef idx="1">
+                  <a:schemeClr val="accent1"/>
+                </a:lnRef>
+                <a:fillRef idx="0">
+                  <a:schemeClr val="accent1"/>
+                </a:fillRef>
+                <a:effectRef idx="0">
+                  <a:schemeClr val="accent1"/>
+                </a:effectRef>
+                <a:fontRef idx="minor">
+                  <a:schemeClr val="tx1"/>
+                </a:fontRef>
+              </p:style>
+            </p:cxnSp>
+            <p:grpSp>
+              <p:nvGrpSpPr>
+                <p:cNvPr id="58" name="Group 57"/>
+                <p:cNvGrpSpPr/>
+                <p:nvPr/>
+              </p:nvGrpSpPr>
+              <p:grpSpPr>
+                <a:xfrm>
+                  <a:off x="1748421" y="87559"/>
+                  <a:ext cx="582169" cy="395396"/>
+                  <a:chOff x="1585454" y="260276"/>
+                  <a:chExt cx="582169" cy="395396"/>
+                </a:xfrm>
+              </p:grpSpPr>
+              <p:sp>
+                <p:nvSpPr>
+                  <p:cNvPr id="76" name="Rectangle 75"/>
+                  <p:cNvSpPr/>
+                  <p:nvPr/>
+                </p:nvSpPr>
+                <p:spPr>
+                  <a:xfrm>
+                    <a:off x="1585454" y="260276"/>
+                    <a:ext cx="582169" cy="281097"/>
+                  </a:xfrm>
+                  <a:prstGeom prst="rect">
+                    <a:avLst/>
+                  </a:prstGeom>
+                  <a:noFill/>
+                  <a:ln w="6350">
+                    <a:solidFill>
+                      <a:schemeClr val="tx1"/>
+                    </a:solidFill>
+                  </a:ln>
+                </p:spPr>
+                <p:style>
+                  <a:lnRef idx="2">
+                    <a:schemeClr val="accent1">
+                      <a:shade val="50000"/>
+                    </a:schemeClr>
+                  </a:lnRef>
+                  <a:fillRef idx="1">
+                    <a:schemeClr val="accent1"/>
+                  </a:fillRef>
+                  <a:effectRef idx="0">
+                    <a:schemeClr val="accent1"/>
+                  </a:effectRef>
+                  <a:fontRef idx="minor">
+                    <a:schemeClr val="lt1"/>
+                  </a:fontRef>
+                </p:style>
+                <p:txBody>
+                  <a:bodyPr lIns="91440" tIns="45720" rIns="91440" bIns="45720" spcCol="0" rtlCol="0" anchor="ctr"/>
+                  <a:lstStyle/>
+                  <a:p>
+                    <a:pPr algn="ctr"/>
+                    <a:r>
+                      <a:rPr lang="en-US" sz="1100" b="1" dirty="0">
+                        <a:solidFill>
+                          <a:schemeClr val="tx1"/>
+                        </a:solidFill>
+                      </a:rPr>
+                      <a:t>SBase</a:t>
+                    </a:r>
+                  </a:p>
+                </p:txBody>
+              </p:sp>
+              <p:sp>
+                <p:nvSpPr>
+                  <p:cNvPr id="77" name="Isosceles Triangle 76"/>
+                  <p:cNvSpPr/>
+                  <p:nvPr/>
+                </p:nvSpPr>
+                <p:spPr>
+                  <a:xfrm>
+                    <a:off x="1814057" y="541372"/>
+                    <a:ext cx="159199" cy="114300"/>
+                  </a:xfrm>
+                  <a:prstGeom prst="triangle">
+                    <a:avLst/>
+                  </a:prstGeom>
+                  <a:noFill/>
+                  <a:ln w="6350">
+                    <a:solidFill>
+                      <a:schemeClr val="tx1"/>
+                    </a:solidFill>
+                  </a:ln>
+                </p:spPr>
+                <p:style>
+                  <a:lnRef idx="2">
+                    <a:schemeClr val="accent1">
+                      <a:shade val="50000"/>
+                    </a:schemeClr>
+                  </a:lnRef>
+                  <a:fillRef idx="1">
+                    <a:schemeClr val="accent1"/>
+                  </a:fillRef>
+                  <a:effectRef idx="0">
+                    <a:schemeClr val="accent1"/>
+                  </a:effectRef>
+                  <a:fontRef idx="minor">
+                    <a:schemeClr val="lt1"/>
+                  </a:fontRef>
+                </p:style>
+                <p:txBody>
+                  <a:bodyPr lIns="91440" tIns="45720" rIns="91440" bIns="45720" spcCol="0" rtlCol="0" anchor="ctr"/>
+                  <a:lstStyle/>
+                  <a:p>
+                    <a:pPr algn="ctr"/>
+                    <a:endParaRPr lang="en-US" sz="1100" b="1" dirty="0">
+                      <a:solidFill>
+                        <a:schemeClr val="tx1"/>
+                      </a:solidFill>
+                    </a:endParaRPr>
+                  </a:p>
+                </p:txBody>
+              </p:sp>
+            </p:grpSp>
+            <p:cxnSp>
+              <p:nvCxnSpPr>
+                <p:cNvPr id="59" name="Elbow Connector 58"/>
+                <p:cNvCxnSpPr>
+                  <a:stCxn id="64" idx="3"/>
+                  <a:endCxn id="77" idx="3"/>
+                </p:cNvCxnSpPr>
+                <p:nvPr/>
+              </p:nvCxnSpPr>
+              <p:spPr>
+                <a:xfrm flipV="1">
+                  <a:off x="1556874" y="482955"/>
+                  <a:ext cx="499750" cy="401643"/>
+                </a:xfrm>
+                <a:prstGeom prst="bentConnector2">
+                  <a:avLst/>
+                </a:prstGeom>
+                <a:ln w="6350">
+                  <a:solidFill>
+                    <a:srgbClr val="0070C0"/>
+                  </a:solidFill>
+                </a:ln>
+              </p:spPr>
+              <p:style>
+                <a:lnRef idx="1">
+                  <a:schemeClr val="accent1"/>
+                </a:lnRef>
+                <a:fillRef idx="0">
+                  <a:schemeClr val="accent1"/>
+                </a:fillRef>
+                <a:effectRef idx="0">
+                  <a:schemeClr val="accent1"/>
+                </a:effectRef>
+                <a:fontRef idx="minor">
+                  <a:schemeClr val="tx1"/>
+                </a:fontRef>
+              </p:style>
+            </p:cxnSp>
+            <p:sp>
+              <p:nvSpPr>
+                <p:cNvPr id="60" name="Rectangle 59"/>
+                <p:cNvSpPr/>
+                <p:nvPr/>
+              </p:nvSpPr>
+              <p:spPr>
+                <a:xfrm>
+                  <a:off x="47485" y="457510"/>
+                  <a:ext cx="954107" cy="369332"/>
+                </a:xfrm>
+                <a:prstGeom prst="rect">
+                  <a:avLst/>
+                </a:prstGeom>
+              </p:spPr>
+              <p:txBody>
+                <a:bodyPr wrap="none" lIns="91440" tIns="45720" rIns="91440" bIns="45720">
+                  <a:spAutoFit/>
+                </a:bodyPr>
+                <a:lstStyle/>
+                <a:p>
+                  <a:r>
+                    <a:rPr lang="en-US" sz="900" dirty="0" err="1" smtClean="0">
+                      <a:solidFill>
+                        <a:srgbClr val="00B050"/>
+                      </a:solidFill>
+                    </a:rPr>
+                    <a:t>listOfSubmodels</a:t>
+                  </a:r>
+                  <a:endParaRPr lang="en-US" sz="900" dirty="0">
+                    <a:solidFill>
+                      <a:srgbClr val="00B050"/>
+                    </a:solidFill>
+                  </a:endParaRPr>
+                </a:p>
+                <a:p>
+                  <a:r>
+                    <a:rPr lang="en-US" sz="900" dirty="0">
+                      <a:solidFill>
+                        <a:srgbClr val="00B050"/>
+                      </a:solidFill>
+                    </a:rPr>
+                    <a:t>0,1</a:t>
+                  </a:r>
+                </a:p>
+              </p:txBody>
+            </p:sp>
+            <p:sp>
+              <p:nvSpPr>
+                <p:cNvPr id="61" name="Rectangle 60"/>
+                <p:cNvSpPr/>
+                <p:nvPr/>
+              </p:nvSpPr>
+              <p:spPr>
+                <a:xfrm>
+                  <a:off x="689590" y="1211334"/>
+                  <a:ext cx="1219200" cy="231056"/>
+                </a:xfrm>
+                <a:prstGeom prst="rect">
+                  <a:avLst/>
+                </a:prstGeom>
+                <a:noFill/>
+                <a:ln w="6350">
+                  <a:solidFill>
+                    <a:srgbClr val="0070C0"/>
+                  </a:solidFill>
+                </a:ln>
+              </p:spPr>
+              <p:style>
+                <a:lnRef idx="2">
+                  <a:schemeClr val="accent1">
+                    <a:shade val="50000"/>
+                  </a:schemeClr>
+                </a:lnRef>
+                <a:fillRef idx="1">
+                  <a:schemeClr val="accent1"/>
+                </a:fillRef>
+                <a:effectRef idx="0">
+                  <a:schemeClr val="accent1"/>
+                </a:effectRef>
+                <a:fontRef idx="minor">
+                  <a:schemeClr val="lt1"/>
+                </a:fontRef>
+              </p:style>
+              <p:txBody>
+                <a:bodyPr lIns="91440" tIns="45720" rIns="91440" bIns="45720" spcCol="0" rtlCol="0" anchor="ctr"/>
+                <a:lstStyle/>
+                <a:p>
+                  <a:pPr algn="ctr"/>
+                  <a:r>
+                    <a:rPr lang="en-US" sz="1100" b="1" dirty="0" smtClean="0">
+                      <a:solidFill>
+                        <a:srgbClr val="0070C0"/>
+                      </a:solidFill>
+                    </a:rPr>
+                    <a:t>Submodel</a:t>
+                  </a:r>
                   <a:endParaRPr lang="en-US" sz="1100" b="1" dirty="0">
                     <a:solidFill>
-                      <a:schemeClr val="tx1"/>
+                      <a:srgbClr val="0070C0"/>
+                    </a:solidFill>
+                  </a:endParaRPr>
+                </a:p>
+              </p:txBody>
+            </p:sp>
+            <p:sp>
+              <p:nvSpPr>
+                <p:cNvPr id="62" name="Rectangle 61"/>
+                <p:cNvSpPr/>
+                <p:nvPr/>
+              </p:nvSpPr>
+              <p:spPr>
+                <a:xfrm>
+                  <a:off x="214128" y="1004543"/>
+                  <a:ext cx="651140" cy="369332"/>
+                </a:xfrm>
+                <a:prstGeom prst="rect">
+                  <a:avLst/>
+                </a:prstGeom>
+                <a:ln>
+                  <a:noFill/>
+                </a:ln>
+              </p:spPr>
+              <p:txBody>
+                <a:bodyPr wrap="none" lIns="91440" tIns="45720" rIns="91440" bIns="45720">
+                  <a:spAutoFit/>
+                </a:bodyPr>
+                <a:lstStyle/>
+                <a:p>
+                  <a:r>
+                    <a:rPr lang="en-US" sz="900" dirty="0" smtClean="0">
+                      <a:solidFill>
+                        <a:srgbClr val="0070C0"/>
+                      </a:solidFill>
+                    </a:rPr>
+                    <a:t>submodel</a:t>
+                  </a:r>
+                  <a:endParaRPr lang="en-US" sz="900" dirty="0">
+                    <a:solidFill>
+                      <a:srgbClr val="0070C0"/>
+                    </a:solidFill>
+                  </a:endParaRPr>
+                </a:p>
+                <a:p>
+                  <a:r>
+                    <a:rPr lang="en-US" sz="900" dirty="0">
+                      <a:solidFill>
+                        <a:srgbClr val="0070C0"/>
+                      </a:solidFill>
+                    </a:rPr>
+                    <a:t>0,…,*</a:t>
+                  </a:r>
+                </a:p>
+              </p:txBody>
+            </p:sp>
+            <p:cxnSp>
+              <p:nvCxnSpPr>
+                <p:cNvPr id="63" name="Elbow Connector 62"/>
+                <p:cNvCxnSpPr>
+                  <a:stCxn id="61" idx="3"/>
+                  <a:endCxn id="77" idx="3"/>
+                </p:cNvCxnSpPr>
+                <p:nvPr/>
+              </p:nvCxnSpPr>
+              <p:spPr>
+                <a:xfrm flipV="1">
+                  <a:off x="1908790" y="482955"/>
+                  <a:ext cx="147834" cy="843907"/>
+                </a:xfrm>
+                <a:prstGeom prst="bentConnector2">
+                  <a:avLst/>
+                </a:prstGeom>
+                <a:ln w="6350">
+                  <a:solidFill>
+                    <a:srgbClr val="0070C0"/>
+                  </a:solidFill>
+                </a:ln>
+              </p:spPr>
+              <p:style>
+                <a:lnRef idx="1">
+                  <a:schemeClr val="accent1"/>
+                </a:lnRef>
+                <a:fillRef idx="0">
+                  <a:schemeClr val="accent1"/>
+                </a:fillRef>
+                <a:effectRef idx="0">
+                  <a:schemeClr val="accent1"/>
+                </a:effectRef>
+                <a:fontRef idx="minor">
+                  <a:schemeClr val="tx1"/>
+                </a:fontRef>
+              </p:style>
+            </p:cxnSp>
+            <p:sp>
+              <p:nvSpPr>
+                <p:cNvPr id="64" name="Rectangle 63"/>
+                <p:cNvSpPr/>
+                <p:nvPr/>
+              </p:nvSpPr>
+              <p:spPr>
+                <a:xfrm>
+                  <a:off x="252731" y="770260"/>
+                  <a:ext cx="1304143" cy="228676"/>
+                </a:xfrm>
+                <a:prstGeom prst="rect">
+                  <a:avLst/>
+                </a:prstGeom>
+                <a:noFill/>
+                <a:ln w="6350">
+                  <a:solidFill>
+                    <a:srgbClr val="0070C0"/>
+                  </a:solidFill>
+                </a:ln>
+              </p:spPr>
+              <p:style>
+                <a:lnRef idx="2">
+                  <a:schemeClr val="accent1">
+                    <a:shade val="50000"/>
+                  </a:schemeClr>
+                </a:lnRef>
+                <a:fillRef idx="1">
+                  <a:schemeClr val="accent1"/>
+                </a:fillRef>
+                <a:effectRef idx="0">
+                  <a:schemeClr val="accent1"/>
+                </a:effectRef>
+                <a:fontRef idx="minor">
+                  <a:schemeClr val="lt1"/>
+                </a:fontRef>
+              </p:style>
+              <p:txBody>
+                <a:bodyPr lIns="91440" tIns="45720" rIns="91440" bIns="45720" spcCol="0" rtlCol="0" anchor="ctr"/>
+                <a:lstStyle/>
+                <a:p>
+                  <a:pPr algn="ctr"/>
+                  <a:r>
+                    <a:rPr lang="en-US" sz="1100" b="1" dirty="0" err="1" smtClean="0">
+                      <a:solidFill>
+                        <a:srgbClr val="0070C0"/>
+                      </a:solidFill>
+                    </a:rPr>
+                    <a:t>ListOfSubmodels</a:t>
+                  </a:r>
+                  <a:endParaRPr lang="en-US" sz="1100" b="1" dirty="0">
+                    <a:solidFill>
+                      <a:srgbClr val="0070C0"/>
+                    </a:solidFill>
+                  </a:endParaRPr>
+                </a:p>
+              </p:txBody>
+            </p:sp>
+            <p:sp>
+              <p:nvSpPr>
+                <p:cNvPr id="65" name="Diamond 64"/>
+                <p:cNvSpPr/>
+                <p:nvPr/>
+              </p:nvSpPr>
+              <p:spPr>
+                <a:xfrm>
+                  <a:off x="222923" y="998938"/>
+                  <a:ext cx="66869" cy="152398"/>
+                </a:xfrm>
+                <a:prstGeom prst="diamond">
+                  <a:avLst/>
+                </a:prstGeom>
+                <a:solidFill>
+                  <a:srgbClr val="0070C0"/>
+                </a:solidFill>
+                <a:ln w="6350">
+                  <a:solidFill>
+                    <a:srgbClr val="0070C0"/>
+                  </a:solidFill>
+                </a:ln>
+              </p:spPr>
+              <p:style>
+                <a:lnRef idx="2">
+                  <a:schemeClr val="accent1">
+                    <a:shade val="50000"/>
+                  </a:schemeClr>
+                </a:lnRef>
+                <a:fillRef idx="1">
+                  <a:schemeClr val="accent1"/>
+                </a:fillRef>
+                <a:effectRef idx="0">
+                  <a:schemeClr val="accent1"/>
+                </a:effectRef>
+                <a:fontRef idx="minor">
+                  <a:schemeClr val="lt1"/>
+                </a:fontRef>
+              </p:style>
+              <p:txBody>
+                <a:bodyPr lIns="91440" tIns="45720" rIns="91440" bIns="45720" spcCol="0" rtlCol="0" anchor="ctr"/>
+                <a:lstStyle/>
+                <a:p>
+                  <a:pPr algn="ctr"/>
+                  <a:endParaRPr lang="en-US">
+                    <a:solidFill>
+                      <a:srgbClr val="0070C0"/>
+                    </a:solidFill>
+                  </a:endParaRPr>
+                </a:p>
+              </p:txBody>
+            </p:sp>
+            <p:cxnSp>
+              <p:nvCxnSpPr>
+                <p:cNvPr id="66" name="Elbow Connector 65"/>
+                <p:cNvCxnSpPr>
+                  <a:stCxn id="54" idx="2"/>
+                  <a:endCxn id="77" idx="3"/>
+                </p:cNvCxnSpPr>
+                <p:nvPr/>
+              </p:nvCxnSpPr>
+              <p:spPr>
+                <a:xfrm rot="16200000" flipH="1">
+                  <a:off x="1405345" y="-168324"/>
+                  <a:ext cx="115800" cy="1186758"/>
+                </a:xfrm>
+                <a:prstGeom prst="bentConnector3">
+                  <a:avLst>
+                    <a:gd name="adj1" fmla="val 137544"/>
+                  </a:avLst>
+                </a:prstGeom>
+                <a:ln w="6350">
+                  <a:solidFill>
+                    <a:schemeClr val="tx1"/>
+                  </a:solidFill>
+                </a:ln>
+              </p:spPr>
+              <p:style>
+                <a:lnRef idx="1">
+                  <a:schemeClr val="accent1"/>
+                </a:lnRef>
+                <a:fillRef idx="0">
+                  <a:schemeClr val="accent1"/>
+                </a:fillRef>
+                <a:effectRef idx="0">
+                  <a:schemeClr val="accent1"/>
+                </a:effectRef>
+                <a:fontRef idx="minor">
+                  <a:schemeClr val="tx1"/>
+                </a:fontRef>
+              </p:style>
+            </p:cxnSp>
+            <p:cxnSp>
+              <p:nvCxnSpPr>
+                <p:cNvPr id="67" name="Elbow Connector 66"/>
+                <p:cNvCxnSpPr>
+                  <a:stCxn id="75" idx="2"/>
+                  <a:endCxn id="71" idx="0"/>
+                </p:cNvCxnSpPr>
+                <p:nvPr/>
+              </p:nvCxnSpPr>
+              <p:spPr>
+                <a:xfrm rot="16200000" flipH="1">
+                  <a:off x="683046" y="1560341"/>
+                  <a:ext cx="199451" cy="1032838"/>
+                </a:xfrm>
+                <a:prstGeom prst="bentConnector3">
+                  <a:avLst>
+                    <a:gd name="adj1" fmla="val 50000"/>
+                  </a:avLst>
+                </a:prstGeom>
+                <a:ln w="6350">
+                  <a:solidFill>
+                    <a:srgbClr val="0070C0"/>
+                  </a:solidFill>
+                </a:ln>
+              </p:spPr>
+              <p:style>
+                <a:lnRef idx="1">
+                  <a:schemeClr val="accent1"/>
+                </a:lnRef>
+                <a:fillRef idx="0">
+                  <a:schemeClr val="accent1"/>
+                </a:fillRef>
+                <a:effectRef idx="0">
+                  <a:schemeClr val="accent1"/>
+                </a:effectRef>
+                <a:fontRef idx="minor">
+                  <a:schemeClr val="tx1"/>
+                </a:fontRef>
+              </p:style>
+            </p:cxnSp>
+            <p:cxnSp>
+              <p:nvCxnSpPr>
+                <p:cNvPr id="68" name="Elbow Connector 67"/>
+                <p:cNvCxnSpPr>
+                  <a:stCxn id="55" idx="2"/>
+                  <a:endCxn id="74" idx="0"/>
+                </p:cNvCxnSpPr>
+                <p:nvPr/>
+              </p:nvCxnSpPr>
+              <p:spPr>
+                <a:xfrm rot="16200000" flipH="1">
+                  <a:off x="-24922" y="665628"/>
+                  <a:ext cx="1086738" cy="797589"/>
+                </a:xfrm>
+                <a:prstGeom prst="bentConnector3">
+                  <a:avLst>
+                    <a:gd name="adj1" fmla="val 88835"/>
+                  </a:avLst>
+                </a:prstGeom>
+                <a:ln w="6350">
+                  <a:solidFill>
+                    <a:srgbClr val="00B050"/>
+                  </a:solidFill>
+                </a:ln>
+              </p:spPr>
+              <p:style>
+                <a:lnRef idx="1">
+                  <a:schemeClr val="accent1"/>
+                </a:lnRef>
+                <a:fillRef idx="0">
+                  <a:schemeClr val="accent1"/>
+                </a:fillRef>
+                <a:effectRef idx="0">
+                  <a:schemeClr val="accent1"/>
+                </a:effectRef>
+                <a:fontRef idx="minor">
+                  <a:schemeClr val="tx1"/>
+                </a:fontRef>
+              </p:style>
+            </p:cxnSp>
+            <p:cxnSp>
+              <p:nvCxnSpPr>
+                <p:cNvPr id="69" name="Elbow Connector 68"/>
+                <p:cNvCxnSpPr>
+                  <a:stCxn id="74" idx="3"/>
+                  <a:endCxn id="77" idx="3"/>
+                </p:cNvCxnSpPr>
+                <p:nvPr/>
+              </p:nvCxnSpPr>
+              <p:spPr>
+                <a:xfrm flipV="1">
+                  <a:off x="1569313" y="482955"/>
+                  <a:ext cx="487311" cy="1233259"/>
+                </a:xfrm>
+                <a:prstGeom prst="bentConnector2">
+                  <a:avLst/>
+                </a:prstGeom>
+                <a:ln w="6350">
+                  <a:solidFill>
+                    <a:srgbClr val="0070C0"/>
+                  </a:solidFill>
+                </a:ln>
+              </p:spPr>
+              <p:style>
+                <a:lnRef idx="1">
+                  <a:schemeClr val="accent1"/>
+                </a:lnRef>
+                <a:fillRef idx="0">
+                  <a:schemeClr val="accent1"/>
+                </a:fillRef>
+                <a:effectRef idx="0">
+                  <a:schemeClr val="accent1"/>
+                </a:effectRef>
+                <a:fontRef idx="minor">
+                  <a:schemeClr val="tx1"/>
+                </a:fontRef>
+              </p:style>
+            </p:cxnSp>
+            <p:sp>
+              <p:nvSpPr>
+                <p:cNvPr id="70" name="Rectangle 69"/>
+                <p:cNvSpPr/>
+                <p:nvPr/>
+              </p:nvSpPr>
+              <p:spPr>
+                <a:xfrm>
+                  <a:off x="46037" y="1307900"/>
+                  <a:ext cx="678391" cy="369332"/>
+                </a:xfrm>
+                <a:prstGeom prst="rect">
+                  <a:avLst/>
+                </a:prstGeom>
+              </p:spPr>
+              <p:txBody>
+                <a:bodyPr wrap="none" lIns="91440" tIns="45720" rIns="91440" bIns="45720">
+                  <a:spAutoFit/>
+                </a:bodyPr>
+                <a:lstStyle/>
+                <a:p>
+                  <a:r>
+                    <a:rPr lang="en-US" sz="900" dirty="0" err="1" smtClean="0">
+                      <a:solidFill>
+                        <a:srgbClr val="00B050"/>
+                      </a:solidFill>
+                    </a:rPr>
+                    <a:t>listOfPorts</a:t>
+                  </a:r>
+                  <a:endParaRPr lang="en-US" sz="900" dirty="0">
+                    <a:solidFill>
+                      <a:srgbClr val="00B050"/>
+                    </a:solidFill>
+                  </a:endParaRPr>
+                </a:p>
+                <a:p>
+                  <a:r>
+                    <a:rPr lang="en-US" sz="900" dirty="0">
+                      <a:solidFill>
+                        <a:srgbClr val="00B050"/>
+                      </a:solidFill>
+                    </a:rPr>
+                    <a:t>0,1</a:t>
+                  </a:r>
+                </a:p>
+              </p:txBody>
+            </p:sp>
+            <p:sp>
+              <p:nvSpPr>
+                <p:cNvPr id="71" name="Rectangle 70"/>
+                <p:cNvSpPr/>
+                <p:nvPr/>
+              </p:nvSpPr>
+              <p:spPr>
+                <a:xfrm>
+                  <a:off x="689590" y="2176486"/>
+                  <a:ext cx="1219200" cy="363001"/>
+                </a:xfrm>
+                <a:prstGeom prst="rect">
+                  <a:avLst/>
+                </a:prstGeom>
+                <a:noFill/>
+                <a:ln w="6350">
+                  <a:solidFill>
+                    <a:srgbClr val="0070C0"/>
+                  </a:solidFill>
+                </a:ln>
+              </p:spPr>
+              <p:style>
+                <a:lnRef idx="2">
+                  <a:schemeClr val="accent1">
+                    <a:shade val="50000"/>
+                  </a:schemeClr>
+                </a:lnRef>
+                <a:fillRef idx="1">
+                  <a:schemeClr val="accent1"/>
+                </a:fillRef>
+                <a:effectRef idx="0">
+                  <a:schemeClr val="accent1"/>
+                </a:effectRef>
+                <a:fontRef idx="minor">
+                  <a:schemeClr val="lt1"/>
+                </a:fontRef>
+              </p:style>
+              <p:txBody>
+                <a:bodyPr lIns="91440" tIns="45720" rIns="91440" bIns="45720" spcCol="0" rtlCol="0" anchor="t"/>
+                <a:lstStyle/>
+                <a:p>
+                  <a:pPr algn="ctr"/>
+                  <a:r>
+                    <a:rPr lang="en-US" sz="1100" b="1" dirty="0" smtClean="0">
+                      <a:solidFill>
+                        <a:srgbClr val="0070C0"/>
+                      </a:solidFill>
+                    </a:rPr>
+                    <a:t>Port</a:t>
+                  </a:r>
+                </a:p>
+                <a:p>
+                  <a:r>
+                    <a:rPr lang="en-US" sz="900" dirty="0" smtClean="0">
+                      <a:solidFill>
+                        <a:srgbClr val="0070C0"/>
+                      </a:solidFill>
+                    </a:rPr>
+                    <a:t>id: </a:t>
+                  </a:r>
+                  <a:r>
+                    <a:rPr lang="en-US" sz="900" smtClean="0">
+                      <a:solidFill>
+                        <a:srgbClr val="0070C0"/>
+                      </a:solidFill>
+                    </a:rPr>
+                    <a:t>PortSId</a:t>
+                  </a:r>
+                  <a:endParaRPr lang="en-US" sz="900" dirty="0">
+                    <a:solidFill>
+                      <a:srgbClr val="0070C0"/>
+                    </a:solidFill>
+                  </a:endParaRPr>
+                </a:p>
+              </p:txBody>
+            </p:sp>
+            <p:sp>
+              <p:nvSpPr>
+                <p:cNvPr id="72" name="Rectangle 71"/>
+                <p:cNvSpPr/>
+                <p:nvPr/>
+              </p:nvSpPr>
+              <p:spPr>
+                <a:xfrm>
+                  <a:off x="222285" y="1892931"/>
+                  <a:ext cx="437940" cy="369332"/>
+                </a:xfrm>
+                <a:prstGeom prst="rect">
+                  <a:avLst/>
+                </a:prstGeom>
+                <a:ln>
+                  <a:noFill/>
+                </a:ln>
+              </p:spPr>
+              <p:txBody>
+                <a:bodyPr wrap="none" lIns="91440" tIns="45720" rIns="91440" bIns="45720">
+                  <a:spAutoFit/>
+                </a:bodyPr>
+                <a:lstStyle/>
+                <a:p>
+                  <a:r>
+                    <a:rPr lang="en-US" sz="900" dirty="0" smtClean="0">
+                      <a:solidFill>
+                        <a:srgbClr val="0070C0"/>
+                      </a:solidFill>
+                    </a:rPr>
+                    <a:t>port</a:t>
+                  </a:r>
+                  <a:endParaRPr lang="en-US" sz="900" dirty="0">
+                    <a:solidFill>
+                      <a:srgbClr val="0070C0"/>
+                    </a:solidFill>
+                  </a:endParaRPr>
+                </a:p>
+                <a:p>
+                  <a:r>
+                    <a:rPr lang="en-US" sz="900" dirty="0">
+                      <a:solidFill>
+                        <a:srgbClr val="0070C0"/>
+                      </a:solidFill>
+                    </a:rPr>
+                    <a:t>0,…,*</a:t>
+                  </a:r>
+                </a:p>
+              </p:txBody>
+            </p:sp>
+            <p:cxnSp>
+              <p:nvCxnSpPr>
+                <p:cNvPr id="73" name="Elbow Connector 72"/>
+                <p:cNvCxnSpPr>
+                  <a:stCxn id="71" idx="3"/>
+                  <a:endCxn id="50" idx="3"/>
+                </p:cNvCxnSpPr>
+                <p:nvPr/>
+              </p:nvCxnSpPr>
+              <p:spPr>
+                <a:xfrm flipV="1">
+                  <a:off x="1908790" y="2151722"/>
+                  <a:ext cx="147651" cy="206265"/>
+                </a:xfrm>
+                <a:prstGeom prst="bentConnector2">
+                  <a:avLst/>
+                </a:prstGeom>
+                <a:ln w="6350">
+                  <a:solidFill>
+                    <a:srgbClr val="0070C0"/>
+                  </a:solidFill>
+                </a:ln>
+              </p:spPr>
+              <p:style>
+                <a:lnRef idx="1">
+                  <a:schemeClr val="accent1"/>
+                </a:lnRef>
+                <a:fillRef idx="0">
+                  <a:schemeClr val="accent1"/>
+                </a:fillRef>
+                <a:effectRef idx="0">
+                  <a:schemeClr val="accent1"/>
+                </a:effectRef>
+                <a:fontRef idx="minor">
+                  <a:schemeClr val="tx1"/>
+                </a:fontRef>
+              </p:style>
+            </p:cxnSp>
+            <p:sp>
+              <p:nvSpPr>
+                <p:cNvPr id="74" name="Rectangle 73"/>
+                <p:cNvSpPr/>
+                <p:nvPr/>
+              </p:nvSpPr>
+              <p:spPr>
+                <a:xfrm>
+                  <a:off x="265170" y="1607792"/>
+                  <a:ext cx="1304143" cy="216843"/>
+                </a:xfrm>
+                <a:prstGeom prst="rect">
+                  <a:avLst/>
+                </a:prstGeom>
+                <a:noFill/>
+                <a:ln w="6350">
+                  <a:solidFill>
+                    <a:srgbClr val="0070C0"/>
+                  </a:solidFill>
+                </a:ln>
+              </p:spPr>
+              <p:style>
+                <a:lnRef idx="2">
+                  <a:schemeClr val="accent1">
+                    <a:shade val="50000"/>
+                  </a:schemeClr>
+                </a:lnRef>
+                <a:fillRef idx="1">
+                  <a:schemeClr val="accent1"/>
+                </a:fillRef>
+                <a:effectRef idx="0">
+                  <a:schemeClr val="accent1"/>
+                </a:effectRef>
+                <a:fontRef idx="minor">
+                  <a:schemeClr val="lt1"/>
+                </a:fontRef>
+              </p:style>
+              <p:txBody>
+                <a:bodyPr lIns="91440" tIns="45720" rIns="91440" bIns="45720" spcCol="0" rtlCol="0" anchor="ctr"/>
+                <a:lstStyle/>
+                <a:p>
+                  <a:pPr algn="ctr"/>
+                  <a:r>
+                    <a:rPr lang="en-US" sz="1100" b="1" dirty="0" err="1" smtClean="0">
+                      <a:solidFill>
+                        <a:srgbClr val="0070C0"/>
+                      </a:solidFill>
+                    </a:rPr>
+                    <a:t>ListOfPorts</a:t>
+                  </a:r>
+                  <a:endParaRPr lang="en-US" sz="1100" b="1" dirty="0">
+                    <a:solidFill>
+                      <a:srgbClr val="0070C0"/>
+                    </a:solidFill>
+                  </a:endParaRPr>
+                </a:p>
+              </p:txBody>
+            </p:sp>
+            <p:sp>
+              <p:nvSpPr>
+                <p:cNvPr id="75" name="Diamond 74"/>
+                <p:cNvSpPr/>
+                <p:nvPr/>
+              </p:nvSpPr>
+              <p:spPr>
+                <a:xfrm>
+                  <a:off x="232917" y="1824637"/>
+                  <a:ext cx="66869" cy="152398"/>
+                </a:xfrm>
+                <a:prstGeom prst="diamond">
+                  <a:avLst/>
+                </a:prstGeom>
+                <a:solidFill>
+                  <a:srgbClr val="0070C0"/>
+                </a:solidFill>
+                <a:ln w="6350">
+                  <a:solidFill>
+                    <a:srgbClr val="0070C0"/>
+                  </a:solidFill>
+                </a:ln>
+              </p:spPr>
+              <p:style>
+                <a:lnRef idx="2">
+                  <a:schemeClr val="accent1">
+                    <a:shade val="50000"/>
+                  </a:schemeClr>
+                </a:lnRef>
+                <a:fillRef idx="1">
+                  <a:schemeClr val="accent1"/>
+                </a:fillRef>
+                <a:effectRef idx="0">
+                  <a:schemeClr val="accent1"/>
+                </a:effectRef>
+                <a:fontRef idx="minor">
+                  <a:schemeClr val="lt1"/>
+                </a:fontRef>
+              </p:style>
+              <p:txBody>
+                <a:bodyPr lIns="91440" tIns="45720" rIns="91440" bIns="45720" spcCol="0" rtlCol="0" anchor="ctr"/>
+                <a:lstStyle/>
+                <a:p>
+                  <a:pPr algn="ctr"/>
+                  <a:endParaRPr lang="en-US">
+                    <a:solidFill>
+                      <a:srgbClr val="0070C0"/>
                     </a:solidFill>
                   </a:endParaRPr>
                 </a:p>
@@ -3878,19 +4713,16 @@
           </p:grpSp>
           <p:cxnSp>
             <p:nvCxnSpPr>
-              <p:cNvPr id="85" name="Elbow Connector 84"/>
-              <p:cNvCxnSpPr>
-                <a:stCxn id="90" idx="3"/>
-                <a:endCxn id="103" idx="3"/>
-              </p:cNvCxnSpPr>
+              <p:cNvPr id="53" name="Straight Connector 52"/>
+              <p:cNvCxnSpPr/>
               <p:nvPr/>
             </p:nvCxnSpPr>
             <p:spPr>
-              <a:xfrm flipV="1">
-                <a:off x="1556874" y="482955"/>
-                <a:ext cx="499750" cy="401643"/>
+              <a:xfrm>
+                <a:off x="690314" y="2311517"/>
+                <a:ext cx="1218221" cy="53"/>
               </a:xfrm>
-              <a:prstGeom prst="bentConnector2">
+              <a:prstGeom prst="line">
                 <a:avLst/>
               </a:prstGeom>
               <a:ln w="6350">
@@ -3914,840 +4746,133 @@
               </a:fontRef>
             </p:style>
           </p:cxnSp>
-          <p:sp>
-            <p:nvSpPr>
-              <p:cNvPr id="86" name="Rectangle 85"/>
-              <p:cNvSpPr/>
-              <p:nvPr/>
-            </p:nvSpPr>
-            <p:spPr>
-              <a:xfrm>
-                <a:off x="47485" y="457510"/>
-                <a:ext cx="954107" cy="369332"/>
-              </a:xfrm>
-              <a:prstGeom prst="rect">
-                <a:avLst/>
-              </a:prstGeom>
-            </p:spPr>
-            <p:txBody>
-              <a:bodyPr wrap="none" lIns="91440" tIns="45720" rIns="91440" bIns="45720">
-                <a:spAutoFit/>
-              </a:bodyPr>
-              <a:lstStyle/>
-              <a:p>
-                <a:r>
-                  <a:rPr lang="en-US" sz="900" dirty="0" err="1" smtClean="0">
-                    <a:solidFill>
-                      <a:srgbClr val="00B050"/>
-                    </a:solidFill>
-                  </a:rPr>
-                  <a:t>listOfSubmodels</a:t>
-                </a:r>
-                <a:endParaRPr lang="en-US" sz="900" dirty="0">
+        </p:grpSp>
+        <p:sp>
+          <p:nvSpPr>
+            <p:cNvPr id="49" name="Rectangle 48"/>
+            <p:cNvSpPr/>
+            <p:nvPr/>
+          </p:nvSpPr>
+          <p:spPr>
+            <a:xfrm>
+              <a:off x="1689154" y="1787375"/>
+              <a:ext cx="736023" cy="216843"/>
+            </a:xfrm>
+            <a:prstGeom prst="rect">
+              <a:avLst/>
+            </a:prstGeom>
+            <a:noFill/>
+            <a:ln w="6350">
+              <a:solidFill>
+                <a:srgbClr val="0070C0"/>
+              </a:solidFill>
+            </a:ln>
+          </p:spPr>
+          <p:style>
+            <a:lnRef idx="2">
+              <a:schemeClr val="accent1">
+                <a:shade val="50000"/>
+              </a:schemeClr>
+            </a:lnRef>
+            <a:fillRef idx="1">
+              <a:schemeClr val="accent1"/>
+            </a:fillRef>
+            <a:effectRef idx="0">
+              <a:schemeClr val="accent1"/>
+            </a:effectRef>
+            <a:fontRef idx="minor">
+              <a:schemeClr val="lt1"/>
+            </a:fontRef>
+          </p:style>
+          <p:txBody>
+            <a:bodyPr lIns="91440" tIns="45720" rIns="91440" bIns="45720" spcCol="0" rtlCol="0" anchor="ctr"/>
+            <a:lstStyle/>
+            <a:p>
+              <a:pPr algn="ctr"/>
+              <a:r>
+                <a:rPr lang="en-US" sz="1100" b="1" dirty="0" err="1" smtClean="0">
                   <a:solidFill>
-                    <a:srgbClr val="00B050"/>
+                    <a:srgbClr val="0070C0"/>
                   </a:solidFill>
-                </a:endParaRPr>
-              </a:p>
-              <a:p>
-                <a:r>
-                  <a:rPr lang="en-US" sz="900" dirty="0">
-                    <a:solidFill>
-                      <a:srgbClr val="00B050"/>
-                    </a:solidFill>
-                  </a:rPr>
-                  <a:t>0,1</a:t>
-                </a:r>
-              </a:p>
-            </p:txBody>
-          </p:sp>
-          <p:sp>
-            <p:nvSpPr>
-              <p:cNvPr id="87" name="Rectangle 86"/>
-              <p:cNvSpPr/>
-              <p:nvPr/>
-            </p:nvSpPr>
-            <p:spPr>
-              <a:xfrm>
-                <a:off x="689590" y="1211334"/>
-                <a:ext cx="1219200" cy="231056"/>
-              </a:xfrm>
-              <a:prstGeom prst="rect">
-                <a:avLst/>
-              </a:prstGeom>
-              <a:noFill/>
-              <a:ln w="6350">
+                </a:rPr>
+                <a:t>SBaseRef</a:t>
+              </a:r>
+              <a:endParaRPr lang="en-US" sz="1100" b="1" dirty="0">
                 <a:solidFill>
                   <a:srgbClr val="0070C0"/>
                 </a:solidFill>
-              </a:ln>
-            </p:spPr>
-            <p:style>
-              <a:lnRef idx="2">
-                <a:schemeClr val="accent1">
-                  <a:shade val="50000"/>
-                </a:schemeClr>
-              </a:lnRef>
-              <a:fillRef idx="1">
-                <a:schemeClr val="accent1"/>
-              </a:fillRef>
-              <a:effectRef idx="0">
-                <a:schemeClr val="accent1"/>
-              </a:effectRef>
-              <a:fontRef idx="minor">
-                <a:schemeClr val="lt1"/>
-              </a:fontRef>
-            </p:style>
-            <p:txBody>
-              <a:bodyPr lIns="91440" tIns="45720" rIns="91440" bIns="45720" spcCol="0" rtlCol="0" anchor="ctr"/>
-              <a:lstStyle/>
-              <a:p>
-                <a:pPr algn="ctr"/>
-                <a:r>
-                  <a:rPr lang="en-US" sz="1100" b="1" dirty="0" smtClean="0">
-                    <a:solidFill>
-                      <a:srgbClr val="0070C0"/>
-                    </a:solidFill>
-                  </a:rPr>
-                  <a:t>Submodel</a:t>
-                </a:r>
-                <a:endParaRPr lang="en-US" sz="1100" b="1" dirty="0">
-                  <a:solidFill>
-                    <a:srgbClr val="0070C0"/>
-                  </a:solidFill>
-                </a:endParaRPr>
-              </a:p>
-            </p:txBody>
-          </p:sp>
-          <p:sp>
-            <p:nvSpPr>
-              <p:cNvPr id="88" name="Rectangle 87"/>
-              <p:cNvSpPr/>
-              <p:nvPr/>
-            </p:nvSpPr>
-            <p:spPr>
-              <a:xfrm>
-                <a:off x="214128" y="1004543"/>
-                <a:ext cx="651140" cy="369332"/>
-              </a:xfrm>
-              <a:prstGeom prst="rect">
-                <a:avLst/>
-              </a:prstGeom>
-              <a:ln>
-                <a:noFill/>
-              </a:ln>
-            </p:spPr>
-            <p:txBody>
-              <a:bodyPr wrap="none" lIns="91440" tIns="45720" rIns="91440" bIns="45720">
-                <a:spAutoFit/>
-              </a:bodyPr>
-              <a:lstStyle/>
-              <a:p>
-                <a:r>
-                  <a:rPr lang="en-US" sz="900" dirty="0" smtClean="0">
-                    <a:solidFill>
-                      <a:srgbClr val="0070C0"/>
-                    </a:solidFill>
-                  </a:rPr>
-                  <a:t>submodel</a:t>
-                </a:r>
-                <a:endParaRPr lang="en-US" sz="900" dirty="0">
-                  <a:solidFill>
-                    <a:srgbClr val="0070C0"/>
-                  </a:solidFill>
-                </a:endParaRPr>
-              </a:p>
-              <a:p>
-                <a:r>
-                  <a:rPr lang="en-US" sz="900" dirty="0">
-                    <a:solidFill>
-                      <a:srgbClr val="0070C0"/>
-                    </a:solidFill>
-                  </a:rPr>
-                  <a:t>0,…,*</a:t>
-                </a:r>
-              </a:p>
-            </p:txBody>
-          </p:sp>
-          <p:cxnSp>
-            <p:nvCxnSpPr>
-              <p:cNvPr id="89" name="Elbow Connector 88"/>
-              <p:cNvCxnSpPr>
-                <a:stCxn id="87" idx="3"/>
-                <a:endCxn id="103" idx="3"/>
-              </p:cNvCxnSpPr>
-              <p:nvPr/>
-            </p:nvCxnSpPr>
-            <p:spPr>
-              <a:xfrm flipV="1">
-                <a:off x="1908790" y="482955"/>
-                <a:ext cx="147834" cy="843907"/>
-              </a:xfrm>
-              <a:prstGeom prst="bentConnector2">
-                <a:avLst/>
-              </a:prstGeom>
-              <a:ln w="6350">
+              </a:endParaRPr>
+            </a:p>
+          </p:txBody>
+        </p:sp>
+        <p:sp>
+          <p:nvSpPr>
+            <p:cNvPr id="50" name="Isosceles Triangle 49"/>
+            <p:cNvSpPr/>
+            <p:nvPr/>
+          </p:nvSpPr>
+          <p:spPr>
+            <a:xfrm>
+              <a:off x="1980699" y="2004218"/>
+              <a:ext cx="152932" cy="114300"/>
+            </a:xfrm>
+            <a:prstGeom prst="triangle">
+              <a:avLst/>
+            </a:prstGeom>
+            <a:noFill/>
+            <a:ln w="6350">
+              <a:solidFill>
+                <a:srgbClr val="0070C0"/>
+              </a:solidFill>
+            </a:ln>
+          </p:spPr>
+          <p:style>
+            <a:lnRef idx="2">
+              <a:schemeClr val="accent1">
+                <a:shade val="50000"/>
+              </a:schemeClr>
+            </a:lnRef>
+            <a:fillRef idx="1">
+              <a:schemeClr val="accent1"/>
+            </a:fillRef>
+            <a:effectRef idx="0">
+              <a:schemeClr val="accent1"/>
+            </a:effectRef>
+            <a:fontRef idx="minor">
+              <a:schemeClr val="lt1"/>
+            </a:fontRef>
+          </p:style>
+          <p:txBody>
+            <a:bodyPr lIns="91440" tIns="45720" rIns="91440" bIns="45720" spcCol="0" rtlCol="0" anchor="ctr"/>
+            <a:lstStyle/>
+            <a:p>
+              <a:pPr algn="ctr"/>
+              <a:endParaRPr lang="en-US" sz="1100" b="1" dirty="0">
                 <a:solidFill>
                   <a:srgbClr val="0070C0"/>
                 </a:solidFill>
-              </a:ln>
-            </p:spPr>
-            <p:style>
-              <a:lnRef idx="1">
-                <a:schemeClr val="accent1"/>
-              </a:lnRef>
-              <a:fillRef idx="0">
-                <a:schemeClr val="accent1"/>
-              </a:fillRef>
-              <a:effectRef idx="0">
-                <a:schemeClr val="accent1"/>
-              </a:effectRef>
-              <a:fontRef idx="minor">
-                <a:schemeClr val="tx1"/>
-              </a:fontRef>
-            </p:style>
-          </p:cxnSp>
-          <p:sp>
-            <p:nvSpPr>
-              <p:cNvPr id="90" name="Rectangle 89"/>
-              <p:cNvSpPr/>
-              <p:nvPr/>
-            </p:nvSpPr>
-            <p:spPr>
-              <a:xfrm>
-                <a:off x="252731" y="770260"/>
-                <a:ext cx="1304143" cy="228676"/>
-              </a:xfrm>
-              <a:prstGeom prst="rect">
-                <a:avLst/>
-              </a:prstGeom>
-              <a:noFill/>
-              <a:ln w="6350">
-                <a:solidFill>
-                  <a:srgbClr val="0070C0"/>
-                </a:solidFill>
-              </a:ln>
-            </p:spPr>
-            <p:style>
-              <a:lnRef idx="2">
-                <a:schemeClr val="accent1">
-                  <a:shade val="50000"/>
-                </a:schemeClr>
-              </a:lnRef>
-              <a:fillRef idx="1">
-                <a:schemeClr val="accent1"/>
-              </a:fillRef>
-              <a:effectRef idx="0">
-                <a:schemeClr val="accent1"/>
-              </a:effectRef>
-              <a:fontRef idx="minor">
-                <a:schemeClr val="lt1"/>
-              </a:fontRef>
-            </p:style>
-            <p:txBody>
-              <a:bodyPr lIns="91440" tIns="45720" rIns="91440" bIns="45720" spcCol="0" rtlCol="0" anchor="ctr"/>
-              <a:lstStyle/>
-              <a:p>
-                <a:pPr algn="ctr"/>
-                <a:r>
-                  <a:rPr lang="en-US" sz="1100" b="1" dirty="0" err="1" smtClean="0">
-                    <a:solidFill>
-                      <a:srgbClr val="0070C0"/>
-                    </a:solidFill>
-                  </a:rPr>
-                  <a:t>ListOfSubmodels</a:t>
-                </a:r>
-                <a:endParaRPr lang="en-US" sz="1100" b="1" dirty="0">
-                  <a:solidFill>
-                    <a:srgbClr val="0070C0"/>
-                  </a:solidFill>
-                </a:endParaRPr>
-              </a:p>
-            </p:txBody>
-          </p:sp>
-          <p:sp>
-            <p:nvSpPr>
-              <p:cNvPr id="91" name="Diamond 90"/>
-              <p:cNvSpPr/>
-              <p:nvPr/>
-            </p:nvSpPr>
-            <p:spPr>
-              <a:xfrm>
-                <a:off x="222923" y="998938"/>
-                <a:ext cx="66869" cy="152398"/>
-              </a:xfrm>
-              <a:prstGeom prst="diamond">
-                <a:avLst/>
-              </a:prstGeom>
-              <a:solidFill>
-                <a:srgbClr val="0070C0"/>
-              </a:solidFill>
-              <a:ln w="6350">
-                <a:solidFill>
-                  <a:srgbClr val="0070C0"/>
-                </a:solidFill>
-              </a:ln>
-            </p:spPr>
-            <p:style>
-              <a:lnRef idx="2">
-                <a:schemeClr val="accent1">
-                  <a:shade val="50000"/>
-                </a:schemeClr>
-              </a:lnRef>
-              <a:fillRef idx="1">
-                <a:schemeClr val="accent1"/>
-              </a:fillRef>
-              <a:effectRef idx="0">
-                <a:schemeClr val="accent1"/>
-              </a:effectRef>
-              <a:fontRef idx="minor">
-                <a:schemeClr val="lt1"/>
-              </a:fontRef>
-            </p:style>
-            <p:txBody>
-              <a:bodyPr lIns="91440" tIns="45720" rIns="91440" bIns="45720" spcCol="0" rtlCol="0" anchor="ctr"/>
-              <a:lstStyle/>
-              <a:p>
-                <a:pPr algn="ctr"/>
-                <a:endParaRPr lang="en-US">
-                  <a:solidFill>
-                    <a:srgbClr val="0070C0"/>
-                  </a:solidFill>
-                </a:endParaRPr>
-              </a:p>
-            </p:txBody>
-          </p:sp>
-          <p:cxnSp>
-            <p:nvCxnSpPr>
-              <p:cNvPr id="92" name="Elbow Connector 91"/>
-              <p:cNvCxnSpPr>
-                <a:stCxn id="80" idx="2"/>
-                <a:endCxn id="103" idx="3"/>
-              </p:cNvCxnSpPr>
-              <p:nvPr/>
-            </p:nvCxnSpPr>
-            <p:spPr>
-              <a:xfrm rot="16200000" flipH="1">
-                <a:off x="1405345" y="-168324"/>
-                <a:ext cx="115800" cy="1186758"/>
-              </a:xfrm>
-              <a:prstGeom prst="bentConnector3">
-                <a:avLst>
-                  <a:gd name="adj1" fmla="val 137544"/>
-                </a:avLst>
-              </a:prstGeom>
-              <a:ln w="6350">
-                <a:solidFill>
-                  <a:schemeClr val="tx1"/>
-                </a:solidFill>
-              </a:ln>
-            </p:spPr>
-            <p:style>
-              <a:lnRef idx="1">
-                <a:schemeClr val="accent1"/>
-              </a:lnRef>
-              <a:fillRef idx="0">
-                <a:schemeClr val="accent1"/>
-              </a:fillRef>
-              <a:effectRef idx="0">
-                <a:schemeClr val="accent1"/>
-              </a:effectRef>
-              <a:fontRef idx="minor">
-                <a:schemeClr val="tx1"/>
-              </a:fontRef>
-            </p:style>
-          </p:cxnSp>
-          <p:cxnSp>
-            <p:nvCxnSpPr>
-              <p:cNvPr id="93" name="Elbow Connector 92"/>
-              <p:cNvCxnSpPr>
-                <a:stCxn id="101" idx="2"/>
-                <a:endCxn id="97" idx="0"/>
-              </p:cNvCxnSpPr>
-              <p:nvPr/>
-            </p:nvCxnSpPr>
-            <p:spPr>
-              <a:xfrm rot="16200000" flipH="1">
-                <a:off x="763189" y="1480198"/>
-                <a:ext cx="39165" cy="1032838"/>
-              </a:xfrm>
-              <a:prstGeom prst="bentConnector3">
-                <a:avLst>
-                  <a:gd name="adj1" fmla="val 50000"/>
-                </a:avLst>
-              </a:prstGeom>
-              <a:ln w="6350">
-                <a:solidFill>
-                  <a:srgbClr val="0070C0"/>
-                </a:solidFill>
-              </a:ln>
-            </p:spPr>
-            <p:style>
-              <a:lnRef idx="1">
-                <a:schemeClr val="accent1"/>
-              </a:lnRef>
-              <a:fillRef idx="0">
-                <a:schemeClr val="accent1"/>
-              </a:fillRef>
-              <a:effectRef idx="0">
-                <a:schemeClr val="accent1"/>
-              </a:effectRef>
-              <a:fontRef idx="minor">
-                <a:schemeClr val="tx1"/>
-              </a:fontRef>
-            </p:style>
-          </p:cxnSp>
-          <p:cxnSp>
-            <p:nvCxnSpPr>
-              <p:cNvPr id="94" name="Elbow Connector 93"/>
-              <p:cNvCxnSpPr>
-                <a:stCxn id="81" idx="2"/>
-                <a:endCxn id="100" idx="0"/>
-              </p:cNvCxnSpPr>
-              <p:nvPr/>
-            </p:nvCxnSpPr>
-            <p:spPr>
-              <a:xfrm rot="16200000" flipH="1">
-                <a:off x="-24922" y="665628"/>
-                <a:ext cx="1086738" cy="797589"/>
-              </a:xfrm>
-              <a:prstGeom prst="bentConnector3">
-                <a:avLst>
-                  <a:gd name="adj1" fmla="val 88835"/>
-                </a:avLst>
-              </a:prstGeom>
-              <a:ln w="6350">
-                <a:solidFill>
-                  <a:srgbClr val="00B050"/>
-                </a:solidFill>
-              </a:ln>
-            </p:spPr>
-            <p:style>
-              <a:lnRef idx="1">
-                <a:schemeClr val="accent1"/>
-              </a:lnRef>
-              <a:fillRef idx="0">
-                <a:schemeClr val="accent1"/>
-              </a:fillRef>
-              <a:effectRef idx="0">
-                <a:schemeClr val="accent1"/>
-              </a:effectRef>
-              <a:fontRef idx="minor">
-                <a:schemeClr val="tx1"/>
-              </a:fontRef>
-            </p:style>
-          </p:cxnSp>
-          <p:cxnSp>
-            <p:nvCxnSpPr>
-              <p:cNvPr id="95" name="Elbow Connector 94"/>
-              <p:cNvCxnSpPr>
-                <a:stCxn id="100" idx="3"/>
-                <a:endCxn id="103" idx="3"/>
-              </p:cNvCxnSpPr>
-              <p:nvPr/>
-            </p:nvCxnSpPr>
-            <p:spPr>
-              <a:xfrm flipV="1">
-                <a:off x="1569313" y="482955"/>
-                <a:ext cx="487311" cy="1233259"/>
-              </a:xfrm>
-              <a:prstGeom prst="bentConnector2">
-                <a:avLst/>
-              </a:prstGeom>
-              <a:ln w="6350">
-                <a:solidFill>
-                  <a:srgbClr val="0070C0"/>
-                </a:solidFill>
-              </a:ln>
-            </p:spPr>
-            <p:style>
-              <a:lnRef idx="1">
-                <a:schemeClr val="accent1"/>
-              </a:lnRef>
-              <a:fillRef idx="0">
-                <a:schemeClr val="accent1"/>
-              </a:fillRef>
-              <a:effectRef idx="0">
-                <a:schemeClr val="accent1"/>
-              </a:effectRef>
-              <a:fontRef idx="minor">
-                <a:schemeClr val="tx1"/>
-              </a:fontRef>
-            </p:style>
-          </p:cxnSp>
-          <p:sp>
-            <p:nvSpPr>
-              <p:cNvPr id="96" name="Rectangle 95"/>
-              <p:cNvSpPr/>
-              <p:nvPr/>
-            </p:nvSpPr>
-            <p:spPr>
-              <a:xfrm>
-                <a:off x="46037" y="1307900"/>
-                <a:ext cx="678391" cy="369332"/>
-              </a:xfrm>
-              <a:prstGeom prst="rect">
-                <a:avLst/>
-              </a:prstGeom>
-            </p:spPr>
-            <p:txBody>
-              <a:bodyPr wrap="none" lIns="91440" tIns="45720" rIns="91440" bIns="45720">
-                <a:spAutoFit/>
-              </a:bodyPr>
-              <a:lstStyle/>
-              <a:p>
-                <a:r>
-                  <a:rPr lang="en-US" sz="900" dirty="0" err="1" smtClean="0">
-                    <a:solidFill>
-                      <a:srgbClr val="00B050"/>
-                    </a:solidFill>
-                  </a:rPr>
-                  <a:t>listOfPorts</a:t>
-                </a:r>
-                <a:endParaRPr lang="en-US" sz="900" dirty="0">
-                  <a:solidFill>
-                    <a:srgbClr val="00B050"/>
-                  </a:solidFill>
-                </a:endParaRPr>
-              </a:p>
-              <a:p>
-                <a:r>
-                  <a:rPr lang="en-US" sz="900" dirty="0">
-                    <a:solidFill>
-                      <a:srgbClr val="00B050"/>
-                    </a:solidFill>
-                  </a:rPr>
-                  <a:t>0,1</a:t>
-                </a:r>
-              </a:p>
-            </p:txBody>
-          </p:sp>
-          <p:sp>
-            <p:nvSpPr>
-              <p:cNvPr id="97" name="Rectangle 96"/>
-              <p:cNvSpPr/>
-              <p:nvPr/>
-            </p:nvSpPr>
-            <p:spPr>
-              <a:xfrm>
-                <a:off x="689590" y="2016200"/>
-                <a:ext cx="1219200" cy="523287"/>
-              </a:xfrm>
-              <a:prstGeom prst="rect">
-                <a:avLst/>
-              </a:prstGeom>
-              <a:noFill/>
-              <a:ln w="6350">
-                <a:solidFill>
-                  <a:srgbClr val="0070C0"/>
-                </a:solidFill>
-              </a:ln>
-            </p:spPr>
-            <p:style>
-              <a:lnRef idx="2">
-                <a:schemeClr val="accent1">
-                  <a:shade val="50000"/>
-                </a:schemeClr>
-              </a:lnRef>
-              <a:fillRef idx="1">
-                <a:schemeClr val="accent1"/>
-              </a:fillRef>
-              <a:effectRef idx="0">
-                <a:schemeClr val="accent1"/>
-              </a:effectRef>
-              <a:fontRef idx="minor">
-                <a:schemeClr val="lt1"/>
-              </a:fontRef>
-            </p:style>
-            <p:txBody>
-              <a:bodyPr lIns="91440" tIns="45720" rIns="91440" bIns="45720" spcCol="0" rtlCol="0" anchor="t"/>
-              <a:lstStyle/>
-              <a:p>
-                <a:pPr algn="ctr"/>
-                <a:r>
-                  <a:rPr lang="en-US" sz="1100" b="1" dirty="0" smtClean="0">
-                    <a:solidFill>
-                      <a:srgbClr val="0070C0"/>
-                    </a:solidFill>
-                  </a:rPr>
-                  <a:t>Port</a:t>
-                </a:r>
-              </a:p>
-              <a:p>
-                <a:r>
-                  <a:rPr lang="en-US" sz="900" dirty="0" smtClean="0">
-                    <a:solidFill>
-                      <a:srgbClr val="0070C0"/>
-                    </a:solidFill>
-                  </a:rPr>
-                  <a:t>id: </a:t>
-                </a:r>
-                <a:r>
-                  <a:rPr lang="en-US" sz="900" smtClean="0">
-                    <a:solidFill>
-                      <a:srgbClr val="0070C0"/>
-                    </a:solidFill>
-                  </a:rPr>
-                  <a:t>PortId</a:t>
-                </a:r>
-                <a:endParaRPr lang="en-US" sz="900" dirty="0" smtClean="0">
-                  <a:solidFill>
-                    <a:srgbClr val="0070C0"/>
-                  </a:solidFill>
-                </a:endParaRPr>
-              </a:p>
-              <a:p>
-                <a:r>
-                  <a:rPr lang="en-US" sz="900" dirty="0" err="1" smtClean="0">
-                    <a:solidFill>
-                      <a:srgbClr val="0070C0"/>
-                    </a:solidFill>
-                  </a:rPr>
-                  <a:t>metaIdRef</a:t>
-                </a:r>
-                <a:r>
-                  <a:rPr lang="en-US" sz="900" dirty="0">
-                    <a:solidFill>
-                      <a:srgbClr val="0070C0"/>
-                    </a:solidFill>
-                  </a:rPr>
-                  <a:t>: </a:t>
-                </a:r>
-                <a:r>
-                  <a:rPr lang="en-US" sz="900" dirty="0" err="1">
-                    <a:solidFill>
-                      <a:srgbClr val="0070C0"/>
-                    </a:solidFill>
-                  </a:rPr>
-                  <a:t>MetaIdRef</a:t>
-                </a:r>
-                <a:endParaRPr lang="en-US" sz="900" dirty="0">
-                  <a:solidFill>
-                    <a:srgbClr val="0070C0"/>
-                  </a:solidFill>
-                </a:endParaRPr>
-              </a:p>
-              <a:p>
-                <a:endParaRPr lang="en-US" sz="900" dirty="0">
-                  <a:solidFill>
-                    <a:srgbClr val="0070C0"/>
-                  </a:solidFill>
-                </a:endParaRPr>
-              </a:p>
-            </p:txBody>
-          </p:sp>
-          <p:sp>
-            <p:nvSpPr>
-              <p:cNvPr id="98" name="Rectangle 97"/>
-              <p:cNvSpPr/>
-              <p:nvPr/>
-            </p:nvSpPr>
-            <p:spPr>
-              <a:xfrm>
-                <a:off x="222285" y="1807154"/>
-                <a:ext cx="437940" cy="369332"/>
-              </a:xfrm>
-              <a:prstGeom prst="rect">
-                <a:avLst/>
-              </a:prstGeom>
-              <a:ln>
-                <a:noFill/>
-              </a:ln>
-            </p:spPr>
-            <p:txBody>
-              <a:bodyPr wrap="none" lIns="91440" tIns="45720" rIns="91440" bIns="45720">
-                <a:spAutoFit/>
-              </a:bodyPr>
-              <a:lstStyle/>
-              <a:p>
-                <a:r>
-                  <a:rPr lang="en-US" sz="900" dirty="0" smtClean="0">
-                    <a:solidFill>
-                      <a:srgbClr val="0070C0"/>
-                    </a:solidFill>
-                  </a:rPr>
-                  <a:t>port</a:t>
-                </a:r>
-                <a:endParaRPr lang="en-US" sz="900" dirty="0">
-                  <a:solidFill>
-                    <a:srgbClr val="0070C0"/>
-                  </a:solidFill>
-                </a:endParaRPr>
-              </a:p>
-              <a:p>
-                <a:r>
-                  <a:rPr lang="en-US" sz="900" dirty="0">
-                    <a:solidFill>
-                      <a:srgbClr val="0070C0"/>
-                    </a:solidFill>
-                  </a:rPr>
-                  <a:t>0,…,*</a:t>
-                </a:r>
-              </a:p>
-            </p:txBody>
-          </p:sp>
-          <p:cxnSp>
-            <p:nvCxnSpPr>
-              <p:cNvPr id="99" name="Elbow Connector 98"/>
-              <p:cNvCxnSpPr>
-                <a:stCxn id="97" idx="3"/>
-                <a:endCxn id="103" idx="3"/>
-              </p:cNvCxnSpPr>
-              <p:nvPr/>
-            </p:nvCxnSpPr>
-            <p:spPr>
-              <a:xfrm flipV="1">
-                <a:off x="1908790" y="482955"/>
-                <a:ext cx="147834" cy="1794889"/>
-              </a:xfrm>
-              <a:prstGeom prst="bentConnector2">
-                <a:avLst/>
-              </a:prstGeom>
-              <a:ln w="6350">
-                <a:solidFill>
-                  <a:srgbClr val="0070C0"/>
-                </a:solidFill>
-              </a:ln>
-            </p:spPr>
-            <p:style>
-              <a:lnRef idx="1">
-                <a:schemeClr val="accent1"/>
-              </a:lnRef>
-              <a:fillRef idx="0">
-                <a:schemeClr val="accent1"/>
-              </a:fillRef>
-              <a:effectRef idx="0">
-                <a:schemeClr val="accent1"/>
-              </a:effectRef>
-              <a:fontRef idx="minor">
-                <a:schemeClr val="tx1"/>
-              </a:fontRef>
-            </p:style>
-          </p:cxnSp>
-          <p:sp>
-            <p:nvSpPr>
-              <p:cNvPr id="100" name="Rectangle 99"/>
-              <p:cNvSpPr/>
-              <p:nvPr/>
-            </p:nvSpPr>
-            <p:spPr>
-              <a:xfrm>
-                <a:off x="265170" y="1607792"/>
-                <a:ext cx="1304143" cy="216843"/>
-              </a:xfrm>
-              <a:prstGeom prst="rect">
-                <a:avLst/>
-              </a:prstGeom>
-              <a:noFill/>
-              <a:ln w="6350">
-                <a:solidFill>
-                  <a:srgbClr val="0070C0"/>
-                </a:solidFill>
-              </a:ln>
-            </p:spPr>
-            <p:style>
-              <a:lnRef idx="2">
-                <a:schemeClr val="accent1">
-                  <a:shade val="50000"/>
-                </a:schemeClr>
-              </a:lnRef>
-              <a:fillRef idx="1">
-                <a:schemeClr val="accent1"/>
-              </a:fillRef>
-              <a:effectRef idx="0">
-                <a:schemeClr val="accent1"/>
-              </a:effectRef>
-              <a:fontRef idx="minor">
-                <a:schemeClr val="lt1"/>
-              </a:fontRef>
-            </p:style>
-            <p:txBody>
-              <a:bodyPr lIns="91440" tIns="45720" rIns="91440" bIns="45720" spcCol="0" rtlCol="0" anchor="ctr"/>
-              <a:lstStyle/>
-              <a:p>
-                <a:pPr algn="ctr"/>
-                <a:r>
-                  <a:rPr lang="en-US" sz="1100" b="1" dirty="0" err="1" smtClean="0">
-                    <a:solidFill>
-                      <a:srgbClr val="0070C0"/>
-                    </a:solidFill>
-                  </a:rPr>
-                  <a:t>ListOfPorts</a:t>
-                </a:r>
-                <a:endParaRPr lang="en-US" sz="1100" b="1" dirty="0">
-                  <a:solidFill>
-                    <a:srgbClr val="0070C0"/>
-                  </a:solidFill>
-                </a:endParaRPr>
-              </a:p>
-            </p:txBody>
-          </p:sp>
-          <p:sp>
-            <p:nvSpPr>
-              <p:cNvPr id="101" name="Diamond 100"/>
-              <p:cNvSpPr/>
-              <p:nvPr/>
-            </p:nvSpPr>
-            <p:spPr>
-              <a:xfrm>
-                <a:off x="232917" y="1824637"/>
-                <a:ext cx="66869" cy="152398"/>
-              </a:xfrm>
-              <a:prstGeom prst="diamond">
-                <a:avLst/>
-              </a:prstGeom>
-              <a:solidFill>
-                <a:srgbClr val="0070C0"/>
-              </a:solidFill>
-              <a:ln w="6350">
-                <a:solidFill>
-                  <a:srgbClr val="0070C0"/>
-                </a:solidFill>
-              </a:ln>
-            </p:spPr>
-            <p:style>
-              <a:lnRef idx="2">
-                <a:schemeClr val="accent1">
-                  <a:shade val="50000"/>
-                </a:schemeClr>
-              </a:lnRef>
-              <a:fillRef idx="1">
-                <a:schemeClr val="accent1"/>
-              </a:fillRef>
-              <a:effectRef idx="0">
-                <a:schemeClr val="accent1"/>
-              </a:effectRef>
-              <a:fontRef idx="minor">
-                <a:schemeClr val="lt1"/>
-              </a:fontRef>
-            </p:style>
-            <p:txBody>
-              <a:bodyPr lIns="91440" tIns="45720" rIns="91440" bIns="45720" spcCol="0" rtlCol="0" anchor="ctr"/>
-              <a:lstStyle/>
-              <a:p>
-                <a:pPr algn="ctr"/>
-                <a:endParaRPr lang="en-US">
-                  <a:solidFill>
-                    <a:srgbClr val="0070C0"/>
-                  </a:solidFill>
-                </a:endParaRPr>
-              </a:p>
-            </p:txBody>
-          </p:sp>
-        </p:grpSp>
+              </a:endParaRPr>
+            </a:p>
+          </p:txBody>
+        </p:sp>
         <p:cxnSp>
           <p:nvCxnSpPr>
-            <p:cNvPr id="104" name="Straight Connector 103"/>
-            <p:cNvCxnSpPr/>
+            <p:cNvPr id="51" name="Elbow Connector 50"/>
+            <p:cNvCxnSpPr>
+              <a:stCxn id="49" idx="0"/>
+              <a:endCxn id="77" idx="3"/>
+            </p:cNvCxnSpPr>
             <p:nvPr/>
           </p:nvCxnSpPr>
           <p:spPr>
-            <a:xfrm>
-              <a:off x="691293" y="2134284"/>
-              <a:ext cx="1218221" cy="53"/>
+            <a:xfrm rot="5400000" flipH="1" flipV="1">
+              <a:off x="1388445" y="1118472"/>
+              <a:ext cx="1337624" cy="182"/>
             </a:xfrm>
-            <a:prstGeom prst="line">
-              <a:avLst/>
+            <a:prstGeom prst="bentConnector3">
+              <a:avLst>
+                <a:gd name="adj1" fmla="val 50000"/>
+              </a:avLst>
             </a:prstGeom>
             <a:ln w="6350">
               <a:solidFill>

</xml_diff>

<commit_message>
Latest updates, mostly to include new validation rules.  A few changes to the figures here and there as well, but nothing major (bigest was to change 'metaIdRef' to 'IDREF' since it turned out IDREF was already a Thing).
</commit_message>
<xml_diff>
--- a/sbml-level-3/version-1/comp/HierarchicalModel.pptx
+++ b/sbml-level-3/version-1/comp/HierarchicalModel.pptx
@@ -192,7 +192,7 @@
           <a:p>
             <a:fld id="{7754A941-C6C2-4027-B1F4-A5E937B2245F}" type="datetimeFigureOut">
               <a:rPr lang="en-US" smtClean="0"/>
-              <a:t>5/10/2011</a:t>
+              <a:t>5/11/2011</a:t>
             </a:fld>
             <a:endParaRPr lang="en-US"/>
           </a:p>
@@ -730,7 +730,7 @@
           <a:p>
             <a:fld id="{F0172217-DC24-48CD-AE89-68C8C8D878B4}" type="datetimeFigureOut">
               <a:rPr lang="en-US" smtClean="0"/>
-              <a:t>5/10/2011</a:t>
+              <a:t>5/11/2011</a:t>
             </a:fld>
             <a:endParaRPr lang="en-US"/>
           </a:p>
@@ -900,7 +900,7 @@
           <a:p>
             <a:fld id="{F0172217-DC24-48CD-AE89-68C8C8D878B4}" type="datetimeFigureOut">
               <a:rPr lang="en-US" smtClean="0"/>
-              <a:t>5/10/2011</a:t>
+              <a:t>5/11/2011</a:t>
             </a:fld>
             <a:endParaRPr lang="en-US"/>
           </a:p>
@@ -1080,7 +1080,7 @@
           <a:p>
             <a:fld id="{F0172217-DC24-48CD-AE89-68C8C8D878B4}" type="datetimeFigureOut">
               <a:rPr lang="en-US" smtClean="0"/>
-              <a:t>5/10/2011</a:t>
+              <a:t>5/11/2011</a:t>
             </a:fld>
             <a:endParaRPr lang="en-US"/>
           </a:p>
@@ -1250,7 +1250,7 @@
           <a:p>
             <a:fld id="{F0172217-DC24-48CD-AE89-68C8C8D878B4}" type="datetimeFigureOut">
               <a:rPr lang="en-US" smtClean="0"/>
-              <a:t>5/10/2011</a:t>
+              <a:t>5/11/2011</a:t>
             </a:fld>
             <a:endParaRPr lang="en-US"/>
           </a:p>
@@ -1496,7 +1496,7 @@
           <a:p>
             <a:fld id="{F0172217-DC24-48CD-AE89-68C8C8D878B4}" type="datetimeFigureOut">
               <a:rPr lang="en-US" smtClean="0"/>
-              <a:t>5/10/2011</a:t>
+              <a:t>5/11/2011</a:t>
             </a:fld>
             <a:endParaRPr lang="en-US"/>
           </a:p>
@@ -1784,7 +1784,7 @@
           <a:p>
             <a:fld id="{F0172217-DC24-48CD-AE89-68C8C8D878B4}" type="datetimeFigureOut">
               <a:rPr lang="en-US" smtClean="0"/>
-              <a:t>5/10/2011</a:t>
+              <a:t>5/11/2011</a:t>
             </a:fld>
             <a:endParaRPr lang="en-US"/>
           </a:p>
@@ -2206,7 +2206,7 @@
           <a:p>
             <a:fld id="{F0172217-DC24-48CD-AE89-68C8C8D878B4}" type="datetimeFigureOut">
               <a:rPr lang="en-US" smtClean="0"/>
-              <a:t>5/10/2011</a:t>
+              <a:t>5/11/2011</a:t>
             </a:fld>
             <a:endParaRPr lang="en-US"/>
           </a:p>
@@ -2324,7 +2324,7 @@
           <a:p>
             <a:fld id="{F0172217-DC24-48CD-AE89-68C8C8D878B4}" type="datetimeFigureOut">
               <a:rPr lang="en-US" smtClean="0"/>
-              <a:t>5/10/2011</a:t>
+              <a:t>5/11/2011</a:t>
             </a:fld>
             <a:endParaRPr lang="en-US"/>
           </a:p>
@@ -2419,7 +2419,7 @@
           <a:p>
             <a:fld id="{F0172217-DC24-48CD-AE89-68C8C8D878B4}" type="datetimeFigureOut">
               <a:rPr lang="en-US" smtClean="0"/>
-              <a:t>5/10/2011</a:t>
+              <a:t>5/11/2011</a:t>
             </a:fld>
             <a:endParaRPr lang="en-US"/>
           </a:p>
@@ -2696,7 +2696,7 @@
           <a:p>
             <a:fld id="{F0172217-DC24-48CD-AE89-68C8C8D878B4}" type="datetimeFigureOut">
               <a:rPr lang="en-US" smtClean="0"/>
-              <a:t>5/10/2011</a:t>
+              <a:t>5/11/2011</a:t>
             </a:fld>
             <a:endParaRPr lang="en-US"/>
           </a:p>
@@ -2949,7 +2949,7 @@
           <a:p>
             <a:fld id="{F0172217-DC24-48CD-AE89-68C8C8D878B4}" type="datetimeFigureOut">
               <a:rPr lang="en-US" smtClean="0"/>
-              <a:t>5/10/2011</a:t>
+              <a:t>5/11/2011</a:t>
             </a:fld>
             <a:endParaRPr lang="en-US"/>
           </a:p>
@@ -3162,7 +3162,7 @@
           <a:p>
             <a:fld id="{F0172217-DC24-48CD-AE89-68C8C8D878B4}" type="datetimeFigureOut">
               <a:rPr lang="en-US" smtClean="0"/>
-              <a:t>5/10/2011</a:t>
+              <a:t>5/11/2011</a:t>
             </a:fld>
             <a:endParaRPr lang="en-US"/>
           </a:p>

</xml_diff>